<commit_message>
first pass at the introduction
</commit_message>
<xml_diff>
--- a/javascript-objects.pptx
+++ b/javascript-objects.pptx
@@ -4,12 +4,18 @@
   <p:sldMasterIdLst>
     <p:sldMasterId id="2147483648" r:id="rId1"/>
   </p:sldMasterIdLst>
+  <p:notesMasterIdLst>
+    <p:notesMasterId r:id="rId10"/>
+  </p:notesMasterIdLst>
   <p:sldIdLst>
     <p:sldId id="256" r:id="rId2"/>
-    <p:sldId id="257" r:id="rId3"/>
-    <p:sldId id="261" r:id="rId4"/>
-    <p:sldId id="267" r:id="rId5"/>
-    <p:sldId id="265" r:id="rId6"/>
+    <p:sldId id="269" r:id="rId3"/>
+    <p:sldId id="270" r:id="rId4"/>
+    <p:sldId id="268" r:id="rId5"/>
+    <p:sldId id="257" r:id="rId6"/>
+    <p:sldId id="261" r:id="rId7"/>
+    <p:sldId id="267" r:id="rId8"/>
+    <p:sldId id="265" r:id="rId9"/>
   </p:sldIdLst>
   <p:sldSz cx="9144000" cy="6858000" type="screen4x3"/>
   <p:notesSz cx="6858000" cy="9144000"/>
@@ -111,6 +117,959 @@
 </p:presentation>
 </file>
 
+<file path=ppt/notesMasters/notesMaster1.xml><?xml version="1.0" encoding="utf-8"?>
+<p:notesMaster xmlns:a="http://schemas.openxmlformats.org/drawingml/2006/main" xmlns:r="http://schemas.openxmlformats.org/officeDocument/2006/relationships" xmlns:p="http://schemas.openxmlformats.org/presentationml/2006/main">
+  <p:cSld>
+    <p:bg>
+      <p:bgRef idx="1001">
+        <a:schemeClr val="bg1"/>
+      </p:bgRef>
+    </p:bg>
+    <p:spTree>
+      <p:nvGrpSpPr>
+        <p:cNvPr id="1" name=""/>
+        <p:cNvGrpSpPr/>
+        <p:nvPr/>
+      </p:nvGrpSpPr>
+      <p:grpSpPr>
+        <a:xfrm>
+          <a:off x="0" y="0"/>
+          <a:ext cx="0" cy="0"/>
+          <a:chOff x="0" y="0"/>
+          <a:chExt cx="0" cy="0"/>
+        </a:xfrm>
+      </p:grpSpPr>
+      <p:sp>
+        <p:nvSpPr>
+          <p:cNvPr id="2" name="Header Placeholder 1"/>
+          <p:cNvSpPr>
+            <a:spLocks noGrp="1"/>
+          </p:cNvSpPr>
+          <p:nvPr>
+            <p:ph type="hdr" sz="quarter"/>
+          </p:nvPr>
+        </p:nvSpPr>
+        <p:spPr>
+          <a:xfrm>
+            <a:off x="0" y="0"/>
+            <a:ext cx="2971800" cy="457200"/>
+          </a:xfrm>
+          <a:prstGeom prst="rect">
+            <a:avLst/>
+          </a:prstGeom>
+        </p:spPr>
+        <p:txBody>
+          <a:bodyPr vert="horz" lIns="91440" tIns="45720" rIns="91440" bIns="45720" rtlCol="0"/>
+          <a:lstStyle>
+            <a:lvl1pPr algn="l">
+              <a:defRPr sz="1200"/>
+            </a:lvl1pPr>
+          </a:lstStyle>
+          <a:p>
+            <a:endParaRPr lang="en-US"/>
+          </a:p>
+        </p:txBody>
+      </p:sp>
+      <p:sp>
+        <p:nvSpPr>
+          <p:cNvPr id="3" name="Date Placeholder 2"/>
+          <p:cNvSpPr>
+            <a:spLocks noGrp="1"/>
+          </p:cNvSpPr>
+          <p:nvPr>
+            <p:ph type="dt" idx="1"/>
+          </p:nvPr>
+        </p:nvSpPr>
+        <p:spPr>
+          <a:xfrm>
+            <a:off x="3884613" y="0"/>
+            <a:ext cx="2971800" cy="457200"/>
+          </a:xfrm>
+          <a:prstGeom prst="rect">
+            <a:avLst/>
+          </a:prstGeom>
+        </p:spPr>
+        <p:txBody>
+          <a:bodyPr vert="horz" lIns="91440" tIns="45720" rIns="91440" bIns="45720" rtlCol="0"/>
+          <a:lstStyle>
+            <a:lvl1pPr algn="r">
+              <a:defRPr sz="1200"/>
+            </a:lvl1pPr>
+          </a:lstStyle>
+          <a:p>
+            <a:fld id="{74D75A25-4B1F-744F-874C-55658E3139C9}" type="datetimeFigureOut">
+              <a:rPr lang="en-US" smtClean="0"/>
+              <a:t>25/05/2013</a:t>
+            </a:fld>
+            <a:endParaRPr lang="en-US"/>
+          </a:p>
+        </p:txBody>
+      </p:sp>
+      <p:sp>
+        <p:nvSpPr>
+          <p:cNvPr id="4" name="Slide Image Placeholder 3"/>
+          <p:cNvSpPr>
+            <a:spLocks noGrp="1" noRot="1" noChangeAspect="1"/>
+          </p:cNvSpPr>
+          <p:nvPr>
+            <p:ph type="sldImg" idx="2"/>
+          </p:nvPr>
+        </p:nvSpPr>
+        <p:spPr>
+          <a:xfrm>
+            <a:off x="1143000" y="685800"/>
+            <a:ext cx="4572000" cy="3429000"/>
+          </a:xfrm>
+          <a:prstGeom prst="rect">
+            <a:avLst/>
+          </a:prstGeom>
+          <a:noFill/>
+          <a:ln w="12700">
+            <a:solidFill>
+              <a:prstClr val="black"/>
+            </a:solidFill>
+          </a:ln>
+        </p:spPr>
+        <p:txBody>
+          <a:bodyPr vert="horz" lIns="91440" tIns="45720" rIns="91440" bIns="45720" rtlCol="0" anchor="ctr"/>
+          <a:lstStyle/>
+          <a:p>
+            <a:endParaRPr lang="en-US"/>
+          </a:p>
+        </p:txBody>
+      </p:sp>
+      <p:sp>
+        <p:nvSpPr>
+          <p:cNvPr id="5" name="Notes Placeholder 4"/>
+          <p:cNvSpPr>
+            <a:spLocks noGrp="1"/>
+          </p:cNvSpPr>
+          <p:nvPr>
+            <p:ph type="body" sz="quarter" idx="3"/>
+          </p:nvPr>
+        </p:nvSpPr>
+        <p:spPr>
+          <a:xfrm>
+            <a:off x="685800" y="4343400"/>
+            <a:ext cx="5486400" cy="4114800"/>
+          </a:xfrm>
+          <a:prstGeom prst="rect">
+            <a:avLst/>
+          </a:prstGeom>
+        </p:spPr>
+        <p:txBody>
+          <a:bodyPr vert="horz" lIns="91440" tIns="45720" rIns="91440" bIns="45720" rtlCol="0"/>
+          <a:lstStyle/>
+          <a:p>
+            <a:pPr lvl="0"/>
+            <a:r>
+              <a:rPr lang="en-GB" smtClean="0"/>
+              <a:t>Click to edit Master text styles</a:t>
+            </a:r>
+          </a:p>
+          <a:p>
+            <a:pPr lvl="1"/>
+            <a:r>
+              <a:rPr lang="en-GB" smtClean="0"/>
+              <a:t>Second level</a:t>
+            </a:r>
+          </a:p>
+          <a:p>
+            <a:pPr lvl="2"/>
+            <a:r>
+              <a:rPr lang="en-GB" smtClean="0"/>
+              <a:t>Third level</a:t>
+            </a:r>
+          </a:p>
+          <a:p>
+            <a:pPr lvl="3"/>
+            <a:r>
+              <a:rPr lang="en-GB" smtClean="0"/>
+              <a:t>Fourth level</a:t>
+            </a:r>
+          </a:p>
+          <a:p>
+            <a:pPr lvl="4"/>
+            <a:r>
+              <a:rPr lang="en-GB" smtClean="0"/>
+              <a:t>Fifth level</a:t>
+            </a:r>
+            <a:endParaRPr lang="en-US"/>
+          </a:p>
+        </p:txBody>
+      </p:sp>
+      <p:sp>
+        <p:nvSpPr>
+          <p:cNvPr id="6" name="Footer Placeholder 5"/>
+          <p:cNvSpPr>
+            <a:spLocks noGrp="1"/>
+          </p:cNvSpPr>
+          <p:nvPr>
+            <p:ph type="ftr" sz="quarter" idx="4"/>
+          </p:nvPr>
+        </p:nvSpPr>
+        <p:spPr>
+          <a:xfrm>
+            <a:off x="0" y="8685213"/>
+            <a:ext cx="2971800" cy="457200"/>
+          </a:xfrm>
+          <a:prstGeom prst="rect">
+            <a:avLst/>
+          </a:prstGeom>
+        </p:spPr>
+        <p:txBody>
+          <a:bodyPr vert="horz" lIns="91440" tIns="45720" rIns="91440" bIns="45720" rtlCol="0" anchor="b"/>
+          <a:lstStyle>
+            <a:lvl1pPr algn="l">
+              <a:defRPr sz="1200"/>
+            </a:lvl1pPr>
+          </a:lstStyle>
+          <a:p>
+            <a:endParaRPr lang="en-US"/>
+          </a:p>
+        </p:txBody>
+      </p:sp>
+      <p:sp>
+        <p:nvSpPr>
+          <p:cNvPr id="7" name="Slide Number Placeholder 6"/>
+          <p:cNvSpPr>
+            <a:spLocks noGrp="1"/>
+          </p:cNvSpPr>
+          <p:nvPr>
+            <p:ph type="sldNum" sz="quarter" idx="5"/>
+          </p:nvPr>
+        </p:nvSpPr>
+        <p:spPr>
+          <a:xfrm>
+            <a:off x="3884613" y="8685213"/>
+            <a:ext cx="2971800" cy="457200"/>
+          </a:xfrm>
+          <a:prstGeom prst="rect">
+            <a:avLst/>
+          </a:prstGeom>
+        </p:spPr>
+        <p:txBody>
+          <a:bodyPr vert="horz" lIns="91440" tIns="45720" rIns="91440" bIns="45720" rtlCol="0" anchor="b"/>
+          <a:lstStyle>
+            <a:lvl1pPr algn="r">
+              <a:defRPr sz="1200"/>
+            </a:lvl1pPr>
+          </a:lstStyle>
+          <a:p>
+            <a:fld id="{042B0272-D6CE-D246-814F-524707BF3A24}" type="slidenum">
+              <a:rPr lang="en-US" smtClean="0"/>
+              <a:t>‹#›</a:t>
+            </a:fld>
+            <a:endParaRPr lang="en-US"/>
+          </a:p>
+        </p:txBody>
+      </p:sp>
+    </p:spTree>
+    <p:extLst>
+      <p:ext uri="{BB962C8B-B14F-4D97-AF65-F5344CB8AC3E}">
+        <p14:creationId xmlns:p14="http://schemas.microsoft.com/office/powerpoint/2010/main" val="613372949"/>
+      </p:ext>
+    </p:extLst>
+  </p:cSld>
+  <p:clrMap bg1="lt1" tx1="dk1" bg2="lt2" tx2="dk2" accent1="accent1" accent2="accent2" accent3="accent3" accent4="accent4" accent5="accent5" accent6="accent6" hlink="hlink" folHlink="folHlink"/>
+  <p:notesStyle>
+    <a:lvl1pPr marL="0" algn="l" defTabSz="457200" rtl="0" eaLnBrk="1" latinLnBrk="0" hangingPunct="1">
+      <a:defRPr sz="1200" kern="1200">
+        <a:solidFill>
+          <a:schemeClr val="tx1"/>
+        </a:solidFill>
+        <a:latin typeface="+mn-lt"/>
+        <a:ea typeface="+mn-ea"/>
+        <a:cs typeface="+mn-cs"/>
+      </a:defRPr>
+    </a:lvl1pPr>
+    <a:lvl2pPr marL="457200" algn="l" defTabSz="457200" rtl="0" eaLnBrk="1" latinLnBrk="0" hangingPunct="1">
+      <a:defRPr sz="1200" kern="1200">
+        <a:solidFill>
+          <a:schemeClr val="tx1"/>
+        </a:solidFill>
+        <a:latin typeface="+mn-lt"/>
+        <a:ea typeface="+mn-ea"/>
+        <a:cs typeface="+mn-cs"/>
+      </a:defRPr>
+    </a:lvl2pPr>
+    <a:lvl3pPr marL="914400" algn="l" defTabSz="457200" rtl="0" eaLnBrk="1" latinLnBrk="0" hangingPunct="1">
+      <a:defRPr sz="1200" kern="1200">
+        <a:solidFill>
+          <a:schemeClr val="tx1"/>
+        </a:solidFill>
+        <a:latin typeface="+mn-lt"/>
+        <a:ea typeface="+mn-ea"/>
+        <a:cs typeface="+mn-cs"/>
+      </a:defRPr>
+    </a:lvl3pPr>
+    <a:lvl4pPr marL="1371600" algn="l" defTabSz="457200" rtl="0" eaLnBrk="1" latinLnBrk="0" hangingPunct="1">
+      <a:defRPr sz="1200" kern="1200">
+        <a:solidFill>
+          <a:schemeClr val="tx1"/>
+        </a:solidFill>
+        <a:latin typeface="+mn-lt"/>
+        <a:ea typeface="+mn-ea"/>
+        <a:cs typeface="+mn-cs"/>
+      </a:defRPr>
+    </a:lvl4pPr>
+    <a:lvl5pPr marL="1828800" algn="l" defTabSz="457200" rtl="0" eaLnBrk="1" latinLnBrk="0" hangingPunct="1">
+      <a:defRPr sz="1200" kern="1200">
+        <a:solidFill>
+          <a:schemeClr val="tx1"/>
+        </a:solidFill>
+        <a:latin typeface="+mn-lt"/>
+        <a:ea typeface="+mn-ea"/>
+        <a:cs typeface="+mn-cs"/>
+      </a:defRPr>
+    </a:lvl5pPr>
+    <a:lvl6pPr marL="2286000" algn="l" defTabSz="457200" rtl="0" eaLnBrk="1" latinLnBrk="0" hangingPunct="1">
+      <a:defRPr sz="1200" kern="1200">
+        <a:solidFill>
+          <a:schemeClr val="tx1"/>
+        </a:solidFill>
+        <a:latin typeface="+mn-lt"/>
+        <a:ea typeface="+mn-ea"/>
+        <a:cs typeface="+mn-cs"/>
+      </a:defRPr>
+    </a:lvl6pPr>
+    <a:lvl7pPr marL="2743200" algn="l" defTabSz="457200" rtl="0" eaLnBrk="1" latinLnBrk="0" hangingPunct="1">
+      <a:defRPr sz="1200" kern="1200">
+        <a:solidFill>
+          <a:schemeClr val="tx1"/>
+        </a:solidFill>
+        <a:latin typeface="+mn-lt"/>
+        <a:ea typeface="+mn-ea"/>
+        <a:cs typeface="+mn-cs"/>
+      </a:defRPr>
+    </a:lvl7pPr>
+    <a:lvl8pPr marL="3200400" algn="l" defTabSz="457200" rtl="0" eaLnBrk="1" latinLnBrk="0" hangingPunct="1">
+      <a:defRPr sz="1200" kern="1200">
+        <a:solidFill>
+          <a:schemeClr val="tx1"/>
+        </a:solidFill>
+        <a:latin typeface="+mn-lt"/>
+        <a:ea typeface="+mn-ea"/>
+        <a:cs typeface="+mn-cs"/>
+      </a:defRPr>
+    </a:lvl8pPr>
+    <a:lvl9pPr marL="3657600" algn="l" defTabSz="457200" rtl="0" eaLnBrk="1" latinLnBrk="0" hangingPunct="1">
+      <a:defRPr sz="1200" kern="1200">
+        <a:solidFill>
+          <a:schemeClr val="tx1"/>
+        </a:solidFill>
+        <a:latin typeface="+mn-lt"/>
+        <a:ea typeface="+mn-ea"/>
+        <a:cs typeface="+mn-cs"/>
+      </a:defRPr>
+    </a:lvl9pPr>
+  </p:notesStyle>
+</p:notesMaster>
+</file>
+
+<file path=ppt/notesSlides/notesSlide1.xml><?xml version="1.0" encoding="utf-8"?>
+<p:notes xmlns:a="http://schemas.openxmlformats.org/drawingml/2006/main" xmlns:r="http://schemas.openxmlformats.org/officeDocument/2006/relationships" xmlns:p="http://schemas.openxmlformats.org/presentationml/2006/main">
+  <p:cSld>
+    <p:spTree>
+      <p:nvGrpSpPr>
+        <p:cNvPr id="1" name=""/>
+        <p:cNvGrpSpPr/>
+        <p:nvPr/>
+      </p:nvGrpSpPr>
+      <p:grpSpPr>
+        <a:xfrm>
+          <a:off x="0" y="0"/>
+          <a:ext cx="0" cy="0"/>
+          <a:chOff x="0" y="0"/>
+          <a:chExt cx="0" cy="0"/>
+        </a:xfrm>
+      </p:grpSpPr>
+      <p:sp>
+        <p:nvSpPr>
+          <p:cNvPr id="2" name="Slide Image Placeholder 1"/>
+          <p:cNvSpPr>
+            <a:spLocks noGrp="1" noRot="1" noChangeAspect="1"/>
+          </p:cNvSpPr>
+          <p:nvPr>
+            <p:ph type="sldImg"/>
+          </p:nvPr>
+        </p:nvSpPr>
+        <p:spPr/>
+      </p:sp>
+      <p:sp>
+        <p:nvSpPr>
+          <p:cNvPr id="3" name="Notes Placeholder 2"/>
+          <p:cNvSpPr>
+            <a:spLocks noGrp="1"/>
+          </p:cNvSpPr>
+          <p:nvPr>
+            <p:ph type="body" idx="1"/>
+          </p:nvPr>
+        </p:nvSpPr>
+        <p:spPr/>
+        <p:txBody>
+          <a:bodyPr/>
+          <a:lstStyle/>
+          <a:p>
+            <a:r>
+              <a:rPr lang="en-US" dirty="0" smtClean="0"/>
+              <a:t>Helen Emerson</a:t>
+            </a:r>
+          </a:p>
+          <a:p>
+            <a:r>
+              <a:rPr lang="en-US" baseline="0" dirty="0" smtClean="0"/>
+              <a:t>Currently technical architect for </a:t>
+            </a:r>
+            <a:r>
+              <a:rPr lang="en-US" baseline="0" dirty="0" err="1" smtClean="0"/>
+              <a:t>Totaljobs</a:t>
+            </a:r>
+            <a:endParaRPr lang="en-US" baseline="0" dirty="0" smtClean="0"/>
+          </a:p>
+          <a:p>
+            <a:pPr marL="0" marR="0" indent="0" algn="l" defTabSz="457200" rtl="0" eaLnBrk="1" fontAlgn="auto" latinLnBrk="0" hangingPunct="1">
+              <a:lnSpc>
+                <a:spcPct val="100000"/>
+              </a:lnSpc>
+              <a:spcBef>
+                <a:spcPts val="0"/>
+              </a:spcBef>
+              <a:spcAft>
+                <a:spcPts val="0"/>
+              </a:spcAft>
+              <a:buClrTx/>
+              <a:buSzTx/>
+              <a:buFontTx/>
+              <a:buNone/>
+              <a:tabLst/>
+              <a:defRPr/>
+            </a:pPr>
+            <a:r>
+              <a:rPr lang="en-US" dirty="0" smtClean="0"/>
+              <a:t>Web</a:t>
+            </a:r>
+            <a:r>
+              <a:rPr lang="en-US" baseline="0" dirty="0" smtClean="0"/>
+              <a:t> developer for the past 10 years, have developed an interest in front end </a:t>
+            </a:r>
+            <a:r>
+              <a:rPr lang="en-US" baseline="0" dirty="0" err="1" smtClean="0"/>
+              <a:t>technlogy</a:t>
+            </a:r>
+            <a:endParaRPr lang="en-US" baseline="0" dirty="0" smtClean="0"/>
+          </a:p>
+          <a:p>
+            <a:endParaRPr lang="en-US" dirty="0"/>
+          </a:p>
+        </p:txBody>
+      </p:sp>
+      <p:sp>
+        <p:nvSpPr>
+          <p:cNvPr id="4" name="Slide Number Placeholder 3"/>
+          <p:cNvSpPr>
+            <a:spLocks noGrp="1"/>
+          </p:cNvSpPr>
+          <p:nvPr>
+            <p:ph type="sldNum" sz="quarter" idx="10"/>
+          </p:nvPr>
+        </p:nvSpPr>
+        <p:spPr/>
+        <p:txBody>
+          <a:bodyPr/>
+          <a:lstStyle/>
+          <a:p>
+            <a:fld id="{042B0272-D6CE-D246-814F-524707BF3A24}" type="slidenum">
+              <a:rPr lang="en-US" smtClean="0"/>
+              <a:t>1</a:t>
+            </a:fld>
+            <a:endParaRPr lang="en-US"/>
+          </a:p>
+        </p:txBody>
+      </p:sp>
+    </p:spTree>
+    <p:extLst>
+      <p:ext uri="{BB962C8B-B14F-4D97-AF65-F5344CB8AC3E}">
+        <p14:creationId xmlns:p14="http://schemas.microsoft.com/office/powerpoint/2010/main" val="776079450"/>
+      </p:ext>
+    </p:extLst>
+  </p:cSld>
+  <p:clrMapOvr>
+    <a:masterClrMapping/>
+  </p:clrMapOvr>
+</p:notes>
+</file>
+
+<file path=ppt/notesSlides/notesSlide2.xml><?xml version="1.0" encoding="utf-8"?>
+<p:notes xmlns:a="http://schemas.openxmlformats.org/drawingml/2006/main" xmlns:r="http://schemas.openxmlformats.org/officeDocument/2006/relationships" xmlns:p="http://schemas.openxmlformats.org/presentationml/2006/main">
+  <p:cSld>
+    <p:spTree>
+      <p:nvGrpSpPr>
+        <p:cNvPr id="1" name=""/>
+        <p:cNvGrpSpPr/>
+        <p:nvPr/>
+      </p:nvGrpSpPr>
+      <p:grpSpPr>
+        <a:xfrm>
+          <a:off x="0" y="0"/>
+          <a:ext cx="0" cy="0"/>
+          <a:chOff x="0" y="0"/>
+          <a:chExt cx="0" cy="0"/>
+        </a:xfrm>
+      </p:grpSpPr>
+      <p:sp>
+        <p:nvSpPr>
+          <p:cNvPr id="2" name="Slide Image Placeholder 1"/>
+          <p:cNvSpPr>
+            <a:spLocks noGrp="1" noRot="1" noChangeAspect="1"/>
+          </p:cNvSpPr>
+          <p:nvPr>
+            <p:ph type="sldImg"/>
+          </p:nvPr>
+        </p:nvSpPr>
+        <p:spPr/>
+      </p:sp>
+      <p:sp>
+        <p:nvSpPr>
+          <p:cNvPr id="3" name="Notes Placeholder 2"/>
+          <p:cNvSpPr>
+            <a:spLocks noGrp="1"/>
+          </p:cNvSpPr>
+          <p:nvPr>
+            <p:ph type="body" idx="1"/>
+          </p:nvPr>
+        </p:nvSpPr>
+        <p:spPr/>
+        <p:txBody>
+          <a:bodyPr/>
+          <a:lstStyle/>
+          <a:p>
+            <a:r>
+              <a:rPr lang="en-US" dirty="0" smtClean="0"/>
+              <a:t>I won't be offended if this is not for you. If this isn't what you were expecting and you don't think you're interested,</a:t>
+            </a:r>
+            <a:r>
+              <a:rPr lang="en-US" baseline="0" dirty="0" smtClean="0"/>
+              <a:t> please feel free to go to Sebastian's talk. He's going to be talking about REST and SPA. </a:t>
+            </a:r>
+            <a:endParaRPr lang="en-US" dirty="0"/>
+          </a:p>
+        </p:txBody>
+      </p:sp>
+      <p:sp>
+        <p:nvSpPr>
+          <p:cNvPr id="4" name="Slide Number Placeholder 3"/>
+          <p:cNvSpPr>
+            <a:spLocks noGrp="1"/>
+          </p:cNvSpPr>
+          <p:nvPr>
+            <p:ph type="sldNum" sz="quarter" idx="10"/>
+          </p:nvPr>
+        </p:nvSpPr>
+        <p:spPr/>
+        <p:txBody>
+          <a:bodyPr/>
+          <a:lstStyle/>
+          <a:p>
+            <a:fld id="{042B0272-D6CE-D246-814F-524707BF3A24}" type="slidenum">
+              <a:rPr lang="en-US" smtClean="0"/>
+              <a:t>2</a:t>
+            </a:fld>
+            <a:endParaRPr lang="en-US"/>
+          </a:p>
+        </p:txBody>
+      </p:sp>
+    </p:spTree>
+    <p:extLst>
+      <p:ext uri="{BB962C8B-B14F-4D97-AF65-F5344CB8AC3E}">
+        <p14:creationId xmlns:p14="http://schemas.microsoft.com/office/powerpoint/2010/main" val="3018889086"/>
+      </p:ext>
+    </p:extLst>
+  </p:cSld>
+  <p:clrMapOvr>
+    <a:masterClrMapping/>
+  </p:clrMapOvr>
+</p:notes>
+</file>
+
+<file path=ppt/notesSlides/notesSlide3.xml><?xml version="1.0" encoding="utf-8"?>
+<p:notes xmlns:a="http://schemas.openxmlformats.org/drawingml/2006/main" xmlns:r="http://schemas.openxmlformats.org/officeDocument/2006/relationships" xmlns:p="http://schemas.openxmlformats.org/presentationml/2006/main">
+  <p:cSld>
+    <p:spTree>
+      <p:nvGrpSpPr>
+        <p:cNvPr id="1" name=""/>
+        <p:cNvGrpSpPr/>
+        <p:nvPr/>
+      </p:nvGrpSpPr>
+      <p:grpSpPr>
+        <a:xfrm>
+          <a:off x="0" y="0"/>
+          <a:ext cx="0" cy="0"/>
+          <a:chOff x="0" y="0"/>
+          <a:chExt cx="0" cy="0"/>
+        </a:xfrm>
+      </p:grpSpPr>
+      <p:sp>
+        <p:nvSpPr>
+          <p:cNvPr id="2" name="Slide Image Placeholder 1"/>
+          <p:cNvSpPr>
+            <a:spLocks noGrp="1" noRot="1" noChangeAspect="1"/>
+          </p:cNvSpPr>
+          <p:nvPr>
+            <p:ph type="sldImg"/>
+          </p:nvPr>
+        </p:nvSpPr>
+        <p:spPr/>
+      </p:sp>
+      <p:sp>
+        <p:nvSpPr>
+          <p:cNvPr id="3" name="Notes Placeholder 2"/>
+          <p:cNvSpPr>
+            <a:spLocks noGrp="1"/>
+          </p:cNvSpPr>
+          <p:nvPr>
+            <p:ph type="body" idx="1"/>
+          </p:nvPr>
+        </p:nvSpPr>
+        <p:spPr/>
+        <p:txBody>
+          <a:bodyPr/>
+          <a:lstStyle/>
+          <a:p>
+            <a:r>
+              <a:rPr lang="en-US" dirty="0" smtClean="0"/>
+              <a:t>My goals are: </a:t>
+            </a:r>
+          </a:p>
+          <a:p>
+            <a:pPr marL="171450" indent="-171450">
+              <a:buFont typeface="Arial"/>
+              <a:buChar char="•"/>
+            </a:pPr>
+            <a:r>
+              <a:rPr lang="en-US" dirty="0" smtClean="0"/>
+              <a:t>I'm hoping this will be useful to any</a:t>
+            </a:r>
+            <a:r>
+              <a:rPr lang="en-US" baseline="0" dirty="0" smtClean="0"/>
+              <a:t> programmer who uses javascript. </a:t>
+            </a:r>
+            <a:endParaRPr lang="en-US" dirty="0" smtClean="0"/>
+          </a:p>
+          <a:p>
+            <a:pPr marL="171450" indent="-171450">
+              <a:buFont typeface="Arial"/>
+              <a:buChar char="•"/>
+            </a:pPr>
+            <a:r>
+              <a:rPr lang="en-US" dirty="0" smtClean="0"/>
+              <a:t>If you don't know javascript</a:t>
+            </a:r>
+            <a:r>
+              <a:rPr lang="en-US" baseline="0" dirty="0" smtClean="0"/>
+              <a:t> well, I hope you </a:t>
+            </a:r>
+            <a:r>
+              <a:rPr lang="en-US" dirty="0" smtClean="0"/>
+              <a:t>come away with an understanding of</a:t>
+            </a:r>
+            <a:r>
+              <a:rPr lang="en-US" baseline="0" dirty="0" smtClean="0"/>
+              <a:t> what the language is about, how it works and how the language features relate to each other</a:t>
+            </a:r>
+          </a:p>
+          <a:p>
+            <a:pPr marL="171450" indent="-171450">
+              <a:buFont typeface="Arial"/>
+              <a:buChar char="•"/>
+            </a:pPr>
+            <a:r>
+              <a:rPr lang="en-US" baseline="0" dirty="0" smtClean="0"/>
+              <a:t>Everyone, even Dylan Beattie, will learn something new</a:t>
+            </a:r>
+          </a:p>
+          <a:p>
+            <a:endParaRPr lang="en-US" dirty="0"/>
+          </a:p>
+        </p:txBody>
+      </p:sp>
+      <p:sp>
+        <p:nvSpPr>
+          <p:cNvPr id="4" name="Slide Number Placeholder 3"/>
+          <p:cNvSpPr>
+            <a:spLocks noGrp="1"/>
+          </p:cNvSpPr>
+          <p:nvPr>
+            <p:ph type="sldNum" sz="quarter" idx="10"/>
+          </p:nvPr>
+        </p:nvSpPr>
+        <p:spPr/>
+        <p:txBody>
+          <a:bodyPr/>
+          <a:lstStyle/>
+          <a:p>
+            <a:fld id="{042B0272-D6CE-D246-814F-524707BF3A24}" type="slidenum">
+              <a:rPr lang="en-US" smtClean="0"/>
+              <a:t>3</a:t>
+            </a:fld>
+            <a:endParaRPr lang="en-US"/>
+          </a:p>
+        </p:txBody>
+      </p:sp>
+    </p:spTree>
+    <p:extLst>
+      <p:ext uri="{BB962C8B-B14F-4D97-AF65-F5344CB8AC3E}">
+        <p14:creationId xmlns:p14="http://schemas.microsoft.com/office/powerpoint/2010/main" val="2631324404"/>
+      </p:ext>
+    </p:extLst>
+  </p:cSld>
+  <p:clrMapOvr>
+    <a:masterClrMapping/>
+  </p:clrMapOvr>
+</p:notes>
+</file>
+
+<file path=ppt/notesSlides/notesSlide4.xml><?xml version="1.0" encoding="utf-8"?>
+<p:notes xmlns:a="http://schemas.openxmlformats.org/drawingml/2006/main" xmlns:r="http://schemas.openxmlformats.org/officeDocument/2006/relationships" xmlns:p="http://schemas.openxmlformats.org/presentationml/2006/main">
+  <p:cSld>
+    <p:spTree>
+      <p:nvGrpSpPr>
+        <p:cNvPr id="1" name=""/>
+        <p:cNvGrpSpPr/>
+        <p:nvPr/>
+      </p:nvGrpSpPr>
+      <p:grpSpPr>
+        <a:xfrm>
+          <a:off x="0" y="0"/>
+          <a:ext cx="0" cy="0"/>
+          <a:chOff x="0" y="0"/>
+          <a:chExt cx="0" cy="0"/>
+        </a:xfrm>
+      </p:grpSpPr>
+      <p:sp>
+        <p:nvSpPr>
+          <p:cNvPr id="2" name="Slide Image Placeholder 1"/>
+          <p:cNvSpPr>
+            <a:spLocks noGrp="1" noRot="1" noChangeAspect="1"/>
+          </p:cNvSpPr>
+          <p:nvPr>
+            <p:ph type="sldImg"/>
+          </p:nvPr>
+        </p:nvSpPr>
+        <p:spPr/>
+      </p:sp>
+      <p:sp>
+        <p:nvSpPr>
+          <p:cNvPr id="3" name="Notes Placeholder 2"/>
+          <p:cNvSpPr>
+            <a:spLocks noGrp="1"/>
+          </p:cNvSpPr>
+          <p:nvPr>
+            <p:ph type="body" idx="1"/>
+          </p:nvPr>
+        </p:nvSpPr>
+        <p:spPr/>
+        <p:txBody>
+          <a:bodyPr/>
+          <a:lstStyle/>
+          <a:p>
+            <a:r>
+              <a:rPr lang="en-US" dirty="0" smtClean="0"/>
+              <a:t>Mostly</a:t>
+            </a:r>
+            <a:r>
+              <a:rPr lang="en-US" baseline="0" dirty="0" smtClean="0"/>
+              <a:t> coding – examples and labs</a:t>
+            </a:r>
+          </a:p>
+          <a:p>
+            <a:r>
+              <a:rPr lang="en-US" baseline="0" dirty="0" smtClean="0"/>
+              <a:t>Please ask questions as we go along.</a:t>
+            </a:r>
+            <a:endParaRPr lang="en-US" dirty="0"/>
+          </a:p>
+        </p:txBody>
+      </p:sp>
+      <p:sp>
+        <p:nvSpPr>
+          <p:cNvPr id="4" name="Slide Number Placeholder 3"/>
+          <p:cNvSpPr>
+            <a:spLocks noGrp="1"/>
+          </p:cNvSpPr>
+          <p:nvPr>
+            <p:ph type="sldNum" sz="quarter" idx="10"/>
+          </p:nvPr>
+        </p:nvSpPr>
+        <p:spPr/>
+        <p:txBody>
+          <a:bodyPr/>
+          <a:lstStyle/>
+          <a:p>
+            <a:fld id="{042B0272-D6CE-D246-814F-524707BF3A24}" type="slidenum">
+              <a:rPr lang="en-US" smtClean="0"/>
+              <a:t>4</a:t>
+            </a:fld>
+            <a:endParaRPr lang="en-US"/>
+          </a:p>
+        </p:txBody>
+      </p:sp>
+    </p:spTree>
+    <p:extLst>
+      <p:ext uri="{BB962C8B-B14F-4D97-AF65-F5344CB8AC3E}">
+        <p14:creationId xmlns:p14="http://schemas.microsoft.com/office/powerpoint/2010/main" val="3464680019"/>
+      </p:ext>
+    </p:extLst>
+  </p:cSld>
+  <p:clrMapOvr>
+    <a:masterClrMapping/>
+  </p:clrMapOvr>
+</p:notes>
+</file>
+
+<file path=ppt/notesSlides/notesSlide5.xml><?xml version="1.0" encoding="utf-8"?>
+<p:notes xmlns:a="http://schemas.openxmlformats.org/drawingml/2006/main" xmlns:r="http://schemas.openxmlformats.org/officeDocument/2006/relationships" xmlns:p="http://schemas.openxmlformats.org/presentationml/2006/main">
+  <p:cSld>
+    <p:spTree>
+      <p:nvGrpSpPr>
+        <p:cNvPr id="1" name=""/>
+        <p:cNvGrpSpPr/>
+        <p:nvPr/>
+      </p:nvGrpSpPr>
+      <p:grpSpPr>
+        <a:xfrm>
+          <a:off x="0" y="0"/>
+          <a:ext cx="0" cy="0"/>
+          <a:chOff x="0" y="0"/>
+          <a:chExt cx="0" cy="0"/>
+        </a:xfrm>
+      </p:grpSpPr>
+      <p:sp>
+        <p:nvSpPr>
+          <p:cNvPr id="2" name="Slide Image Placeholder 1"/>
+          <p:cNvSpPr>
+            <a:spLocks noGrp="1" noRot="1" noChangeAspect="1"/>
+          </p:cNvSpPr>
+          <p:nvPr>
+            <p:ph type="sldImg"/>
+          </p:nvPr>
+        </p:nvSpPr>
+        <p:spPr/>
+      </p:sp>
+      <p:sp>
+        <p:nvSpPr>
+          <p:cNvPr id="3" name="Notes Placeholder 2"/>
+          <p:cNvSpPr>
+            <a:spLocks noGrp="1"/>
+          </p:cNvSpPr>
+          <p:nvPr>
+            <p:ph type="body" idx="1"/>
+          </p:nvPr>
+        </p:nvSpPr>
+        <p:spPr/>
+        <p:txBody>
+          <a:bodyPr/>
+          <a:lstStyle/>
+          <a:p>
+            <a:pPr marL="171450" indent="-171450">
+              <a:buFont typeface="Arial"/>
+              <a:buChar char="•"/>
+            </a:pPr>
+            <a:r>
+              <a:rPr lang="en-US" dirty="0" smtClean="0"/>
+              <a:t>The simplest way to </a:t>
+            </a:r>
+          </a:p>
+          <a:p>
+            <a:pPr marL="171450" indent="-171450">
+              <a:buFont typeface="Arial"/>
+              <a:buChar char="•"/>
+            </a:pPr>
+            <a:r>
+              <a:rPr lang="en-US" dirty="0" smtClean="0"/>
+              <a:t>Javascript doesn't</a:t>
+            </a:r>
+            <a:r>
+              <a:rPr lang="en-US" baseline="0" dirty="0" smtClean="0"/>
+              <a:t> have classes, </a:t>
+            </a:r>
+          </a:p>
+          <a:p>
+            <a:pPr marL="171450" marR="0" indent="-171450" algn="l" defTabSz="457200" rtl="0" eaLnBrk="1" fontAlgn="auto" latinLnBrk="0" hangingPunct="1">
+              <a:lnSpc>
+                <a:spcPct val="100000"/>
+              </a:lnSpc>
+              <a:spcBef>
+                <a:spcPts val="0"/>
+              </a:spcBef>
+              <a:spcAft>
+                <a:spcPts val="0"/>
+              </a:spcAft>
+              <a:buClrTx/>
+              <a:buSzTx/>
+              <a:buFont typeface="Arial"/>
+              <a:buChar char="•"/>
+              <a:tabLst/>
+              <a:defRPr/>
+            </a:pPr>
+            <a:r>
+              <a:rPr lang="en-US" dirty="0" smtClean="0"/>
+              <a:t>Javascript</a:t>
+            </a:r>
+            <a:r>
+              <a:rPr lang="en-US" baseline="0" dirty="0" smtClean="0"/>
+              <a:t> objects are just collections of properties and values like a hash</a:t>
+            </a:r>
+          </a:p>
+          <a:p>
+            <a:pPr marL="171450" indent="-171450">
+              <a:buFont typeface="Arial"/>
+              <a:buChar char="•"/>
+            </a:pPr>
+            <a:r>
+              <a:rPr lang="en-US" baseline="0" dirty="0" smtClean="0"/>
+              <a:t>Dynamic</a:t>
+            </a:r>
+            <a:endParaRPr lang="en-US" dirty="0"/>
+          </a:p>
+        </p:txBody>
+      </p:sp>
+      <p:sp>
+        <p:nvSpPr>
+          <p:cNvPr id="4" name="Slide Number Placeholder 3"/>
+          <p:cNvSpPr>
+            <a:spLocks noGrp="1"/>
+          </p:cNvSpPr>
+          <p:nvPr>
+            <p:ph type="sldNum" sz="quarter" idx="10"/>
+          </p:nvPr>
+        </p:nvSpPr>
+        <p:spPr/>
+        <p:txBody>
+          <a:bodyPr/>
+          <a:lstStyle/>
+          <a:p>
+            <a:fld id="{042B0272-D6CE-D246-814F-524707BF3A24}" type="slidenum">
+              <a:rPr lang="en-US" smtClean="0"/>
+              <a:t>5</a:t>
+            </a:fld>
+            <a:endParaRPr lang="en-US"/>
+          </a:p>
+        </p:txBody>
+      </p:sp>
+    </p:spTree>
+    <p:extLst>
+      <p:ext uri="{BB962C8B-B14F-4D97-AF65-F5344CB8AC3E}">
+        <p14:creationId xmlns:p14="http://schemas.microsoft.com/office/powerpoint/2010/main" val="659445790"/>
+      </p:ext>
+    </p:extLst>
+  </p:cSld>
+  <p:clrMapOvr>
+    <a:masterClrMapping/>
+  </p:clrMapOvr>
+</p:notes>
+</file>
+
 <file path=ppt/slideLayouts/slideLayout1.xml><?xml version="1.0" encoding="utf-8"?>
 <p:sldLayout xmlns:a="http://schemas.openxmlformats.org/drawingml/2006/main" xmlns:r="http://schemas.openxmlformats.org/officeDocument/2006/relationships" xmlns:p="http://schemas.openxmlformats.org/presentationml/2006/main" type="title" preserve="1">
   <p:cSld name="Title Slide">
@@ -292,7 +1251,7 @@
           <a:p>
             <a:fld id="{941EEEFA-A69D-7E4F-8C10-C5D89C835AB2}" type="datetimeFigureOut">
               <a:rPr lang="en-US" smtClean="0"/>
-              <a:t>27/04/2013</a:t>
+              <a:t>25/05/2013</a:t>
             </a:fld>
             <a:endParaRPr lang="en-US"/>
           </a:p>
@@ -462,7 +1421,7 @@
           <a:p>
             <a:fld id="{941EEEFA-A69D-7E4F-8C10-C5D89C835AB2}" type="datetimeFigureOut">
               <a:rPr lang="en-US" smtClean="0"/>
-              <a:t>27/04/2013</a:t>
+              <a:t>25/05/2013</a:t>
             </a:fld>
             <a:endParaRPr lang="en-US"/>
           </a:p>
@@ -642,7 +1601,7 @@
           <a:p>
             <a:fld id="{941EEEFA-A69D-7E4F-8C10-C5D89C835AB2}" type="datetimeFigureOut">
               <a:rPr lang="en-US" smtClean="0"/>
-              <a:t>27/04/2013</a:t>
+              <a:t>25/05/2013</a:t>
             </a:fld>
             <a:endParaRPr lang="en-US"/>
           </a:p>
@@ -812,7 +1771,7 @@
           <a:p>
             <a:fld id="{941EEEFA-A69D-7E4F-8C10-C5D89C835AB2}" type="datetimeFigureOut">
               <a:rPr lang="en-US" smtClean="0"/>
-              <a:t>27/04/2013</a:t>
+              <a:t>25/05/2013</a:t>
             </a:fld>
             <a:endParaRPr lang="en-US"/>
           </a:p>
@@ -1058,7 +2017,7 @@
           <a:p>
             <a:fld id="{941EEEFA-A69D-7E4F-8C10-C5D89C835AB2}" type="datetimeFigureOut">
               <a:rPr lang="en-US" smtClean="0"/>
-              <a:t>27/04/2013</a:t>
+              <a:t>25/05/2013</a:t>
             </a:fld>
             <a:endParaRPr lang="en-US"/>
           </a:p>
@@ -1346,7 +2305,7 @@
           <a:p>
             <a:fld id="{941EEEFA-A69D-7E4F-8C10-C5D89C835AB2}" type="datetimeFigureOut">
               <a:rPr lang="en-US" smtClean="0"/>
-              <a:t>27/04/2013</a:t>
+              <a:t>25/05/2013</a:t>
             </a:fld>
             <a:endParaRPr lang="en-US"/>
           </a:p>
@@ -1768,7 +2727,7 @@
           <a:p>
             <a:fld id="{941EEEFA-A69D-7E4F-8C10-C5D89C835AB2}" type="datetimeFigureOut">
               <a:rPr lang="en-US" smtClean="0"/>
-              <a:t>27/04/2013</a:t>
+              <a:t>25/05/2013</a:t>
             </a:fld>
             <a:endParaRPr lang="en-US"/>
           </a:p>
@@ -1886,7 +2845,7 @@
           <a:p>
             <a:fld id="{941EEEFA-A69D-7E4F-8C10-C5D89C835AB2}" type="datetimeFigureOut">
               <a:rPr lang="en-US" smtClean="0"/>
-              <a:t>27/04/2013</a:t>
+              <a:t>25/05/2013</a:t>
             </a:fld>
             <a:endParaRPr lang="en-US"/>
           </a:p>
@@ -1981,7 +2940,7 @@
           <a:p>
             <a:fld id="{941EEEFA-A69D-7E4F-8C10-C5D89C835AB2}" type="datetimeFigureOut">
               <a:rPr lang="en-US" smtClean="0"/>
-              <a:t>27/04/2013</a:t>
+              <a:t>25/05/2013</a:t>
             </a:fld>
             <a:endParaRPr lang="en-US"/>
           </a:p>
@@ -2258,7 +3217,7 @@
           <a:p>
             <a:fld id="{941EEEFA-A69D-7E4F-8C10-C5D89C835AB2}" type="datetimeFigureOut">
               <a:rPr lang="en-US" smtClean="0"/>
-              <a:t>27/04/2013</a:t>
+              <a:t>25/05/2013</a:t>
             </a:fld>
             <a:endParaRPr lang="en-US"/>
           </a:p>
@@ -2511,7 +3470,7 @@
           <a:p>
             <a:fld id="{941EEEFA-A69D-7E4F-8C10-C5D89C835AB2}" type="datetimeFigureOut">
               <a:rPr lang="en-US" smtClean="0"/>
-              <a:t>27/04/2013</a:t>
+              <a:t>25/05/2013</a:t>
             </a:fld>
             <a:endParaRPr lang="en-US"/>
           </a:p>
@@ -2724,7 +3683,7 @@
           <a:p>
             <a:fld id="{941EEEFA-A69D-7E4F-8C10-C5D89C835AB2}" type="datetimeFigureOut">
               <a:rPr lang="en-US" smtClean="0"/>
-              <a:t>27/04/2013</a:t>
+              <a:t>25/05/2013</a:t>
             </a:fld>
             <a:endParaRPr lang="en-US"/>
           </a:p>
@@ -3196,7 +4155,7 @@
           <a:p>
             <a:r>
               <a:rPr lang="en-US" dirty="0" smtClean="0"/>
-              <a:t>Creating objects</a:t>
+              <a:t>What this session is about</a:t>
             </a:r>
             <a:endParaRPr lang="en-US" dirty="0"/>
           </a:p>
@@ -3212,33 +4171,246 @@
             <p:ph idx="1"/>
           </p:nvPr>
         </p:nvSpPr>
-        <p:spPr/>
-        <p:txBody>
-          <a:bodyPr/>
-          <a:lstStyle/>
-          <a:p>
+        <p:spPr>
+          <a:xfrm>
+            <a:off x="457200" y="1600200"/>
+            <a:ext cx="3960358" cy="4525963"/>
+          </a:xfrm>
+        </p:spPr>
+        <p:txBody>
+          <a:bodyPr/>
+          <a:lstStyle/>
+          <a:p>
+            <a:pPr marL="0" indent="0">
+              <a:buNone/>
+            </a:pPr>
             <a:r>
               <a:rPr lang="en-US" dirty="0" smtClean="0"/>
-              <a:t>Objects are just hashes</a:t>
+              <a:t>YES</a:t>
             </a:r>
           </a:p>
           <a:p>
             <a:r>
               <a:rPr lang="en-US" dirty="0" smtClean="0"/>
-              <a:t>Objects are dynamic</a:t>
+              <a:t>How the javascript language works</a:t>
             </a:r>
           </a:p>
           <a:p>
             <a:r>
               <a:rPr lang="en-US" dirty="0" smtClean="0"/>
-              <a:t>Object literal</a:t>
+              <a:t>Language features you can use to create objects</a:t>
             </a:r>
           </a:p>
           <a:p>
             <a:r>
               <a:rPr lang="en-US" dirty="0" smtClean="0"/>
-              <a:t>Constructor functions</a:t>
-            </a:r>
+              <a:t>Plain old javascript</a:t>
+            </a:r>
+          </a:p>
+          <a:p>
+            <a:endParaRPr lang="en-US" dirty="0"/>
+          </a:p>
+        </p:txBody>
+      </p:sp>
+      <p:sp>
+        <p:nvSpPr>
+          <p:cNvPr id="4" name="Content Placeholder 2"/>
+          <p:cNvSpPr txBox="1">
+            <a:spLocks/>
+          </p:cNvSpPr>
+          <p:nvPr/>
+        </p:nvSpPr>
+        <p:spPr>
+          <a:xfrm>
+            <a:off x="4804643" y="1600200"/>
+            <a:ext cx="3960358" cy="4998942"/>
+          </a:xfrm>
+          <a:prstGeom prst="rect">
+            <a:avLst/>
+          </a:prstGeom>
+        </p:spPr>
+        <p:txBody>
+          <a:bodyPr vert="horz" lIns="91440" tIns="45720" rIns="91440" bIns="45720" rtlCol="0">
+            <a:normAutofit/>
+          </a:bodyPr>
+          <a:lstStyle>
+            <a:lvl1pPr marL="342900" indent="-342900" algn="l" defTabSz="457200" rtl="0" eaLnBrk="1" latinLnBrk="0" hangingPunct="1">
+              <a:spcBef>
+                <a:spcPct val="20000"/>
+              </a:spcBef>
+              <a:buFont typeface="Arial"/>
+              <a:buChar char="•"/>
+              <a:defRPr sz="3200" kern="1200">
+                <a:solidFill>
+                  <a:schemeClr val="tx1"/>
+                </a:solidFill>
+                <a:latin typeface="+mn-lt"/>
+                <a:ea typeface="+mn-ea"/>
+                <a:cs typeface="+mn-cs"/>
+              </a:defRPr>
+            </a:lvl1pPr>
+            <a:lvl2pPr marL="742950" indent="-285750" algn="l" defTabSz="457200" rtl="0" eaLnBrk="1" latinLnBrk="0" hangingPunct="1">
+              <a:spcBef>
+                <a:spcPct val="20000"/>
+              </a:spcBef>
+              <a:buFont typeface="Arial"/>
+              <a:buChar char="–"/>
+              <a:defRPr sz="2800" kern="1200">
+                <a:solidFill>
+                  <a:schemeClr val="tx1"/>
+                </a:solidFill>
+                <a:latin typeface="+mn-lt"/>
+                <a:ea typeface="+mn-ea"/>
+                <a:cs typeface="+mn-cs"/>
+              </a:defRPr>
+            </a:lvl2pPr>
+            <a:lvl3pPr marL="1143000" indent="-228600" algn="l" defTabSz="457200" rtl="0" eaLnBrk="1" latinLnBrk="0" hangingPunct="1">
+              <a:spcBef>
+                <a:spcPct val="20000"/>
+              </a:spcBef>
+              <a:buFont typeface="Arial"/>
+              <a:buChar char="•"/>
+              <a:defRPr sz="2400" kern="1200">
+                <a:solidFill>
+                  <a:schemeClr val="tx1"/>
+                </a:solidFill>
+                <a:latin typeface="+mn-lt"/>
+                <a:ea typeface="+mn-ea"/>
+                <a:cs typeface="+mn-cs"/>
+              </a:defRPr>
+            </a:lvl3pPr>
+            <a:lvl4pPr marL="1600200" indent="-228600" algn="l" defTabSz="457200" rtl="0" eaLnBrk="1" latinLnBrk="0" hangingPunct="1">
+              <a:spcBef>
+                <a:spcPct val="20000"/>
+              </a:spcBef>
+              <a:buFont typeface="Arial"/>
+              <a:buChar char="–"/>
+              <a:defRPr sz="2000" kern="1200">
+                <a:solidFill>
+                  <a:schemeClr val="tx1"/>
+                </a:solidFill>
+                <a:latin typeface="+mn-lt"/>
+                <a:ea typeface="+mn-ea"/>
+                <a:cs typeface="+mn-cs"/>
+              </a:defRPr>
+            </a:lvl4pPr>
+            <a:lvl5pPr marL="2057400" indent="-228600" algn="l" defTabSz="457200" rtl="0" eaLnBrk="1" latinLnBrk="0" hangingPunct="1">
+              <a:spcBef>
+                <a:spcPct val="20000"/>
+              </a:spcBef>
+              <a:buFont typeface="Arial"/>
+              <a:buChar char="»"/>
+              <a:defRPr sz="2000" kern="1200">
+                <a:solidFill>
+                  <a:schemeClr val="tx1"/>
+                </a:solidFill>
+                <a:latin typeface="+mn-lt"/>
+                <a:ea typeface="+mn-ea"/>
+                <a:cs typeface="+mn-cs"/>
+              </a:defRPr>
+            </a:lvl5pPr>
+            <a:lvl6pPr marL="2514600" indent="-228600" algn="l" defTabSz="457200" rtl="0" eaLnBrk="1" latinLnBrk="0" hangingPunct="1">
+              <a:spcBef>
+                <a:spcPct val="20000"/>
+              </a:spcBef>
+              <a:buFont typeface="Arial"/>
+              <a:buChar char="•"/>
+              <a:defRPr sz="2000" kern="1200">
+                <a:solidFill>
+                  <a:schemeClr val="tx1"/>
+                </a:solidFill>
+                <a:latin typeface="+mn-lt"/>
+                <a:ea typeface="+mn-ea"/>
+                <a:cs typeface="+mn-cs"/>
+              </a:defRPr>
+            </a:lvl6pPr>
+            <a:lvl7pPr marL="2971800" indent="-228600" algn="l" defTabSz="457200" rtl="0" eaLnBrk="1" latinLnBrk="0" hangingPunct="1">
+              <a:spcBef>
+                <a:spcPct val="20000"/>
+              </a:spcBef>
+              <a:buFont typeface="Arial"/>
+              <a:buChar char="•"/>
+              <a:defRPr sz="2000" kern="1200">
+                <a:solidFill>
+                  <a:schemeClr val="tx1"/>
+                </a:solidFill>
+                <a:latin typeface="+mn-lt"/>
+                <a:ea typeface="+mn-ea"/>
+                <a:cs typeface="+mn-cs"/>
+              </a:defRPr>
+            </a:lvl7pPr>
+            <a:lvl8pPr marL="3429000" indent="-228600" algn="l" defTabSz="457200" rtl="0" eaLnBrk="1" latinLnBrk="0" hangingPunct="1">
+              <a:spcBef>
+                <a:spcPct val="20000"/>
+              </a:spcBef>
+              <a:buFont typeface="Arial"/>
+              <a:buChar char="•"/>
+              <a:defRPr sz="2000" kern="1200">
+                <a:solidFill>
+                  <a:schemeClr val="tx1"/>
+                </a:solidFill>
+                <a:latin typeface="+mn-lt"/>
+                <a:ea typeface="+mn-ea"/>
+                <a:cs typeface="+mn-cs"/>
+              </a:defRPr>
+            </a:lvl8pPr>
+            <a:lvl9pPr marL="3886200" indent="-228600" algn="l" defTabSz="457200" rtl="0" eaLnBrk="1" latinLnBrk="0" hangingPunct="1">
+              <a:spcBef>
+                <a:spcPct val="20000"/>
+              </a:spcBef>
+              <a:buFont typeface="Arial"/>
+              <a:buChar char="•"/>
+              <a:defRPr sz="2000" kern="1200">
+                <a:solidFill>
+                  <a:schemeClr val="tx1"/>
+                </a:solidFill>
+                <a:latin typeface="+mn-lt"/>
+                <a:ea typeface="+mn-ea"/>
+                <a:cs typeface="+mn-cs"/>
+              </a:defRPr>
+            </a:lvl9pPr>
+          </a:lstStyle>
+          <a:p>
+            <a:pPr marL="0" indent="0">
+              <a:buFont typeface="Arial"/>
+              <a:buNone/>
+            </a:pPr>
+            <a:r>
+              <a:rPr lang="en-US" dirty="0" smtClean="0"/>
+              <a:t>NO</a:t>
+            </a:r>
+          </a:p>
+          <a:p>
+            <a:r>
+              <a:rPr lang="en-US" dirty="0" smtClean="0"/>
+              <a:t>OO design</a:t>
+            </a:r>
+          </a:p>
+          <a:p>
+            <a:r>
+              <a:rPr lang="en-US" dirty="0" smtClean="0"/>
+              <a:t>How to structure your code</a:t>
+            </a:r>
+          </a:p>
+          <a:p>
+            <a:r>
+              <a:rPr lang="en-US" dirty="0" smtClean="0"/>
+              <a:t>Frameworks or libraries</a:t>
+            </a:r>
+          </a:p>
+          <a:p>
+            <a:r>
+              <a:rPr lang="en-US" dirty="0" smtClean="0"/>
+              <a:t>Best practice</a:t>
+            </a:r>
+          </a:p>
+          <a:p>
+            <a:r>
+              <a:rPr lang="en-US" dirty="0" smtClean="0"/>
+              <a:t>Using javascript in a browser</a:t>
+            </a:r>
+          </a:p>
+          <a:p>
             <a:endParaRPr lang="en-US" dirty="0"/>
           </a:p>
         </p:txBody>
@@ -3246,7 +4418,7 @@
     </p:spTree>
     <p:extLst>
       <p:ext uri="{BB962C8B-B14F-4D97-AF65-F5344CB8AC3E}">
-        <p14:creationId xmlns:p14="http://schemas.microsoft.com/office/powerpoint/2010/main" val="3867635517"/>
+        <p14:creationId xmlns:p14="http://schemas.microsoft.com/office/powerpoint/2010/main" val="3313612360"/>
       </p:ext>
     </p:extLst>
   </p:cSld>
@@ -3290,7 +4462,7 @@
           <a:p>
             <a:r>
               <a:rPr lang="en-US" dirty="0" smtClean="0"/>
-              <a:t>Methods</a:t>
+              <a:t>What this session is about</a:t>
             </a:r>
             <a:endParaRPr lang="en-US" dirty="0"/>
           </a:p>
@@ -3308,53 +4480,66 @@
         </p:nvSpPr>
         <p:spPr/>
         <p:txBody>
-          <a:bodyPr/>
+          <a:bodyPr>
+            <a:normAutofit fontScale="85000" lnSpcReduction="20000"/>
+          </a:bodyPr>
           <a:lstStyle/>
           <a:p>
             <a:r>
               <a:rPr lang="en-US" dirty="0" smtClean="0"/>
-              <a:t>Adding methods to objects</a:t>
-            </a:r>
-          </a:p>
-          <a:p>
+              <a:t>Creating objects</a:t>
+            </a:r>
+          </a:p>
+          <a:p>
+            <a:pPr lvl="1"/>
             <a:r>
               <a:rPr lang="en-US" dirty="0" smtClean="0"/>
-              <a:t>Functions as first class objects</a:t>
+              <a:t>The object type, object literal, dot and subscript notation, constructors</a:t>
             </a:r>
           </a:p>
           <a:p>
             <a:r>
               <a:rPr lang="en-US" dirty="0" smtClean="0"/>
-              <a:t>Function declaration </a:t>
-            </a:r>
-            <a:r>
-              <a:rPr lang="en-US" dirty="0" err="1" smtClean="0"/>
-              <a:t>vs</a:t>
-            </a:r>
+              <a:t>Public methods</a:t>
+            </a:r>
+          </a:p>
+          <a:p>
+            <a:pPr lvl="1"/>
             <a:r>
               <a:rPr lang="en-US" dirty="0" smtClean="0"/>
-              <a:t> function expression</a:t>
+              <a:t>Function as objects, function declarations and expression, hoisting, anonymous functions</a:t>
             </a:r>
           </a:p>
           <a:p>
             <a:r>
               <a:rPr lang="en-US" dirty="0" smtClean="0"/>
-              <a:t>Anonymous functions</a:t>
-            </a:r>
-          </a:p>
-          <a:p>
+              <a:t>Private methods</a:t>
+            </a:r>
+          </a:p>
+          <a:p>
+            <a:pPr lvl="1"/>
             <a:r>
               <a:rPr lang="en-US" dirty="0" smtClean="0"/>
-              <a:t>Closures</a:t>
+              <a:t>Nested functions, closures, scope</a:t>
             </a:r>
           </a:p>
           <a:p>
             <a:r>
               <a:rPr lang="en-US" dirty="0" smtClean="0"/>
-              <a:t>Method context and "this"</a:t>
-            </a:r>
-          </a:p>
-          <a:p>
+              <a:t>Method context</a:t>
+            </a:r>
+          </a:p>
+          <a:p>
+            <a:r>
+              <a:rPr lang="en-US" dirty="0" smtClean="0"/>
+              <a:t>Properties</a:t>
+            </a:r>
+          </a:p>
+          <a:p>
+            <a:r>
+              <a:rPr lang="en-US" dirty="0" smtClean="0"/>
+              <a:t>Object prototype and prototype chaining</a:t>
+            </a:r>
             <a:endParaRPr lang="en-US" dirty="0"/>
           </a:p>
         </p:txBody>
@@ -3362,7 +4547,7 @@
     </p:spTree>
     <p:extLst>
       <p:ext uri="{BB962C8B-B14F-4D97-AF65-F5344CB8AC3E}">
-        <p14:creationId xmlns:p14="http://schemas.microsoft.com/office/powerpoint/2010/main" val="2122974232"/>
+        <p14:creationId xmlns:p14="http://schemas.microsoft.com/office/powerpoint/2010/main" val="2385294734"/>
       </p:ext>
     </p:extLst>
   </p:cSld>
@@ -3406,6 +4591,436 @@
           <a:p>
             <a:r>
               <a:rPr lang="en-US" dirty="0" smtClean="0"/>
+              <a:t>Please code along!</a:t>
+            </a:r>
+            <a:endParaRPr lang="en-US" dirty="0"/>
+          </a:p>
+        </p:txBody>
+      </p:sp>
+      <p:sp>
+        <p:nvSpPr>
+          <p:cNvPr id="3" name="Content Placeholder 2"/>
+          <p:cNvSpPr>
+            <a:spLocks noGrp="1"/>
+          </p:cNvSpPr>
+          <p:nvPr>
+            <p:ph idx="1"/>
+          </p:nvPr>
+        </p:nvSpPr>
+        <p:spPr/>
+        <p:txBody>
+          <a:bodyPr>
+            <a:normAutofit lnSpcReduction="10000"/>
+          </a:bodyPr>
+          <a:lstStyle/>
+          <a:p>
+            <a:pPr marL="0" indent="0">
+              <a:buNone/>
+            </a:pPr>
+            <a:r>
+              <a:rPr lang="en-US" dirty="0" smtClean="0">
+                <a:hlinkClick r:id="rId3"/>
+              </a:rPr>
+              <a:t>http://github.com/helephant/JavascriptObject</a:t>
+            </a:r>
+            <a:endParaRPr lang="en-US" dirty="0" smtClean="0"/>
+          </a:p>
+          <a:p>
+            <a:pPr marL="0" indent="0">
+              <a:buNone/>
+            </a:pPr>
+            <a:endParaRPr lang="en-US" dirty="0"/>
+          </a:p>
+          <a:p>
+            <a:pPr marL="0" indent="0">
+              <a:buNone/>
+            </a:pPr>
+            <a:r>
+              <a:rPr lang="en-US" dirty="0" err="1" smtClean="0"/>
+              <a:t>git</a:t>
+            </a:r>
+            <a:r>
+              <a:rPr lang="en-US" dirty="0" smtClean="0"/>
+              <a:t> </a:t>
+            </a:r>
+            <a:r>
+              <a:rPr lang="en-US" dirty="0"/>
+              <a:t>clone </a:t>
+            </a:r>
+            <a:r>
+              <a:rPr lang="en-US" dirty="0" err="1"/>
+              <a:t>git</a:t>
+            </a:r>
+            <a:r>
+              <a:rPr lang="en-US" dirty="0"/>
+              <a:t>://</a:t>
+            </a:r>
+            <a:r>
+              <a:rPr lang="en-US" dirty="0" err="1"/>
+              <a:t>github.com</a:t>
+            </a:r>
+            <a:r>
+              <a:rPr lang="en-US" dirty="0"/>
+              <a:t>/</a:t>
+            </a:r>
+            <a:r>
+              <a:rPr lang="en-US" dirty="0" err="1"/>
+              <a:t>helephant</a:t>
+            </a:r>
+            <a:r>
+              <a:rPr lang="en-US" dirty="0"/>
+              <a:t>/</a:t>
+            </a:r>
+            <a:r>
+              <a:rPr lang="en-US" dirty="0" err="1" smtClean="0"/>
+              <a:t>JavascriptObjects.git</a:t>
+            </a:r>
+            <a:endParaRPr lang="en-US" dirty="0" smtClean="0"/>
+          </a:p>
+          <a:p>
+            <a:pPr marL="0" indent="0">
+              <a:buNone/>
+            </a:pPr>
+            <a:endParaRPr lang="en-US" dirty="0"/>
+          </a:p>
+          <a:p>
+            <a:pPr marL="0" indent="0">
+              <a:buNone/>
+            </a:pPr>
+            <a:r>
+              <a:rPr lang="en-US" dirty="0" smtClean="0"/>
+              <a:t>OR</a:t>
+            </a:r>
+          </a:p>
+          <a:p>
+            <a:pPr marL="0" indent="0">
+              <a:buNone/>
+            </a:pPr>
+            <a:endParaRPr lang="en-US" dirty="0"/>
+          </a:p>
+          <a:p>
+            <a:pPr marL="0" indent="0">
+              <a:buNone/>
+            </a:pPr>
+            <a:r>
+              <a:rPr lang="en-US" dirty="0" smtClean="0">
+                <a:hlinkClick r:id="rId4"/>
+              </a:rPr>
+              <a:t>http:</a:t>
+            </a:r>
+            <a:r>
+              <a:rPr lang="en-US" dirty="0">
+                <a:hlinkClick r:id="rId4"/>
+              </a:rPr>
+              <a:t>/</a:t>
+            </a:r>
+            <a:r>
+              <a:rPr lang="en-US" dirty="0" smtClean="0">
+                <a:hlinkClick r:id="rId4"/>
+              </a:rPr>
+              <a:t>/helephant.com/javascript-objects.zip</a:t>
+            </a:r>
+            <a:endParaRPr lang="en-US" dirty="0" smtClean="0"/>
+          </a:p>
+          <a:p>
+            <a:pPr marL="0" indent="0">
+              <a:buNone/>
+            </a:pPr>
+            <a:endParaRPr lang="en-US" dirty="0"/>
+          </a:p>
+          <a:p>
+            <a:pPr marL="0" indent="0">
+              <a:buNone/>
+            </a:pPr>
+            <a:endParaRPr lang="en-US" dirty="0"/>
+          </a:p>
+        </p:txBody>
+      </p:sp>
+    </p:spTree>
+    <p:extLst>
+      <p:ext uri="{BB962C8B-B14F-4D97-AF65-F5344CB8AC3E}">
+        <p14:creationId xmlns:p14="http://schemas.microsoft.com/office/powerpoint/2010/main" val="3766169293"/>
+      </p:ext>
+    </p:extLst>
+  </p:cSld>
+  <p:clrMapOvr>
+    <a:masterClrMapping/>
+  </p:clrMapOvr>
+</p:sld>
+</file>
+
+<file path=ppt/slides/slide5.xml><?xml version="1.0" encoding="utf-8"?>
+<p:sld xmlns:a="http://schemas.openxmlformats.org/drawingml/2006/main" xmlns:r="http://schemas.openxmlformats.org/officeDocument/2006/relationships" xmlns:p="http://schemas.openxmlformats.org/presentationml/2006/main">
+  <p:cSld>
+    <p:spTree>
+      <p:nvGrpSpPr>
+        <p:cNvPr id="1" name=""/>
+        <p:cNvGrpSpPr/>
+        <p:nvPr/>
+      </p:nvGrpSpPr>
+      <p:grpSpPr>
+        <a:xfrm>
+          <a:off x="0" y="0"/>
+          <a:ext cx="0" cy="0"/>
+          <a:chOff x="0" y="0"/>
+          <a:chExt cx="0" cy="0"/>
+        </a:xfrm>
+      </p:grpSpPr>
+      <p:sp>
+        <p:nvSpPr>
+          <p:cNvPr id="2" name="Title 1"/>
+          <p:cNvSpPr>
+            <a:spLocks noGrp="1"/>
+          </p:cNvSpPr>
+          <p:nvPr>
+            <p:ph type="title"/>
+          </p:nvPr>
+        </p:nvSpPr>
+        <p:spPr/>
+        <p:txBody>
+          <a:bodyPr/>
+          <a:lstStyle/>
+          <a:p>
+            <a:r>
+              <a:rPr lang="en-US" dirty="0" smtClean="0"/>
+              <a:t>Creating objects</a:t>
+            </a:r>
+            <a:endParaRPr lang="en-US" dirty="0"/>
+          </a:p>
+        </p:txBody>
+      </p:sp>
+      <p:sp>
+        <p:nvSpPr>
+          <p:cNvPr id="3" name="Content Placeholder 2"/>
+          <p:cNvSpPr>
+            <a:spLocks noGrp="1"/>
+          </p:cNvSpPr>
+          <p:nvPr>
+            <p:ph idx="1"/>
+          </p:nvPr>
+        </p:nvSpPr>
+        <p:spPr/>
+        <p:txBody>
+          <a:bodyPr/>
+          <a:lstStyle/>
+          <a:p>
+            <a:r>
+              <a:rPr lang="en-US" dirty="0" smtClean="0"/>
+              <a:t>Objects are just hashes</a:t>
+            </a:r>
+          </a:p>
+          <a:p>
+            <a:r>
+              <a:rPr lang="en-US" dirty="0" smtClean="0"/>
+              <a:t>Dot </a:t>
+            </a:r>
+            <a:r>
+              <a:rPr lang="en-US" dirty="0" err="1" smtClean="0"/>
+              <a:t>vs</a:t>
+            </a:r>
+            <a:r>
+              <a:rPr lang="en-US" dirty="0" smtClean="0"/>
+              <a:t> subscript notation</a:t>
+            </a:r>
+          </a:p>
+          <a:p>
+            <a:r>
+              <a:rPr lang="en-US" dirty="0" smtClean="0"/>
+              <a:t>Object literal</a:t>
+            </a:r>
+          </a:p>
+          <a:p>
+            <a:r>
+              <a:rPr lang="en-US" dirty="0" smtClean="0"/>
+              <a:t>Objects are dynamic</a:t>
+            </a:r>
+          </a:p>
+          <a:p>
+            <a:r>
+              <a:rPr lang="en-US" dirty="0" smtClean="0"/>
+              <a:t>Constructor functions</a:t>
+            </a:r>
+            <a:endParaRPr lang="en-US" dirty="0"/>
+          </a:p>
+        </p:txBody>
+      </p:sp>
+    </p:spTree>
+    <p:extLst>
+      <p:ext uri="{BB962C8B-B14F-4D97-AF65-F5344CB8AC3E}">
+        <p14:creationId xmlns:p14="http://schemas.microsoft.com/office/powerpoint/2010/main" val="3867635517"/>
+      </p:ext>
+    </p:extLst>
+  </p:cSld>
+  <p:clrMapOvr>
+    <a:masterClrMapping/>
+  </p:clrMapOvr>
+  <p:timing>
+    <p:tnLst>
+      <p:par>
+        <p:cTn xmlns:p14="http://schemas.microsoft.com/office/powerpoint/2010/main" id="1" dur="indefinite" restart="never" nodeType="tmRoot"/>
+      </p:par>
+    </p:tnLst>
+  </p:timing>
+</p:sld>
+</file>
+
+<file path=ppt/slides/slide6.xml><?xml version="1.0" encoding="utf-8"?>
+<p:sld xmlns:a="http://schemas.openxmlformats.org/drawingml/2006/main" xmlns:r="http://schemas.openxmlformats.org/officeDocument/2006/relationships" xmlns:p="http://schemas.openxmlformats.org/presentationml/2006/main">
+  <p:cSld>
+    <p:spTree>
+      <p:nvGrpSpPr>
+        <p:cNvPr id="1" name=""/>
+        <p:cNvGrpSpPr/>
+        <p:nvPr/>
+      </p:nvGrpSpPr>
+      <p:grpSpPr>
+        <a:xfrm>
+          <a:off x="0" y="0"/>
+          <a:ext cx="0" cy="0"/>
+          <a:chOff x="0" y="0"/>
+          <a:chExt cx="0" cy="0"/>
+        </a:xfrm>
+      </p:grpSpPr>
+      <p:sp>
+        <p:nvSpPr>
+          <p:cNvPr id="2" name="Title 1"/>
+          <p:cNvSpPr>
+            <a:spLocks noGrp="1"/>
+          </p:cNvSpPr>
+          <p:nvPr>
+            <p:ph type="title"/>
+          </p:nvPr>
+        </p:nvSpPr>
+        <p:spPr/>
+        <p:txBody>
+          <a:bodyPr/>
+          <a:lstStyle/>
+          <a:p>
+            <a:r>
+              <a:rPr lang="en-US" dirty="0" smtClean="0"/>
+              <a:t>Methods</a:t>
+            </a:r>
+            <a:endParaRPr lang="en-US" dirty="0"/>
+          </a:p>
+        </p:txBody>
+      </p:sp>
+      <p:sp>
+        <p:nvSpPr>
+          <p:cNvPr id="3" name="Content Placeholder 2"/>
+          <p:cNvSpPr>
+            <a:spLocks noGrp="1"/>
+          </p:cNvSpPr>
+          <p:nvPr>
+            <p:ph idx="1"/>
+          </p:nvPr>
+        </p:nvSpPr>
+        <p:spPr/>
+        <p:txBody>
+          <a:bodyPr/>
+          <a:lstStyle/>
+          <a:p>
+            <a:r>
+              <a:rPr lang="en-US" dirty="0" smtClean="0"/>
+              <a:t>Adding methods to objects</a:t>
+            </a:r>
+          </a:p>
+          <a:p>
+            <a:r>
+              <a:rPr lang="en-US" dirty="0" smtClean="0"/>
+              <a:t>Functions as first class objects</a:t>
+            </a:r>
+          </a:p>
+          <a:p>
+            <a:r>
+              <a:rPr lang="en-US" dirty="0" smtClean="0"/>
+              <a:t>Function declaration </a:t>
+            </a:r>
+            <a:r>
+              <a:rPr lang="en-US" dirty="0" err="1" smtClean="0"/>
+              <a:t>vs</a:t>
+            </a:r>
+            <a:r>
+              <a:rPr lang="en-US" dirty="0" smtClean="0"/>
+              <a:t> function expression</a:t>
+            </a:r>
+          </a:p>
+          <a:p>
+            <a:r>
+              <a:rPr lang="en-US" dirty="0" smtClean="0"/>
+              <a:t>Anonymous functions</a:t>
+            </a:r>
+          </a:p>
+          <a:p>
+            <a:r>
+              <a:rPr lang="en-US" dirty="0" smtClean="0"/>
+              <a:t>Closures</a:t>
+            </a:r>
+          </a:p>
+          <a:p>
+            <a:r>
+              <a:rPr lang="en-US" dirty="0" smtClean="0"/>
+              <a:t>Method context and "this"</a:t>
+            </a:r>
+          </a:p>
+          <a:p>
+            <a:endParaRPr lang="en-US" dirty="0"/>
+          </a:p>
+        </p:txBody>
+      </p:sp>
+    </p:spTree>
+    <p:extLst>
+      <p:ext uri="{BB962C8B-B14F-4D97-AF65-F5344CB8AC3E}">
+        <p14:creationId xmlns:p14="http://schemas.microsoft.com/office/powerpoint/2010/main" val="2122974232"/>
+      </p:ext>
+    </p:extLst>
+  </p:cSld>
+  <p:clrMapOvr>
+    <a:masterClrMapping/>
+  </p:clrMapOvr>
+  <p:timing>
+    <p:tnLst>
+      <p:par>
+        <p:cTn xmlns:p14="http://schemas.microsoft.com/office/powerpoint/2010/main" id="1" dur="indefinite" restart="never" nodeType="tmRoot"/>
+      </p:par>
+    </p:tnLst>
+  </p:timing>
+</p:sld>
+</file>
+
+<file path=ppt/slides/slide7.xml><?xml version="1.0" encoding="utf-8"?>
+<p:sld xmlns:a="http://schemas.openxmlformats.org/drawingml/2006/main" xmlns:r="http://schemas.openxmlformats.org/officeDocument/2006/relationships" xmlns:p="http://schemas.openxmlformats.org/presentationml/2006/main">
+  <p:cSld>
+    <p:spTree>
+      <p:nvGrpSpPr>
+        <p:cNvPr id="1" name=""/>
+        <p:cNvGrpSpPr/>
+        <p:nvPr/>
+      </p:nvGrpSpPr>
+      <p:grpSpPr>
+        <a:xfrm>
+          <a:off x="0" y="0"/>
+          <a:ext cx="0" cy="0"/>
+          <a:chOff x="0" y="0"/>
+          <a:chExt cx="0" cy="0"/>
+        </a:xfrm>
+      </p:grpSpPr>
+      <p:sp>
+        <p:nvSpPr>
+          <p:cNvPr id="2" name="Title 1"/>
+          <p:cNvSpPr>
+            <a:spLocks noGrp="1"/>
+          </p:cNvSpPr>
+          <p:nvPr>
+            <p:ph type="title"/>
+          </p:nvPr>
+        </p:nvSpPr>
+        <p:spPr/>
+        <p:txBody>
+          <a:bodyPr/>
+          <a:lstStyle/>
+          <a:p>
+            <a:r>
+              <a:rPr lang="en-US" dirty="0" smtClean="0"/>
               <a:t>Inheritance javascript style</a:t>
             </a:r>
             <a:endParaRPr lang="en-US" dirty="0"/>
@@ -3451,10 +5066,17 @@
   <p:clrMapOvr>
     <a:masterClrMapping/>
   </p:clrMapOvr>
+  <p:timing>
+    <p:tnLst>
+      <p:par>
+        <p:cTn xmlns:p14="http://schemas.microsoft.com/office/powerpoint/2010/main" id="1" dur="indefinite" restart="never" nodeType="tmRoot"/>
+      </p:par>
+    </p:tnLst>
+  </p:timing>
 </p:sld>
 </file>
 
-<file path=ppt/slides/slide5.xml><?xml version="1.0" encoding="utf-8"?>
+<file path=ppt/slides/slide8.xml><?xml version="1.0" encoding="utf-8"?>
 <p:sld xmlns:a="http://schemas.openxmlformats.org/drawingml/2006/main" xmlns:r="http://schemas.openxmlformats.org/officeDocument/2006/relationships" xmlns:p="http://schemas.openxmlformats.org/presentationml/2006/main">
   <p:cSld>
     <p:spTree>
@@ -3844,4 +5466,324 @@
   </a:objectDefaults>
   <a:extraClrSchemeLst/>
 </a:theme>
+</file>
+
+<file path=ppt/theme/theme2.xml><?xml version="1.0" encoding="utf-8"?>
+<a:theme xmlns:a="http://schemas.openxmlformats.org/drawingml/2006/main" name="Office Theme">
+  <a:themeElements>
+    <a:clrScheme name="Office">
+      <a:dk1>
+        <a:sysClr val="windowText" lastClr="000000"/>
+      </a:dk1>
+      <a:lt1>
+        <a:sysClr val="window" lastClr="FFFFFF"/>
+      </a:lt1>
+      <a:dk2>
+        <a:srgbClr val="1F497D"/>
+      </a:dk2>
+      <a:lt2>
+        <a:srgbClr val="EEECE1"/>
+      </a:lt2>
+      <a:accent1>
+        <a:srgbClr val="4F81BD"/>
+      </a:accent1>
+      <a:accent2>
+        <a:srgbClr val="C0504D"/>
+      </a:accent2>
+      <a:accent3>
+        <a:srgbClr val="9BBB59"/>
+      </a:accent3>
+      <a:accent4>
+        <a:srgbClr val="8064A2"/>
+      </a:accent4>
+      <a:accent5>
+        <a:srgbClr val="4BACC6"/>
+      </a:accent5>
+      <a:accent6>
+        <a:srgbClr val="F79646"/>
+      </a:accent6>
+      <a:hlink>
+        <a:srgbClr val="0000FF"/>
+      </a:hlink>
+      <a:folHlink>
+        <a:srgbClr val="800080"/>
+      </a:folHlink>
+    </a:clrScheme>
+    <a:fontScheme name="Office">
+      <a:majorFont>
+        <a:latin typeface="Calibri"/>
+        <a:ea typeface=""/>
+        <a:cs typeface=""/>
+        <a:font script="Jpan" typeface="ＭＳ Ｐゴシック"/>
+        <a:font script="Hang" typeface="맑은 고딕"/>
+        <a:font script="Hans" typeface="宋体"/>
+        <a:font script="Hant" typeface="新細明體"/>
+        <a:font script="Arab" typeface="Times New Roman"/>
+        <a:font script="Hebr" typeface="Times New Roman"/>
+        <a:font script="Thai" typeface="Angsana New"/>
+        <a:font script="Ethi" typeface="Nyala"/>
+        <a:font script="Beng" typeface="Vrinda"/>
+        <a:font script="Gujr" typeface="Shruti"/>
+        <a:font script="Khmr" typeface="MoolBoran"/>
+        <a:font script="Knda" typeface="Tunga"/>
+        <a:font script="Guru" typeface="Raavi"/>
+        <a:font script="Cans" typeface="Euphemia"/>
+        <a:font script="Cher" typeface="Plantagenet Cherokee"/>
+        <a:font script="Yiii" typeface="Microsoft Yi Baiti"/>
+        <a:font script="Tibt" typeface="Microsoft Himalaya"/>
+        <a:font script="Thaa" typeface="MV Boli"/>
+        <a:font script="Deva" typeface="Mangal"/>
+        <a:font script="Telu" typeface="Gautami"/>
+        <a:font script="Taml" typeface="Latha"/>
+        <a:font script="Syrc" typeface="Estrangelo Edessa"/>
+        <a:font script="Orya" typeface="Kalinga"/>
+        <a:font script="Mlym" typeface="Kartika"/>
+        <a:font script="Laoo" typeface="DokChampa"/>
+        <a:font script="Sinh" typeface="Iskoola Pota"/>
+        <a:font script="Mong" typeface="Mongolian Baiti"/>
+        <a:font script="Viet" typeface="Times New Roman"/>
+        <a:font script="Uigh" typeface="Microsoft Uighur"/>
+        <a:font script="Geor" typeface="Sylfaen"/>
+      </a:majorFont>
+      <a:minorFont>
+        <a:latin typeface="Calibri"/>
+        <a:ea typeface=""/>
+        <a:cs typeface=""/>
+        <a:font script="Jpan" typeface="ＭＳ Ｐゴシック"/>
+        <a:font script="Hang" typeface="맑은 고딕"/>
+        <a:font script="Hans" typeface="宋体"/>
+        <a:font script="Hant" typeface="新細明體"/>
+        <a:font script="Arab" typeface="Arial"/>
+        <a:font script="Hebr" typeface="Arial"/>
+        <a:font script="Thai" typeface="Cordia New"/>
+        <a:font script="Ethi" typeface="Nyala"/>
+        <a:font script="Beng" typeface="Vrinda"/>
+        <a:font script="Gujr" typeface="Shruti"/>
+        <a:font script="Khmr" typeface="DaunPenh"/>
+        <a:font script="Knda" typeface="Tunga"/>
+        <a:font script="Guru" typeface="Raavi"/>
+        <a:font script="Cans" typeface="Euphemia"/>
+        <a:font script="Cher" typeface="Plantagenet Cherokee"/>
+        <a:font script="Yiii" typeface="Microsoft Yi Baiti"/>
+        <a:font script="Tibt" typeface="Microsoft Himalaya"/>
+        <a:font script="Thaa" typeface="MV Boli"/>
+        <a:font script="Deva" typeface="Mangal"/>
+        <a:font script="Telu" typeface="Gautami"/>
+        <a:font script="Taml" typeface="Latha"/>
+        <a:font script="Syrc" typeface="Estrangelo Edessa"/>
+        <a:font script="Orya" typeface="Kalinga"/>
+        <a:font script="Mlym" typeface="Kartika"/>
+        <a:font script="Laoo" typeface="DokChampa"/>
+        <a:font script="Sinh" typeface="Iskoola Pota"/>
+        <a:font script="Mong" typeface="Mongolian Baiti"/>
+        <a:font script="Viet" typeface="Arial"/>
+        <a:font script="Uigh" typeface="Microsoft Uighur"/>
+        <a:font script="Geor" typeface="Sylfaen"/>
+      </a:minorFont>
+    </a:fontScheme>
+    <a:fmtScheme name="Office">
+      <a:fillStyleLst>
+        <a:solidFill>
+          <a:schemeClr val="phClr"/>
+        </a:solidFill>
+        <a:gradFill rotWithShape="1">
+          <a:gsLst>
+            <a:gs pos="0">
+              <a:schemeClr val="phClr">
+                <a:tint val="50000"/>
+                <a:satMod val="300000"/>
+              </a:schemeClr>
+            </a:gs>
+            <a:gs pos="35000">
+              <a:schemeClr val="phClr">
+                <a:tint val="37000"/>
+                <a:satMod val="300000"/>
+              </a:schemeClr>
+            </a:gs>
+            <a:gs pos="100000">
+              <a:schemeClr val="phClr">
+                <a:tint val="15000"/>
+                <a:satMod val="350000"/>
+              </a:schemeClr>
+            </a:gs>
+          </a:gsLst>
+          <a:lin ang="16200000" scaled="1"/>
+        </a:gradFill>
+        <a:gradFill rotWithShape="1">
+          <a:gsLst>
+            <a:gs pos="0">
+              <a:schemeClr val="phClr">
+                <a:tint val="100000"/>
+                <a:shade val="100000"/>
+                <a:satMod val="130000"/>
+              </a:schemeClr>
+            </a:gs>
+            <a:gs pos="100000">
+              <a:schemeClr val="phClr">
+                <a:tint val="50000"/>
+                <a:shade val="100000"/>
+                <a:satMod val="350000"/>
+              </a:schemeClr>
+            </a:gs>
+          </a:gsLst>
+          <a:lin ang="16200000" scaled="0"/>
+        </a:gradFill>
+      </a:fillStyleLst>
+      <a:lnStyleLst>
+        <a:ln w="9525" cap="flat" cmpd="sng" algn="ctr">
+          <a:solidFill>
+            <a:schemeClr val="phClr">
+              <a:shade val="95000"/>
+              <a:satMod val="105000"/>
+            </a:schemeClr>
+          </a:solidFill>
+          <a:prstDash val="solid"/>
+        </a:ln>
+        <a:ln w="25400" cap="flat" cmpd="sng" algn="ctr">
+          <a:solidFill>
+            <a:schemeClr val="phClr"/>
+          </a:solidFill>
+          <a:prstDash val="solid"/>
+        </a:ln>
+        <a:ln w="38100" cap="flat" cmpd="sng" algn="ctr">
+          <a:solidFill>
+            <a:schemeClr val="phClr"/>
+          </a:solidFill>
+          <a:prstDash val="solid"/>
+        </a:ln>
+      </a:lnStyleLst>
+      <a:effectStyleLst>
+        <a:effectStyle>
+          <a:effectLst>
+            <a:outerShdw blurRad="40000" dist="20000" dir="5400000" rotWithShape="0">
+              <a:srgbClr val="000000">
+                <a:alpha val="38000"/>
+              </a:srgbClr>
+            </a:outerShdw>
+          </a:effectLst>
+        </a:effectStyle>
+        <a:effectStyle>
+          <a:effectLst>
+            <a:outerShdw blurRad="40000" dist="23000" dir="5400000" rotWithShape="0">
+              <a:srgbClr val="000000">
+                <a:alpha val="35000"/>
+              </a:srgbClr>
+            </a:outerShdw>
+          </a:effectLst>
+        </a:effectStyle>
+        <a:effectStyle>
+          <a:effectLst>
+            <a:outerShdw blurRad="40000" dist="23000" dir="5400000" rotWithShape="0">
+              <a:srgbClr val="000000">
+                <a:alpha val="35000"/>
+              </a:srgbClr>
+            </a:outerShdw>
+          </a:effectLst>
+          <a:scene3d>
+            <a:camera prst="orthographicFront">
+              <a:rot lat="0" lon="0" rev="0"/>
+            </a:camera>
+            <a:lightRig rig="threePt" dir="t">
+              <a:rot lat="0" lon="0" rev="1200000"/>
+            </a:lightRig>
+          </a:scene3d>
+          <a:sp3d>
+            <a:bevelT w="63500" h="25400"/>
+          </a:sp3d>
+        </a:effectStyle>
+      </a:effectStyleLst>
+      <a:bgFillStyleLst>
+        <a:solidFill>
+          <a:schemeClr val="phClr"/>
+        </a:solidFill>
+        <a:gradFill rotWithShape="1">
+          <a:gsLst>
+            <a:gs pos="0">
+              <a:schemeClr val="phClr">
+                <a:tint val="40000"/>
+                <a:satMod val="350000"/>
+              </a:schemeClr>
+            </a:gs>
+            <a:gs pos="40000">
+              <a:schemeClr val="phClr">
+                <a:tint val="45000"/>
+                <a:shade val="99000"/>
+                <a:satMod val="350000"/>
+              </a:schemeClr>
+            </a:gs>
+            <a:gs pos="100000">
+              <a:schemeClr val="phClr">
+                <a:shade val="20000"/>
+                <a:satMod val="255000"/>
+              </a:schemeClr>
+            </a:gs>
+          </a:gsLst>
+          <a:path path="circle">
+            <a:fillToRect l="50000" t="-80000" r="50000" b="180000"/>
+          </a:path>
+        </a:gradFill>
+        <a:gradFill rotWithShape="1">
+          <a:gsLst>
+            <a:gs pos="0">
+              <a:schemeClr val="phClr">
+                <a:tint val="80000"/>
+                <a:satMod val="300000"/>
+              </a:schemeClr>
+            </a:gs>
+            <a:gs pos="100000">
+              <a:schemeClr val="phClr">
+                <a:shade val="30000"/>
+                <a:satMod val="200000"/>
+              </a:schemeClr>
+            </a:gs>
+          </a:gsLst>
+          <a:path path="circle">
+            <a:fillToRect l="50000" t="50000" r="50000" b="50000"/>
+          </a:path>
+        </a:gradFill>
+      </a:bgFillStyleLst>
+    </a:fmtScheme>
+  </a:themeElements>
+  <a:objectDefaults>
+    <a:spDef>
+      <a:spPr/>
+      <a:bodyPr/>
+      <a:lstStyle/>
+      <a:style>
+        <a:lnRef idx="1">
+          <a:schemeClr val="accent1"/>
+        </a:lnRef>
+        <a:fillRef idx="3">
+          <a:schemeClr val="accent1"/>
+        </a:fillRef>
+        <a:effectRef idx="2">
+          <a:schemeClr val="accent1"/>
+        </a:effectRef>
+        <a:fontRef idx="minor">
+          <a:schemeClr val="lt1"/>
+        </a:fontRef>
+      </a:style>
+    </a:spDef>
+    <a:lnDef>
+      <a:spPr/>
+      <a:bodyPr/>
+      <a:lstStyle/>
+      <a:style>
+        <a:lnRef idx="2">
+          <a:schemeClr val="accent1"/>
+        </a:lnRef>
+        <a:fillRef idx="0">
+          <a:schemeClr val="accent1"/>
+        </a:fillRef>
+        <a:effectRef idx="1">
+          <a:schemeClr val="accent1"/>
+        </a:effectRef>
+        <a:fontRef idx="minor">
+          <a:schemeClr val="tx1"/>
+        </a:fontRef>
+      </a:style>
+    </a:lnDef>
+  </a:objectDefaults>
+  <a:extraClrSchemeLst/>
+</a:theme>
 </file>
</xml_diff>

<commit_message>
notes for creating objects section.. added examples of not using new with a constructor function
</commit_message>
<xml_diff>
--- a/javascript-objects.pptx
+++ b/javascript-objects.pptx
@@ -513,6 +513,28 @@
           <a:p>
             <a:r>
               <a:rPr lang="en-US" dirty="0" smtClean="0"/>
+              <a:t>If you are a web developer,</a:t>
+            </a:r>
+            <a:r>
+              <a:rPr lang="en-US" baseline="0" dirty="0" smtClean="0"/>
+              <a:t> javascript is pretty hard to get away from. It is the default choice in the browser and </a:t>
+            </a:r>
+            <a:r>
+              <a:rPr lang="en-US" baseline="0" dirty="0" err="1" smtClean="0"/>
+              <a:t>node.js</a:t>
+            </a:r>
+            <a:r>
+              <a:rPr lang="en-US" baseline="0" dirty="0" smtClean="0"/>
+              <a:t> means it has a following on the server side as well. </a:t>
+            </a:r>
+            <a:endParaRPr lang="en-US" dirty="0" smtClean="0"/>
+          </a:p>
+          <a:p>
+            <a:endParaRPr lang="en-US" dirty="0" smtClean="0"/>
+          </a:p>
+          <a:p>
+            <a:r>
+              <a:rPr lang="en-US" dirty="0" smtClean="0"/>
               <a:t>Helen Emerson</a:t>
             </a:r>
           </a:p>
@@ -977,7 +999,19 @@
             </a:pPr>
             <a:r>
               <a:rPr lang="en-US" dirty="0" smtClean="0"/>
-              <a:t>The simplest way to </a:t>
+              <a:t>Javascript objects are just collections</a:t>
+            </a:r>
+            <a:r>
+              <a:rPr lang="en-US" baseline="0" dirty="0" smtClean="0"/>
+              <a:t> of key/value pairs like a </a:t>
+            </a:r>
+            <a:r>
+              <a:rPr lang="en-US" baseline="0" dirty="0" err="1" smtClean="0"/>
+              <a:t>hashtable</a:t>
+            </a:r>
+            <a:r>
+              <a:rPr lang="en-US" baseline="0" dirty="0" smtClean="0"/>
+              <a:t>. Methods are just properties that contain a function. </a:t>
             </a:r>
           </a:p>
           <a:p>
@@ -986,51 +1020,300 @@
               <a:buChar char="•"/>
             </a:pPr>
             <a:r>
-              <a:rPr lang="en-US" dirty="0" smtClean="0"/>
-              <a:t>Javascript doesn't</a:t>
-            </a:r>
-            <a:r>
               <a:rPr lang="en-US" baseline="0" dirty="0" smtClean="0"/>
-              <a:t> have classes, </a:t>
-            </a:r>
-          </a:p>
-          <a:p>
-            <a:pPr marL="171450" marR="0" indent="-171450" algn="l" defTabSz="457200" rtl="0" eaLnBrk="1" fontAlgn="auto" latinLnBrk="0" hangingPunct="1">
-              <a:lnSpc>
-                <a:spcPct val="100000"/>
-              </a:lnSpc>
-              <a:spcBef>
-                <a:spcPts val="0"/>
-              </a:spcBef>
-              <a:spcAft>
-                <a:spcPts val="0"/>
-              </a:spcAft>
-              <a:buClrTx/>
-              <a:buSzTx/>
+              <a:t>The Object type</a:t>
+            </a:r>
+          </a:p>
+          <a:p>
+            <a:pPr marL="628650" lvl="1" indent="-171450">
               <a:buFont typeface="Arial"/>
               <a:buChar char="•"/>
-              <a:tabLst/>
-              <a:defRPr/>
             </a:pPr>
             <a:r>
-              <a:rPr lang="en-US" dirty="0" smtClean="0"/>
-              <a:t>Javascript</a:t>
-            </a:r>
-            <a:r>
               <a:rPr lang="en-US" baseline="0" dirty="0" smtClean="0"/>
-              <a:t> objects are just collections of properties and values like a hash</a:t>
-            </a:r>
+              <a:t>DEMO: declare object and assign properties</a:t>
+            </a:r>
+          </a:p>
+          <a:p>
+            <a:pPr marL="628650" lvl="1" indent="-171450">
+              <a:buFont typeface="Arial"/>
+              <a:buChar char="•"/>
+            </a:pPr>
+            <a:r>
+              <a:rPr lang="en-US" baseline="0" dirty="0" smtClean="0"/>
+              <a:t>TODO: object based, not class based. </a:t>
+            </a:r>
+          </a:p>
+          <a:p>
+            <a:pPr marL="628650" lvl="1" indent="-171450">
+              <a:buFont typeface="Arial"/>
+              <a:buChar char="•"/>
+            </a:pPr>
+            <a:r>
+              <a:rPr lang="en-US" baseline="0" dirty="0" smtClean="0"/>
+              <a:t>Dynamic and weakly typed. </a:t>
+            </a:r>
+          </a:p>
+          <a:p>
+            <a:pPr marL="628650" lvl="1" indent="-171450">
+              <a:buFont typeface="Arial"/>
+              <a:buChar char="•"/>
+            </a:pPr>
+            <a:r>
+              <a:rPr lang="en-US" baseline="0" dirty="0" smtClean="0"/>
+              <a:t>TODO: what does the dynamic nature of javascript really mean?</a:t>
+            </a:r>
+          </a:p>
+          <a:p>
+            <a:pPr marL="628650" lvl="1" indent="-171450">
+              <a:buFont typeface="Arial"/>
+              <a:buChar char="•"/>
+            </a:pPr>
+            <a:r>
+              <a:rPr lang="en-US" baseline="0" dirty="0" smtClean="0"/>
+              <a:t>DEMO: </a:t>
+            </a:r>
+            <a:r>
+              <a:rPr lang="en-US" baseline="0" dirty="0" err="1" smtClean="0"/>
+              <a:t>for..in</a:t>
+            </a:r>
+            <a:r>
+              <a:rPr lang="en-US" baseline="0" dirty="0" smtClean="0"/>
+              <a:t> example</a:t>
+            </a:r>
+          </a:p>
+          <a:p>
+            <a:pPr marL="171450" lvl="0" indent="-171450">
+              <a:buFont typeface="Arial"/>
+              <a:buChar char="•"/>
+            </a:pPr>
+            <a:r>
+              <a:rPr lang="en-US" baseline="0" dirty="0" smtClean="0"/>
+              <a:t>Dot syntax </a:t>
+            </a:r>
+            <a:r>
+              <a:rPr lang="en-US" baseline="0" dirty="0" err="1" smtClean="0"/>
+              <a:t>vs</a:t>
+            </a:r>
+            <a:r>
+              <a:rPr lang="en-US" baseline="0" dirty="0" smtClean="0"/>
+              <a:t> subscript syntax</a:t>
+            </a:r>
+          </a:p>
+          <a:p>
+            <a:pPr marL="628650" lvl="1" indent="-171450">
+              <a:buFont typeface="Arial"/>
+              <a:buChar char="•"/>
+            </a:pPr>
+            <a:r>
+              <a:rPr lang="en-US" baseline="0" dirty="0" smtClean="0"/>
+              <a:t>Demo</a:t>
+            </a:r>
+          </a:p>
+          <a:p>
+            <a:pPr marL="171450" lvl="0" indent="-171450">
+              <a:buFont typeface="Arial"/>
+              <a:buChar char="•"/>
+            </a:pPr>
+            <a:r>
+              <a:rPr lang="en-US" baseline="0" dirty="0" smtClean="0"/>
+              <a:t>Object literal</a:t>
+            </a:r>
+          </a:p>
+          <a:p>
+            <a:pPr marL="628650" lvl="1" indent="-171450">
+              <a:buFont typeface="Arial"/>
+              <a:buChar char="•"/>
+            </a:pPr>
+            <a:r>
+              <a:rPr lang="en-US" baseline="0" dirty="0" smtClean="0"/>
+              <a:t>TODO: what does the object literal really mean?</a:t>
+            </a:r>
+          </a:p>
+          <a:p>
+            <a:pPr marL="628650" lvl="1" indent="-171450">
+              <a:buFont typeface="Arial"/>
+              <a:buChar char="•"/>
+            </a:pPr>
+            <a:r>
+              <a:rPr lang="en-US" baseline="0" dirty="0" smtClean="0"/>
+              <a:t>Exactly the same as using the Object type, just more </a:t>
+            </a:r>
+            <a:r>
+              <a:rPr lang="en-US" baseline="0" dirty="0" err="1" smtClean="0"/>
+              <a:t>consise</a:t>
+            </a:r>
+            <a:endParaRPr lang="en-US" baseline="0" dirty="0" smtClean="0"/>
+          </a:p>
+          <a:p>
+            <a:pPr marL="628650" lvl="1" indent="-171450">
+              <a:buFont typeface="Arial"/>
+              <a:buChar char="•"/>
+            </a:pPr>
+            <a:r>
+              <a:rPr lang="en-US" baseline="0" dirty="0" smtClean="0"/>
+              <a:t>JSON</a:t>
+            </a:r>
+          </a:p>
+          <a:p>
+            <a:pPr marL="628650" lvl="1" indent="-171450">
+              <a:buFont typeface="Arial"/>
+              <a:buChar char="•"/>
+            </a:pPr>
+            <a:r>
+              <a:rPr lang="en-US" baseline="0" dirty="0" smtClean="0"/>
+              <a:t>Can use object literal and then assign properties</a:t>
+            </a:r>
+          </a:p>
+          <a:p>
+            <a:pPr marL="171450" lvl="0" indent="-171450">
+              <a:buFont typeface="Arial"/>
+              <a:buChar char="•"/>
+            </a:pPr>
+            <a:r>
+              <a:rPr lang="en-US" baseline="0" dirty="0" smtClean="0"/>
+              <a:t>One off objects like this are really useful</a:t>
+            </a:r>
+          </a:p>
+          <a:p>
+            <a:pPr marL="628650" lvl="1" indent="-171450">
+              <a:buFont typeface="Arial"/>
+              <a:buChar char="•"/>
+            </a:pPr>
+            <a:r>
+              <a:rPr lang="en-US" baseline="0" dirty="0" smtClean="0"/>
+              <a:t>Pass around group of related variables</a:t>
+            </a:r>
+          </a:p>
+          <a:p>
+            <a:pPr marL="171450" lvl="0" indent="-171450">
+              <a:buFont typeface="Arial"/>
+              <a:buChar char="•"/>
+            </a:pPr>
+            <a:r>
+              <a:rPr lang="en-US" baseline="0" dirty="0" smtClean="0"/>
+              <a:t>Constructor functions</a:t>
+            </a:r>
+          </a:p>
+          <a:p>
+            <a:pPr marL="628650" lvl="1" indent="-171450">
+              <a:buFont typeface="Arial"/>
+              <a:buChar char="•"/>
+            </a:pPr>
+            <a:r>
+              <a:rPr lang="en-US" baseline="0" dirty="0" smtClean="0"/>
+              <a:t>Object literal is great for one off objects but sometimes you want to mass produce objects with the same properties and methods</a:t>
+            </a:r>
+          </a:p>
+          <a:p>
+            <a:pPr marL="628650" lvl="1" indent="-171450">
+              <a:buFont typeface="Arial"/>
+              <a:buChar char="•"/>
+            </a:pPr>
+            <a:r>
+              <a:rPr lang="en-US" baseline="0" dirty="0" smtClean="0"/>
+              <a:t>Constructor functions are just functions that set up objects. They aren't special language constructs like classes are in C#. </a:t>
+            </a:r>
+          </a:p>
+          <a:p>
+            <a:pPr marL="1085850" lvl="2" indent="-171450">
+              <a:buFont typeface="Arial"/>
+              <a:buChar char="•"/>
+            </a:pPr>
+            <a:r>
+              <a:rPr lang="en-US" baseline="0" dirty="0" smtClean="0"/>
+              <a:t>The logic is pretty much the same as setting up a single object, the only difference is the new keyword automatically does things like creating the object and returning it. </a:t>
+            </a:r>
+          </a:p>
+          <a:p>
+            <a:pPr marL="1085850" lvl="2" indent="-171450">
+              <a:buFont typeface="Arial"/>
+              <a:buChar char="•"/>
+            </a:pPr>
+            <a:r>
+              <a:rPr lang="en-US" baseline="0" dirty="0" smtClean="0"/>
+              <a:t>If you called the constructor function without the new operator, the this object wouldn't get set up and your </a:t>
+            </a:r>
+          </a:p>
+          <a:p>
+            <a:pPr marL="1085850" lvl="2" indent="-171450">
+              <a:buFont typeface="Arial"/>
+              <a:buChar char="•"/>
+            </a:pPr>
+            <a:r>
+              <a:rPr lang="en-US" baseline="0" dirty="0" smtClean="0"/>
+              <a:t>DEMO: constructors without the new operator</a:t>
+            </a:r>
+          </a:p>
+          <a:p>
+            <a:pPr marL="1085850" lvl="2" indent="-171450">
+              <a:buFont typeface="Arial"/>
+              <a:buChar char="•"/>
+            </a:pPr>
+            <a:r>
+              <a:rPr lang="en-US" baseline="0" dirty="0" smtClean="0"/>
+              <a:t>Objects created with constructor functions maintain a link back to the function that created them</a:t>
+            </a:r>
+          </a:p>
+          <a:p>
+            <a:pPr marL="628650" lvl="1" indent="-171450">
+              <a:buFont typeface="Arial"/>
+              <a:buChar char="•"/>
+            </a:pPr>
+            <a:r>
+              <a:rPr lang="en-US" baseline="0" dirty="0" smtClean="0"/>
+              <a:t>Constructor functions are not </a:t>
+            </a:r>
+            <a:r>
+              <a:rPr lang="en-US" baseline="0" smtClean="0"/>
+              <a:t>classes. No </a:t>
+            </a:r>
+            <a:r>
+              <a:rPr lang="en-US" baseline="0" dirty="0" smtClean="0"/>
+              <a:t>guarantee about object structure</a:t>
+            </a:r>
+          </a:p>
+          <a:p>
+            <a:pPr marL="1085850" lvl="2" indent="-171450">
+              <a:buFont typeface="Arial"/>
+              <a:buChar char="•"/>
+            </a:pPr>
+            <a:endParaRPr lang="en-US" baseline="0" dirty="0" smtClean="0"/>
+          </a:p>
+          <a:p>
+            <a:pPr marL="628650" lvl="1" indent="-171450">
+              <a:buFont typeface="Arial"/>
+              <a:buChar char="•"/>
+            </a:pPr>
+            <a:endParaRPr lang="en-US" baseline="0" dirty="0" smtClean="0"/>
+          </a:p>
+          <a:p>
+            <a:pPr marL="628650" lvl="1" indent="-171450">
+              <a:buFont typeface="Arial"/>
+              <a:buChar char="•"/>
+            </a:pPr>
+            <a:endParaRPr lang="en-US" baseline="0" dirty="0" smtClean="0"/>
+          </a:p>
+          <a:p>
+            <a:pPr marL="628650" lvl="1" indent="-171450">
+              <a:buFont typeface="Arial"/>
+              <a:buChar char="•"/>
+            </a:pPr>
+            <a:endParaRPr lang="en-US" baseline="0" dirty="0" smtClean="0"/>
+          </a:p>
+          <a:p>
+            <a:pPr marL="628650" lvl="1" indent="-171450">
+              <a:buFont typeface="Arial"/>
+              <a:buChar char="•"/>
+            </a:pPr>
+            <a:endParaRPr lang="en-US" baseline="0" dirty="0" smtClean="0"/>
           </a:p>
           <a:p>
             <a:pPr marL="171450" indent="-171450">
               <a:buFont typeface="Arial"/>
               <a:buChar char="•"/>
             </a:pPr>
-            <a:r>
-              <a:rPr lang="en-US" baseline="0" dirty="0" smtClean="0"/>
-              <a:t>Dynamic</a:t>
-            </a:r>
-            <a:endParaRPr lang="en-US" dirty="0"/>
+            <a:endParaRPr lang="en-US" baseline="0" dirty="0" smtClean="0"/>
           </a:p>
         </p:txBody>
       </p:sp>

</xml_diff>

<commit_message>
example explaining function name vs variable name
</commit_message>
<xml_diff>
--- a/javascript-objects.pptx
+++ b/javascript-objects.pptx
@@ -5,7 +5,7 @@
     <p:sldMasterId id="2147483648" r:id="rId1"/>
   </p:sldMasterIdLst>
   <p:notesMasterIdLst>
-    <p:notesMasterId r:id="rId10"/>
+    <p:notesMasterId r:id="rId11"/>
   </p:notesMasterIdLst>
   <p:sldIdLst>
     <p:sldId id="256" r:id="rId2"/>
@@ -14,8 +14,9 @@
     <p:sldId id="268" r:id="rId5"/>
     <p:sldId id="257" r:id="rId6"/>
     <p:sldId id="261" r:id="rId7"/>
-    <p:sldId id="267" r:id="rId8"/>
-    <p:sldId id="265" r:id="rId9"/>
+    <p:sldId id="271" r:id="rId8"/>
+    <p:sldId id="267" r:id="rId9"/>
+    <p:sldId id="265" r:id="rId10"/>
   </p:sldIdLst>
   <p:sldSz cx="9144000" cy="6858000" type="screen4x3"/>
   <p:notesSz cx="6858000" cy="9144000"/>
@@ -1262,15 +1263,7 @@
             </a:pPr>
             <a:r>
               <a:rPr lang="en-US" baseline="0" dirty="0" smtClean="0"/>
-              <a:t>Constructor functions are not </a:t>
-            </a:r>
-            <a:r>
-              <a:rPr lang="en-US" baseline="0" smtClean="0"/>
-              <a:t>classes. No </a:t>
-            </a:r>
-            <a:r>
-              <a:rPr lang="en-US" baseline="0" dirty="0" smtClean="0"/>
-              <a:t>guarantee about object structure</a:t>
+              <a:t>Constructor functions are not classes. No guarantee about object structure</a:t>
             </a:r>
           </a:p>
           <a:p>
@@ -5181,7 +5174,7 @@
           <a:p>
             <a:r>
               <a:rPr lang="en-US" dirty="0" smtClean="0"/>
-              <a:t>Methods</a:t>
+              <a:t>Public methods</a:t>
             </a:r>
             <a:endParaRPr lang="en-US" dirty="0"/>
           </a:p>
@@ -5229,24 +5222,14 @@
           </a:p>
           <a:p>
             <a:r>
-              <a:rPr lang="en-US" dirty="0" smtClean="0"/>
-              <a:t>Anonymous functions</a:t>
-            </a:r>
-          </a:p>
-          <a:p>
-            <a:r>
-              <a:rPr lang="en-US" dirty="0" smtClean="0"/>
-              <a:t>Closures</a:t>
-            </a:r>
-          </a:p>
-          <a:p>
-            <a:r>
-              <a:rPr lang="en-US" dirty="0" smtClean="0"/>
-              <a:t>Method context and "this"</a:t>
-            </a:r>
-          </a:p>
-          <a:p>
-            <a:endParaRPr lang="en-US" dirty="0"/>
+              <a:rPr lang="en-US" smtClean="0"/>
+              <a:t>Anonymous </a:t>
+            </a:r>
+            <a:r>
+              <a:rPr lang="en-US" smtClean="0"/>
+              <a:t>functions</a:t>
+            </a:r>
+            <a:endParaRPr lang="en-US" dirty="0" smtClean="0"/>
           </a:p>
         </p:txBody>
       </p:sp>
@@ -5304,6 +5287,78 @@
           <a:p>
             <a:r>
               <a:rPr lang="en-US" dirty="0" smtClean="0"/>
+              <a:t>Private methods</a:t>
+            </a:r>
+            <a:endParaRPr lang="en-US" dirty="0"/>
+          </a:p>
+        </p:txBody>
+      </p:sp>
+      <p:sp>
+        <p:nvSpPr>
+          <p:cNvPr id="3" name="Content Placeholder 2"/>
+          <p:cNvSpPr>
+            <a:spLocks noGrp="1"/>
+          </p:cNvSpPr>
+          <p:nvPr>
+            <p:ph idx="1"/>
+          </p:nvPr>
+        </p:nvSpPr>
+        <p:spPr/>
+        <p:txBody>
+          <a:bodyPr/>
+          <a:lstStyle/>
+          <a:p>
+            <a:endParaRPr lang="en-US"/>
+          </a:p>
+        </p:txBody>
+      </p:sp>
+    </p:spTree>
+    <p:extLst>
+      <p:ext uri="{BB962C8B-B14F-4D97-AF65-F5344CB8AC3E}">
+        <p14:creationId xmlns:p14="http://schemas.microsoft.com/office/powerpoint/2010/main" val="267776521"/>
+      </p:ext>
+    </p:extLst>
+  </p:cSld>
+  <p:clrMapOvr>
+    <a:masterClrMapping/>
+  </p:clrMapOvr>
+</p:sld>
+</file>
+
+<file path=ppt/slides/slide8.xml><?xml version="1.0" encoding="utf-8"?>
+<p:sld xmlns:a="http://schemas.openxmlformats.org/drawingml/2006/main" xmlns:r="http://schemas.openxmlformats.org/officeDocument/2006/relationships" xmlns:p="http://schemas.openxmlformats.org/presentationml/2006/main">
+  <p:cSld>
+    <p:spTree>
+      <p:nvGrpSpPr>
+        <p:cNvPr id="1" name=""/>
+        <p:cNvGrpSpPr/>
+        <p:nvPr/>
+      </p:nvGrpSpPr>
+      <p:grpSpPr>
+        <a:xfrm>
+          <a:off x="0" y="0"/>
+          <a:ext cx="0" cy="0"/>
+          <a:chOff x="0" y="0"/>
+          <a:chExt cx="0" cy="0"/>
+        </a:xfrm>
+      </p:grpSpPr>
+      <p:sp>
+        <p:nvSpPr>
+          <p:cNvPr id="2" name="Title 1"/>
+          <p:cNvSpPr>
+            <a:spLocks noGrp="1"/>
+          </p:cNvSpPr>
+          <p:nvPr>
+            <p:ph type="title"/>
+          </p:nvPr>
+        </p:nvSpPr>
+        <p:spPr/>
+        <p:txBody>
+          <a:bodyPr/>
+          <a:lstStyle/>
+          <a:p>
+            <a:r>
+              <a:rPr lang="en-US" dirty="0" smtClean="0"/>
               <a:t>Inheritance javascript style</a:t>
             </a:r>
             <a:endParaRPr lang="en-US" dirty="0"/>
@@ -5359,7 +5414,7 @@
 </p:sld>
 </file>
 
-<file path=ppt/slides/slide8.xml><?xml version="1.0" encoding="utf-8"?>
+<file path=ppt/slides/slide9.xml><?xml version="1.0" encoding="utf-8"?>
 <p:sld xmlns:a="http://schemas.openxmlformats.org/drawingml/2006/main" xmlns:r="http://schemas.openxmlformats.org/officeDocument/2006/relationships" xmlns:p="http://schemas.openxmlformats.org/presentationml/2006/main">
   <p:cSld>
     <p:spTree>

</xml_diff>

<commit_message>
a few extra examples to show that the inner function might run after the outer function has exited
</commit_message>
<xml_diff>
--- a/javascript-objects.pptx
+++ b/javascript-objects.pptx
@@ -1337,6 +1337,603 @@
     <p:extLst>
       <p:ext uri="{BB962C8B-B14F-4D97-AF65-F5344CB8AC3E}">
         <p14:creationId xmlns:p14="http://schemas.microsoft.com/office/powerpoint/2010/main" val="659445790"/>
+      </p:ext>
+    </p:extLst>
+  </p:cSld>
+  <p:clrMapOvr>
+    <a:masterClrMapping/>
+  </p:clrMapOvr>
+</p:notes>
+</file>
+
+<file path=ppt/notesSlides/notesSlide6.xml><?xml version="1.0" encoding="utf-8"?>
+<p:notes xmlns:a="http://schemas.openxmlformats.org/drawingml/2006/main" xmlns:r="http://schemas.openxmlformats.org/officeDocument/2006/relationships" xmlns:p="http://schemas.openxmlformats.org/presentationml/2006/main">
+  <p:cSld>
+    <p:spTree>
+      <p:nvGrpSpPr>
+        <p:cNvPr id="1" name=""/>
+        <p:cNvGrpSpPr/>
+        <p:nvPr/>
+      </p:nvGrpSpPr>
+      <p:grpSpPr>
+        <a:xfrm>
+          <a:off x="0" y="0"/>
+          <a:ext cx="0" cy="0"/>
+          <a:chOff x="0" y="0"/>
+          <a:chExt cx="0" cy="0"/>
+        </a:xfrm>
+      </p:grpSpPr>
+      <p:sp>
+        <p:nvSpPr>
+          <p:cNvPr id="2" name="Slide Image Placeholder 1"/>
+          <p:cNvSpPr>
+            <a:spLocks noGrp="1" noRot="1" noChangeAspect="1"/>
+          </p:cNvSpPr>
+          <p:nvPr>
+            <p:ph type="sldImg"/>
+          </p:nvPr>
+        </p:nvSpPr>
+        <p:spPr/>
+      </p:sp>
+      <p:sp>
+        <p:nvSpPr>
+          <p:cNvPr id="3" name="Notes Placeholder 2"/>
+          <p:cNvSpPr>
+            <a:spLocks noGrp="1"/>
+          </p:cNvSpPr>
+          <p:nvPr>
+            <p:ph type="body" idx="1"/>
+          </p:nvPr>
+        </p:nvSpPr>
+        <p:spPr/>
+        <p:txBody>
+          <a:bodyPr/>
+          <a:lstStyle/>
+          <a:p>
+            <a:pPr marL="171450" indent="-171450">
+              <a:buFont typeface="Arial"/>
+              <a:buChar char="•"/>
+            </a:pPr>
+            <a:r>
+              <a:rPr lang="en-US" dirty="0" smtClean="0"/>
+              <a:t>Methods are just properties that point to a function</a:t>
+            </a:r>
+          </a:p>
+          <a:p>
+            <a:pPr marL="171450" indent="-171450">
+              <a:buFont typeface="Arial"/>
+              <a:buChar char="•"/>
+            </a:pPr>
+            <a:r>
+              <a:rPr lang="en-US" dirty="0" smtClean="0"/>
+              <a:t>There are</a:t>
+            </a:r>
+            <a:r>
+              <a:rPr lang="en-US" baseline="0" dirty="0" smtClean="0"/>
+              <a:t> three javascript language features that make this possible: the fact that functions are objects, that you can create them at runtime using the function operator and that they can be anonymous. </a:t>
+            </a:r>
+          </a:p>
+          <a:p>
+            <a:pPr marL="171450" indent="-171450">
+              <a:buFont typeface="Arial"/>
+              <a:buChar char="•"/>
+            </a:pPr>
+            <a:r>
+              <a:rPr lang="en-US" baseline="0" dirty="0" smtClean="0"/>
+              <a:t>Functions as first class objects</a:t>
+            </a:r>
+          </a:p>
+          <a:p>
+            <a:pPr marL="628650" lvl="1" indent="-171450">
+              <a:buFont typeface="Arial"/>
+              <a:buChar char="•"/>
+            </a:pPr>
+            <a:r>
+              <a:rPr lang="en-US" baseline="0" dirty="0" smtClean="0"/>
+              <a:t>Functions in javascript are just a type of object</a:t>
+            </a:r>
+          </a:p>
+          <a:p>
+            <a:pPr marL="628650" lvl="1" indent="-171450">
+              <a:buFont typeface="Arial"/>
+              <a:buChar char="•"/>
+            </a:pPr>
+            <a:r>
+              <a:rPr lang="en-US" baseline="0" dirty="0" smtClean="0"/>
+              <a:t>Can do all the normal things you can do with an object</a:t>
+            </a:r>
+          </a:p>
+          <a:p>
+            <a:pPr marL="628650" lvl="1" indent="-171450">
+              <a:buFont typeface="Arial"/>
+              <a:buChar char="•"/>
+            </a:pPr>
+            <a:r>
+              <a:rPr lang="en-US" baseline="0" dirty="0" smtClean="0"/>
+              <a:t>A method in an object is just a reference to a function object</a:t>
+            </a:r>
+          </a:p>
+          <a:p>
+            <a:pPr marL="171450" lvl="0" indent="-171450">
+              <a:buFont typeface="Arial"/>
+              <a:buChar char="•"/>
+            </a:pPr>
+            <a:r>
+              <a:rPr lang="en-US" baseline="0" dirty="0" smtClean="0"/>
+              <a:t>Functions can be declared using the function declaration or the function operator</a:t>
+            </a:r>
+          </a:p>
+          <a:p>
+            <a:pPr marL="628650" lvl="1" indent="-171450">
+              <a:buFont typeface="Arial"/>
+              <a:buChar char="•"/>
+            </a:pPr>
+            <a:r>
+              <a:rPr lang="en-US" baseline="0" dirty="0" smtClean="0"/>
+              <a:t>Function declaration – javascript 101 way to create a function</a:t>
+            </a:r>
+          </a:p>
+          <a:p>
+            <a:pPr marL="1085850" lvl="2" indent="-171450">
+              <a:buFont typeface="Arial"/>
+              <a:buChar char="•"/>
+            </a:pPr>
+            <a:r>
+              <a:rPr lang="en-US" baseline="0" dirty="0" smtClean="0"/>
+              <a:t>Hoisted to the top of the function when the function is created so the order doesn't matter</a:t>
+            </a:r>
+          </a:p>
+          <a:p>
+            <a:pPr marL="1085850" lvl="2" indent="-171450">
+              <a:buFont typeface="Arial"/>
+              <a:buChar char="•"/>
+            </a:pPr>
+            <a:r>
+              <a:rPr lang="en-US" baseline="0" dirty="0" smtClean="0"/>
+              <a:t>Is automatically bound to a variable in the current scope with the function's name</a:t>
+            </a:r>
+          </a:p>
+          <a:p>
+            <a:pPr marL="1085850" lvl="2" indent="-171450">
+              <a:buFont typeface="Arial"/>
+              <a:buChar char="•"/>
+            </a:pPr>
+            <a:r>
+              <a:rPr lang="en-US" baseline="0" dirty="0" smtClean="0"/>
+              <a:t>Functions created with the function declaration must have a name, they can not be anonymous</a:t>
+            </a:r>
+          </a:p>
+          <a:p>
+            <a:pPr marL="628650" lvl="1" indent="-171450">
+              <a:buFont typeface="Arial"/>
+              <a:buChar char="•"/>
+            </a:pPr>
+            <a:r>
+              <a:rPr lang="en-US" baseline="0" dirty="0" smtClean="0"/>
+              <a:t>Function expression </a:t>
+            </a:r>
+          </a:p>
+          <a:p>
+            <a:pPr marL="1085850" lvl="2" indent="-171450">
+              <a:buFont typeface="Arial"/>
+              <a:buChar char="•"/>
+            </a:pPr>
+            <a:r>
+              <a:rPr lang="en-US" baseline="0" dirty="0" smtClean="0"/>
+              <a:t>The function expression is evaluated when the code inside the function is run. It is not affected by hoisting.</a:t>
+            </a:r>
+          </a:p>
+          <a:p>
+            <a:pPr marL="1085850" lvl="2" indent="-171450">
+              <a:buFont typeface="Arial"/>
+              <a:buChar char="•"/>
+            </a:pPr>
+            <a:r>
+              <a:rPr lang="en-US" baseline="0" dirty="0" smtClean="0"/>
+              <a:t>This means the function expression can be affected by surrounding code – for example you can put it in an if statement</a:t>
+            </a:r>
+          </a:p>
+          <a:p>
+            <a:pPr marL="1085850" lvl="2" indent="-171450">
+              <a:buFont typeface="Arial"/>
+              <a:buChar char="•"/>
+            </a:pPr>
+            <a:r>
+              <a:rPr lang="en-US" baseline="0" dirty="0" smtClean="0"/>
+              <a:t>The function expression doesn’t automatically add the function object into the current scope. Instead it returns it and it is up to the code to do something with it. </a:t>
+            </a:r>
+          </a:p>
+          <a:p>
+            <a:pPr marL="1085850" lvl="2" indent="-171450">
+              <a:buFont typeface="Arial"/>
+              <a:buChar char="•"/>
+            </a:pPr>
+            <a:r>
+              <a:rPr lang="en-US" baseline="0" dirty="0" smtClean="0"/>
+              <a:t>If you don't do anything with the return value of the function expression, there's no way to invoke it. </a:t>
+            </a:r>
+          </a:p>
+          <a:p>
+            <a:pPr marL="1085850" lvl="2" indent="-171450">
+              <a:buFont typeface="Arial"/>
+              <a:buChar char="•"/>
+            </a:pPr>
+            <a:r>
+              <a:rPr lang="en-US" baseline="0" dirty="0" smtClean="0"/>
+              <a:t>Since they're not added to the scope, they don't have to have a name. They can be anonymous. </a:t>
+            </a:r>
+          </a:p>
+          <a:p>
+            <a:pPr marL="1085850" lvl="2" indent="-171450">
+              <a:buFont typeface="Arial"/>
+              <a:buChar char="•"/>
+            </a:pPr>
+            <a:r>
+              <a:rPr lang="en-US" baseline="0" dirty="0" smtClean="0"/>
+              <a:t>The function expression is most useful because it can be used anywhere it is valid to put an expression.</a:t>
+            </a:r>
+          </a:p>
+          <a:p>
+            <a:pPr marL="1085850" lvl="2" indent="-171450">
+              <a:buFont typeface="Arial"/>
+              <a:buChar char="•"/>
+            </a:pPr>
+            <a:r>
+              <a:rPr lang="en-US" baseline="0" dirty="0" smtClean="0"/>
+              <a:t>Also very useful for single use functions like event handlers</a:t>
+            </a:r>
+          </a:p>
+          <a:p>
+            <a:pPr marL="171450" lvl="0" indent="-171450">
+              <a:buFont typeface="Arial"/>
+              <a:buChar char="•"/>
+            </a:pPr>
+            <a:r>
+              <a:rPr lang="en-US" baseline="0" dirty="0" smtClean="0"/>
+              <a:t>Anonymous functions</a:t>
+            </a:r>
+          </a:p>
+          <a:p>
+            <a:pPr marL="628650" marR="0" lvl="1" indent="-171450" algn="l" defTabSz="457200" rtl="0" eaLnBrk="1" fontAlgn="auto" latinLnBrk="0" hangingPunct="1">
+              <a:lnSpc>
+                <a:spcPct val="100000"/>
+              </a:lnSpc>
+              <a:spcBef>
+                <a:spcPts val="0"/>
+              </a:spcBef>
+              <a:spcAft>
+                <a:spcPts val="0"/>
+              </a:spcAft>
+              <a:buClrTx/>
+              <a:buSzTx/>
+              <a:buFont typeface="Arial"/>
+              <a:buChar char="•"/>
+              <a:tabLst/>
+              <a:defRPr/>
+            </a:pPr>
+            <a:r>
+              <a:rPr lang="en-US" baseline="0" dirty="0" smtClean="0"/>
+              <a:t>Anonymous functions are functions that don't have a name.</a:t>
+            </a:r>
+          </a:p>
+          <a:p>
+            <a:pPr marL="628650" marR="0" lvl="1" indent="-171450" algn="l" defTabSz="457200" rtl="0" eaLnBrk="1" fontAlgn="auto" latinLnBrk="0" hangingPunct="1">
+              <a:lnSpc>
+                <a:spcPct val="100000"/>
+              </a:lnSpc>
+              <a:spcBef>
+                <a:spcPts val="0"/>
+              </a:spcBef>
+              <a:spcAft>
+                <a:spcPts val="0"/>
+              </a:spcAft>
+              <a:buClrTx/>
+              <a:buSzTx/>
+              <a:buFont typeface="Arial"/>
+              <a:buChar char="•"/>
+              <a:tabLst/>
+              <a:defRPr/>
+            </a:pPr>
+            <a:r>
+              <a:rPr lang="en-US" baseline="0" dirty="0" smtClean="0"/>
+              <a:t>The name is different from the variable that has a reference to the function</a:t>
+            </a:r>
+          </a:p>
+          <a:p>
+            <a:pPr marL="628650" marR="0" lvl="1" indent="-171450" algn="l" defTabSz="457200" rtl="0" eaLnBrk="1" fontAlgn="auto" latinLnBrk="0" hangingPunct="1">
+              <a:lnSpc>
+                <a:spcPct val="100000"/>
+              </a:lnSpc>
+              <a:spcBef>
+                <a:spcPts val="0"/>
+              </a:spcBef>
+              <a:spcAft>
+                <a:spcPts val="0"/>
+              </a:spcAft>
+              <a:buClrTx/>
+              <a:buSzTx/>
+              <a:buFont typeface="Arial"/>
+              <a:buChar char="•"/>
+              <a:tabLst/>
+              <a:defRPr/>
+            </a:pPr>
+            <a:r>
+              <a:rPr lang="en-US" baseline="0" dirty="0" smtClean="0"/>
+              <a:t>Name can be useful for recursion and stack traces, but you don't usually really need it</a:t>
+            </a:r>
+          </a:p>
+          <a:p>
+            <a:pPr marL="628650" marR="0" lvl="1" indent="-171450" algn="l" defTabSz="457200" rtl="0" eaLnBrk="1" fontAlgn="auto" latinLnBrk="0" hangingPunct="1">
+              <a:lnSpc>
+                <a:spcPct val="100000"/>
+              </a:lnSpc>
+              <a:spcBef>
+                <a:spcPts val="0"/>
+              </a:spcBef>
+              <a:spcAft>
+                <a:spcPts val="0"/>
+              </a:spcAft>
+              <a:buClrTx/>
+              <a:buSzTx/>
+              <a:buFont typeface="Arial"/>
+              <a:buChar char="•"/>
+              <a:tabLst/>
+              <a:defRPr/>
+            </a:pPr>
+            <a:endParaRPr lang="en-US" baseline="0" dirty="0" smtClean="0"/>
+          </a:p>
+          <a:p>
+            <a:pPr marL="628650" marR="0" lvl="1" indent="-171450" algn="l" defTabSz="457200" rtl="0" eaLnBrk="1" fontAlgn="auto" latinLnBrk="0" hangingPunct="1">
+              <a:lnSpc>
+                <a:spcPct val="100000"/>
+              </a:lnSpc>
+              <a:spcBef>
+                <a:spcPts val="0"/>
+              </a:spcBef>
+              <a:spcAft>
+                <a:spcPts val="0"/>
+              </a:spcAft>
+              <a:buClrTx/>
+              <a:buSzTx/>
+              <a:buFont typeface="Arial"/>
+              <a:buChar char="•"/>
+              <a:tabLst/>
+              <a:defRPr/>
+            </a:pPr>
+            <a:endParaRPr lang="en-US" baseline="0" dirty="0" smtClean="0"/>
+          </a:p>
+          <a:p>
+            <a:pPr marL="1085850" lvl="2" indent="-171450">
+              <a:buFont typeface="Arial"/>
+              <a:buChar char="•"/>
+            </a:pPr>
+            <a:endParaRPr lang="en-US" baseline="0" dirty="0" smtClean="0"/>
+          </a:p>
+          <a:p>
+            <a:pPr marL="628650" lvl="1" indent="-171450">
+              <a:buFont typeface="Arial"/>
+              <a:buChar char="•"/>
+            </a:pPr>
+            <a:endParaRPr lang="en-US" dirty="0"/>
+          </a:p>
+        </p:txBody>
+      </p:sp>
+      <p:sp>
+        <p:nvSpPr>
+          <p:cNvPr id="4" name="Slide Number Placeholder 3"/>
+          <p:cNvSpPr>
+            <a:spLocks noGrp="1"/>
+          </p:cNvSpPr>
+          <p:nvPr>
+            <p:ph type="sldNum" sz="quarter" idx="10"/>
+          </p:nvPr>
+        </p:nvSpPr>
+        <p:spPr/>
+        <p:txBody>
+          <a:bodyPr/>
+          <a:lstStyle/>
+          <a:p>
+            <a:fld id="{042B0272-D6CE-D246-814F-524707BF3A24}" type="slidenum">
+              <a:rPr lang="en-US" smtClean="0"/>
+              <a:t>6</a:t>
+            </a:fld>
+            <a:endParaRPr lang="en-US"/>
+          </a:p>
+        </p:txBody>
+      </p:sp>
+    </p:spTree>
+    <p:extLst>
+      <p:ext uri="{BB962C8B-B14F-4D97-AF65-F5344CB8AC3E}">
+        <p14:creationId xmlns:p14="http://schemas.microsoft.com/office/powerpoint/2010/main" val="3801282877"/>
+      </p:ext>
+    </p:extLst>
+  </p:cSld>
+  <p:clrMapOvr>
+    <a:masterClrMapping/>
+  </p:clrMapOvr>
+</p:notes>
+</file>
+
+<file path=ppt/notesSlides/notesSlide7.xml><?xml version="1.0" encoding="utf-8"?>
+<p:notes xmlns:a="http://schemas.openxmlformats.org/drawingml/2006/main" xmlns:r="http://schemas.openxmlformats.org/officeDocument/2006/relationships" xmlns:p="http://schemas.openxmlformats.org/presentationml/2006/main">
+  <p:cSld>
+    <p:spTree>
+      <p:nvGrpSpPr>
+        <p:cNvPr id="1" name=""/>
+        <p:cNvGrpSpPr/>
+        <p:nvPr/>
+      </p:nvGrpSpPr>
+      <p:grpSpPr>
+        <a:xfrm>
+          <a:off x="0" y="0"/>
+          <a:ext cx="0" cy="0"/>
+          <a:chOff x="0" y="0"/>
+          <a:chExt cx="0" cy="0"/>
+        </a:xfrm>
+      </p:grpSpPr>
+      <p:sp>
+        <p:nvSpPr>
+          <p:cNvPr id="2" name="Slide Image Placeholder 1"/>
+          <p:cNvSpPr>
+            <a:spLocks noGrp="1" noRot="1" noChangeAspect="1"/>
+          </p:cNvSpPr>
+          <p:nvPr>
+            <p:ph type="sldImg"/>
+          </p:nvPr>
+        </p:nvSpPr>
+        <p:spPr/>
+      </p:sp>
+      <p:sp>
+        <p:nvSpPr>
+          <p:cNvPr id="3" name="Notes Placeholder 2"/>
+          <p:cNvSpPr>
+            <a:spLocks noGrp="1"/>
+          </p:cNvSpPr>
+          <p:nvPr>
+            <p:ph type="body" idx="1"/>
+          </p:nvPr>
+        </p:nvSpPr>
+        <p:spPr/>
+        <p:txBody>
+          <a:bodyPr/>
+          <a:lstStyle/>
+          <a:p>
+            <a:pPr marL="171450" indent="-171450">
+              <a:buFont typeface="Arial"/>
+              <a:buChar char="•"/>
+            </a:pPr>
+            <a:r>
+              <a:rPr lang="en-US" dirty="0" smtClean="0"/>
+              <a:t>In javascript you can nest functions inside other functions</a:t>
+            </a:r>
+          </a:p>
+          <a:p>
+            <a:pPr marL="171450" indent="-171450">
+              <a:buFont typeface="Arial"/>
+              <a:buChar char="•"/>
+            </a:pPr>
+            <a:r>
+              <a:rPr lang="en-US" dirty="0" smtClean="0"/>
+              <a:t>The inner function can access variables in the parent function. </a:t>
+            </a:r>
+          </a:p>
+          <a:p>
+            <a:pPr marL="628650" lvl="1" indent="-171450">
+              <a:buFont typeface="Arial"/>
+              <a:buChar char="•"/>
+            </a:pPr>
+            <a:r>
+              <a:rPr lang="en-US" dirty="0" smtClean="0"/>
+              <a:t>Doing this creates a closure. </a:t>
+            </a:r>
+          </a:p>
+          <a:p>
+            <a:pPr marL="628650" lvl="1" indent="-171450">
+              <a:buFont typeface="Arial"/>
+              <a:buChar char="•"/>
+            </a:pPr>
+            <a:r>
+              <a:rPr lang="en-US" dirty="0" smtClean="0"/>
+              <a:t>A closure is the mechanism that javascript</a:t>
+            </a:r>
+            <a:r>
+              <a:rPr lang="en-US" baseline="0" dirty="0" smtClean="0"/>
+              <a:t> uses to give you access to the parent scope, even after the parent function has exited.</a:t>
+            </a:r>
+          </a:p>
+          <a:p>
+            <a:pPr marL="171450" lvl="0" indent="-171450">
+              <a:buFont typeface="Arial"/>
+              <a:buChar char="•"/>
+            </a:pPr>
+            <a:r>
+              <a:rPr lang="en-US" baseline="0" dirty="0" smtClean="0"/>
+              <a:t>This is important, because the inner function might run after the outer function has exited.</a:t>
+            </a:r>
+          </a:p>
+          <a:p>
+            <a:pPr marL="628650" lvl="1" indent="-171450">
+              <a:buFont typeface="Arial"/>
+              <a:buChar char="•"/>
+            </a:pPr>
+            <a:r>
+              <a:rPr lang="en-US" baseline="0" dirty="0" smtClean="0"/>
+              <a:t>This could be because the child function is being used as an event handler or callback.</a:t>
+            </a:r>
+          </a:p>
+          <a:p>
+            <a:pPr marL="628650" lvl="1" indent="-171450">
+              <a:buFont typeface="Arial"/>
+              <a:buChar char="•"/>
+            </a:pPr>
+            <a:r>
+              <a:rPr lang="en-US" baseline="0" dirty="0" smtClean="0"/>
+              <a:t>Or it could be because the child function is being used as an object's method.</a:t>
+            </a:r>
+          </a:p>
+          <a:p>
+            <a:pPr marL="1085850" lvl="2" indent="-171450">
+              <a:buFont typeface="Arial"/>
+              <a:buChar char="•"/>
+            </a:pPr>
+            <a:r>
+              <a:rPr lang="en-US" baseline="0" dirty="0" smtClean="0"/>
+              <a:t>This can be used to create private state inside your object</a:t>
+            </a:r>
+          </a:p>
+          <a:p>
+            <a:pPr marL="171450" lvl="0" indent="-171450">
+              <a:buFont typeface="Arial"/>
+              <a:buChar char="•"/>
+            </a:pPr>
+            <a:r>
+              <a:rPr lang="en-US" baseline="0" dirty="0" smtClean="0"/>
+              <a:t>The closure is created when the parent function exits, which means that the value of the variables are the values from when the function exited. </a:t>
+            </a:r>
+          </a:p>
+          <a:p>
+            <a:pPr marL="171450" lvl="0" indent="-171450">
+              <a:buFont typeface="Arial"/>
+              <a:buChar char="•"/>
+            </a:pPr>
+            <a:endParaRPr lang="en-US" baseline="0" dirty="0" smtClean="0"/>
+          </a:p>
+          <a:p>
+            <a:pPr marL="171450" indent="-171450">
+              <a:buFont typeface="Arial"/>
+              <a:buChar char="•"/>
+            </a:pPr>
+            <a:endParaRPr lang="en-US" dirty="0"/>
+          </a:p>
+        </p:txBody>
+      </p:sp>
+      <p:sp>
+        <p:nvSpPr>
+          <p:cNvPr id="4" name="Slide Number Placeholder 3"/>
+          <p:cNvSpPr>
+            <a:spLocks noGrp="1"/>
+          </p:cNvSpPr>
+          <p:nvPr>
+            <p:ph type="sldNum" sz="quarter" idx="10"/>
+          </p:nvPr>
+        </p:nvSpPr>
+        <p:spPr/>
+        <p:txBody>
+          <a:bodyPr/>
+          <a:lstStyle/>
+          <a:p>
+            <a:fld id="{042B0272-D6CE-D246-814F-524707BF3A24}" type="slidenum">
+              <a:rPr lang="en-US" smtClean="0"/>
+              <a:t>7</a:t>
+            </a:fld>
+            <a:endParaRPr lang="en-US"/>
+          </a:p>
+        </p:txBody>
+      </p:sp>
+    </p:spTree>
+    <p:extLst>
+      <p:ext uri="{BB962C8B-B14F-4D97-AF65-F5344CB8AC3E}">
+        <p14:creationId xmlns:p14="http://schemas.microsoft.com/office/powerpoint/2010/main" val="282777570"/>
       </p:ext>
     </p:extLst>
   </p:cSld>
@@ -5222,11 +5819,11 @@
           </a:p>
           <a:p>
             <a:r>
-              <a:rPr lang="en-US" smtClean="0"/>
+              <a:rPr lang="en-US" dirty="0" smtClean="0"/>
               <a:t>Anonymous </a:t>
             </a:r>
             <a:r>
-              <a:rPr lang="en-US" smtClean="0"/>
+              <a:rPr lang="en-US" dirty="0" smtClean="0"/>
               <a:t>functions</a:t>
             </a:r>
             <a:endParaRPr lang="en-US" dirty="0" smtClean="0"/>
@@ -5308,7 +5905,19 @@
           <a:bodyPr/>
           <a:lstStyle/>
           <a:p>
-            <a:endParaRPr lang="en-US"/>
+            <a:r>
+              <a:rPr lang="en-US" dirty="0" smtClean="0"/>
+              <a:t>You can simulate private methods inside a constructor by creating a nested function that your object uses.</a:t>
+            </a:r>
+          </a:p>
+          <a:p>
+            <a:r>
+              <a:rPr lang="en-US" dirty="0" smtClean="0"/>
+              <a:t>This works through the magic of closures. </a:t>
+            </a:r>
+          </a:p>
+          <a:p>
+            <a:endParaRPr lang="en-US" dirty="0" smtClean="0"/>
           </a:p>
         </p:txBody>
       </p:sp>

</xml_diff>

<commit_message>
better explaining how closures are created when the parent gfunction exits
</commit_message>
<xml_diff>
--- a/javascript-objects.pptx
+++ b/javascript-objects.pptx
@@ -5,7 +5,7 @@
     <p:sldMasterId id="2147483648" r:id="rId1"/>
   </p:sldMasterIdLst>
   <p:notesMasterIdLst>
-    <p:notesMasterId r:id="rId11"/>
+    <p:notesMasterId r:id="rId15"/>
   </p:notesMasterIdLst>
   <p:sldIdLst>
     <p:sldId id="256" r:id="rId2"/>
@@ -15,8 +15,12 @@
     <p:sldId id="257" r:id="rId6"/>
     <p:sldId id="261" r:id="rId7"/>
     <p:sldId id="271" r:id="rId8"/>
-    <p:sldId id="267" r:id="rId9"/>
-    <p:sldId id="265" r:id="rId10"/>
+    <p:sldId id="272" r:id="rId9"/>
+    <p:sldId id="273" r:id="rId10"/>
+    <p:sldId id="274" r:id="rId11"/>
+    <p:sldId id="275" r:id="rId12"/>
+    <p:sldId id="267" r:id="rId13"/>
+    <p:sldId id="265" r:id="rId14"/>
   </p:sldIdLst>
   <p:sldSz cx="9144000" cy="6858000" type="screen4x3"/>
   <p:notesSz cx="6858000" cy="9144000"/>
@@ -623,6 +627,186 @@
 </p:notes>
 </file>
 
+<file path=ppt/notesSlides/notesSlide10.xml><?xml version="1.0" encoding="utf-8"?>
+<p:notes xmlns:a="http://schemas.openxmlformats.org/drawingml/2006/main" xmlns:r="http://schemas.openxmlformats.org/officeDocument/2006/relationships" xmlns:p="http://schemas.openxmlformats.org/presentationml/2006/main">
+  <p:cSld>
+    <p:spTree>
+      <p:nvGrpSpPr>
+        <p:cNvPr id="1" name=""/>
+        <p:cNvGrpSpPr/>
+        <p:nvPr/>
+      </p:nvGrpSpPr>
+      <p:grpSpPr>
+        <a:xfrm>
+          <a:off x="0" y="0"/>
+          <a:ext cx="0" cy="0"/>
+          <a:chOff x="0" y="0"/>
+          <a:chExt cx="0" cy="0"/>
+        </a:xfrm>
+      </p:grpSpPr>
+      <p:sp>
+        <p:nvSpPr>
+          <p:cNvPr id="2" name="Slide Image Placeholder 1"/>
+          <p:cNvSpPr>
+            <a:spLocks noGrp="1" noRot="1" noChangeAspect="1"/>
+          </p:cNvSpPr>
+          <p:nvPr>
+            <p:ph type="sldImg"/>
+          </p:nvPr>
+        </p:nvSpPr>
+        <p:spPr/>
+      </p:sp>
+      <p:sp>
+        <p:nvSpPr>
+          <p:cNvPr id="3" name="Notes Placeholder 2"/>
+          <p:cNvSpPr>
+            <a:spLocks noGrp="1"/>
+          </p:cNvSpPr>
+          <p:nvPr>
+            <p:ph type="body" idx="1"/>
+          </p:nvPr>
+        </p:nvSpPr>
+        <p:spPr/>
+        <p:txBody>
+          <a:bodyPr/>
+          <a:lstStyle/>
+          <a:p>
+            <a:endParaRPr lang="en-US" dirty="0"/>
+          </a:p>
+        </p:txBody>
+      </p:sp>
+      <p:sp>
+        <p:nvSpPr>
+          <p:cNvPr id="4" name="Slide Number Placeholder 3"/>
+          <p:cNvSpPr>
+            <a:spLocks noGrp="1"/>
+          </p:cNvSpPr>
+          <p:nvPr>
+            <p:ph type="sldNum" sz="quarter" idx="10"/>
+          </p:nvPr>
+        </p:nvSpPr>
+        <p:spPr/>
+        <p:txBody>
+          <a:bodyPr/>
+          <a:lstStyle/>
+          <a:p>
+            <a:fld id="{042B0272-D6CE-D246-814F-524707BF3A24}" type="slidenum">
+              <a:rPr lang="en-US" smtClean="0"/>
+              <a:t>10</a:t>
+            </a:fld>
+            <a:endParaRPr lang="en-US"/>
+          </a:p>
+        </p:txBody>
+      </p:sp>
+    </p:spTree>
+    <p:extLst>
+      <p:ext uri="{BB962C8B-B14F-4D97-AF65-F5344CB8AC3E}">
+        <p14:creationId xmlns:p14="http://schemas.microsoft.com/office/powerpoint/2010/main" val="657595932"/>
+      </p:ext>
+    </p:extLst>
+  </p:cSld>
+  <p:clrMapOvr>
+    <a:masterClrMapping/>
+  </p:clrMapOvr>
+</p:notes>
+</file>
+
+<file path=ppt/notesSlides/notesSlide11.xml><?xml version="1.0" encoding="utf-8"?>
+<p:notes xmlns:a="http://schemas.openxmlformats.org/drawingml/2006/main" xmlns:r="http://schemas.openxmlformats.org/officeDocument/2006/relationships" xmlns:p="http://schemas.openxmlformats.org/presentationml/2006/main">
+  <p:cSld>
+    <p:spTree>
+      <p:nvGrpSpPr>
+        <p:cNvPr id="1" name=""/>
+        <p:cNvGrpSpPr/>
+        <p:nvPr/>
+      </p:nvGrpSpPr>
+      <p:grpSpPr>
+        <a:xfrm>
+          <a:off x="0" y="0"/>
+          <a:ext cx="0" cy="0"/>
+          <a:chOff x="0" y="0"/>
+          <a:chExt cx="0" cy="0"/>
+        </a:xfrm>
+      </p:grpSpPr>
+      <p:sp>
+        <p:nvSpPr>
+          <p:cNvPr id="2" name="Slide Image Placeholder 1"/>
+          <p:cNvSpPr>
+            <a:spLocks noGrp="1" noRot="1" noChangeAspect="1"/>
+          </p:cNvSpPr>
+          <p:nvPr>
+            <p:ph type="sldImg"/>
+          </p:nvPr>
+        </p:nvSpPr>
+        <p:spPr/>
+      </p:sp>
+      <p:sp>
+        <p:nvSpPr>
+          <p:cNvPr id="3" name="Notes Placeholder 2"/>
+          <p:cNvSpPr>
+            <a:spLocks noGrp="1"/>
+          </p:cNvSpPr>
+          <p:nvPr>
+            <p:ph type="body" idx="1"/>
+          </p:nvPr>
+        </p:nvSpPr>
+        <p:spPr/>
+        <p:txBody>
+          <a:bodyPr/>
+          <a:lstStyle/>
+          <a:p>
+            <a:r>
+              <a:rPr lang="en-US" dirty="0" smtClean="0"/>
+              <a:t>In C# you never need to give any </a:t>
+            </a:r>
+            <a:r>
+              <a:rPr lang="en-US" smtClean="0"/>
+              <a:t>thought</a:t>
+            </a:r>
+            <a:r>
+              <a:rPr lang="en-US" baseline="0" smtClean="0"/>
+              <a:t> about </a:t>
+            </a:r>
+            <a:endParaRPr lang="en-US" dirty="0"/>
+          </a:p>
+        </p:txBody>
+      </p:sp>
+      <p:sp>
+        <p:nvSpPr>
+          <p:cNvPr id="4" name="Slide Number Placeholder 3"/>
+          <p:cNvSpPr>
+            <a:spLocks noGrp="1"/>
+          </p:cNvSpPr>
+          <p:nvPr>
+            <p:ph type="sldNum" sz="quarter" idx="10"/>
+          </p:nvPr>
+        </p:nvSpPr>
+        <p:spPr/>
+        <p:txBody>
+          <a:bodyPr/>
+          <a:lstStyle/>
+          <a:p>
+            <a:fld id="{042B0272-D6CE-D246-814F-524707BF3A24}" type="slidenum">
+              <a:rPr lang="en-US" smtClean="0"/>
+              <a:t>11</a:t>
+            </a:fld>
+            <a:endParaRPr lang="en-US"/>
+          </a:p>
+        </p:txBody>
+      </p:sp>
+    </p:spTree>
+    <p:extLst>
+      <p:ext uri="{BB962C8B-B14F-4D97-AF65-F5344CB8AC3E}">
+        <p14:creationId xmlns:p14="http://schemas.microsoft.com/office/powerpoint/2010/main" val="1797582236"/>
+      </p:ext>
+    </p:extLst>
+  </p:cSld>
+  <p:clrMapOvr>
+    <a:masterClrMapping/>
+  </p:clrMapOvr>
+</p:notes>
+</file>
+
 <file path=ppt/notesSlides/notesSlide2.xml><?xml version="1.0" encoding="utf-8"?>
 <p:notes xmlns:a="http://schemas.openxmlformats.org/drawingml/2006/main" xmlns:r="http://schemas.openxmlformats.org/officeDocument/2006/relationships" xmlns:p="http://schemas.openxmlformats.org/presentationml/2006/main">
   <p:cSld>
@@ -1824,7 +2008,11 @@
             </a:pPr>
             <a:r>
               <a:rPr lang="en-US" dirty="0" smtClean="0"/>
-              <a:t>Doing this creates a closure. </a:t>
+              <a:t>A closure is the mechanism that javascript</a:t>
+            </a:r>
+            <a:r>
+              <a:rPr lang="en-US" baseline="0" dirty="0" smtClean="0"/>
+              <a:t> uses to give you access to the parent scope, if it is run after the parent function has exited.</a:t>
             </a:r>
           </a:p>
           <a:p>
@@ -1833,12 +2021,8 @@
               <a:buChar char="•"/>
             </a:pPr>
             <a:r>
-              <a:rPr lang="en-US" dirty="0" smtClean="0"/>
-              <a:t>A closure is the mechanism that javascript</a:t>
-            </a:r>
-            <a:r>
               <a:rPr lang="en-US" baseline="0" dirty="0" smtClean="0"/>
-              <a:t> uses to give you access to the parent scope, even after the parent function has exited.</a:t>
+              <a:t>Closures happen when the outer function is executed and when the inner function is created. </a:t>
             </a:r>
           </a:p>
           <a:p>
@@ -1890,6 +2074,63 @@
               <a:rPr lang="en-US" baseline="0" dirty="0" smtClean="0"/>
               <a:t>The closure is created when the parent function exits, which means that the value of the variables are the values from when the function exited. </a:t>
             </a:r>
+          </a:p>
+          <a:p>
+            <a:pPr marL="171450" lvl="0" indent="-171450">
+              <a:buFont typeface="Arial"/>
+              <a:buChar char="•"/>
+            </a:pPr>
+            <a:r>
+              <a:rPr lang="en-US" baseline="0" dirty="0" smtClean="0"/>
+              <a:t>The child function can update the values in the parent function</a:t>
+            </a:r>
+          </a:p>
+          <a:p>
+            <a:pPr marL="171450" lvl="0" indent="-171450">
+              <a:buFont typeface="Arial"/>
+              <a:buChar char="•"/>
+            </a:pPr>
+            <a:r>
+              <a:rPr lang="en-US" baseline="0" dirty="0" smtClean="0"/>
+              <a:t>Every time the parent function runs, it creates a new closure. </a:t>
+            </a:r>
+          </a:p>
+          <a:p>
+            <a:pPr marL="171450" lvl="0" indent="-171450">
+              <a:buFont typeface="Arial"/>
+              <a:buChar char="•"/>
+            </a:pPr>
+            <a:r>
+              <a:rPr lang="en-US" baseline="0" dirty="0" smtClean="0"/>
+              <a:t>Warning: memory consumption</a:t>
+            </a:r>
+          </a:p>
+          <a:p>
+            <a:pPr marL="628650" lvl="1" indent="-171450">
+              <a:buFont typeface="Arial"/>
+              <a:buChar char="•"/>
+            </a:pPr>
+            <a:r>
+              <a:rPr lang="en-US" baseline="0" dirty="0" smtClean="0"/>
+              <a:t>Large outer functions</a:t>
+            </a:r>
+          </a:p>
+          <a:p>
+            <a:pPr marL="628650" lvl="1" indent="-171450">
+              <a:buFont typeface="Arial"/>
+              <a:buChar char="•"/>
+            </a:pPr>
+            <a:r>
+              <a:rPr lang="en-US" baseline="0" dirty="0" smtClean="0"/>
+              <a:t>Outer functions called many times</a:t>
+            </a:r>
+          </a:p>
+          <a:p>
+            <a:pPr marL="171450" lvl="0" indent="-171450">
+              <a:buFont typeface="Arial"/>
+              <a:buChar char="•"/>
+            </a:pPr>
+            <a:endParaRPr lang="en-US" baseline="0" dirty="0" smtClean="0"/>
           </a:p>
           <a:p>
             <a:pPr marL="171450" lvl="0" indent="-171450">
@@ -1934,6 +2175,251 @@
     <p:extLst>
       <p:ext uri="{BB962C8B-B14F-4D97-AF65-F5344CB8AC3E}">
         <p14:creationId xmlns:p14="http://schemas.microsoft.com/office/powerpoint/2010/main" val="282777570"/>
+      </p:ext>
+    </p:extLst>
+  </p:cSld>
+  <p:clrMapOvr>
+    <a:masterClrMapping/>
+  </p:clrMapOvr>
+</p:notes>
+</file>
+
+<file path=ppt/notesSlides/notesSlide8.xml><?xml version="1.0" encoding="utf-8"?>
+<p:notes xmlns:a="http://schemas.openxmlformats.org/drawingml/2006/main" xmlns:r="http://schemas.openxmlformats.org/officeDocument/2006/relationships" xmlns:p="http://schemas.openxmlformats.org/presentationml/2006/main">
+  <p:cSld>
+    <p:spTree>
+      <p:nvGrpSpPr>
+        <p:cNvPr id="1" name=""/>
+        <p:cNvGrpSpPr/>
+        <p:nvPr/>
+      </p:nvGrpSpPr>
+      <p:grpSpPr>
+        <a:xfrm>
+          <a:off x="0" y="0"/>
+          <a:ext cx="0" cy="0"/>
+          <a:chOff x="0" y="0"/>
+          <a:chExt cx="0" cy="0"/>
+        </a:xfrm>
+      </p:grpSpPr>
+      <p:sp>
+        <p:nvSpPr>
+          <p:cNvPr id="2" name="Slide Image Placeholder 1"/>
+          <p:cNvSpPr>
+            <a:spLocks noGrp="1" noRot="1" noChangeAspect="1"/>
+          </p:cNvSpPr>
+          <p:nvPr>
+            <p:ph type="sldImg"/>
+          </p:nvPr>
+        </p:nvSpPr>
+        <p:spPr/>
+      </p:sp>
+      <p:sp>
+        <p:nvSpPr>
+          <p:cNvPr id="3" name="Notes Placeholder 2"/>
+          <p:cNvSpPr>
+            <a:spLocks noGrp="1"/>
+          </p:cNvSpPr>
+          <p:nvPr>
+            <p:ph type="body" idx="1"/>
+          </p:nvPr>
+        </p:nvSpPr>
+        <p:spPr/>
+        <p:txBody>
+          <a:bodyPr/>
+          <a:lstStyle/>
+          <a:p>
+            <a:r>
+              <a:rPr lang="en-US" dirty="0" smtClean="0"/>
+              <a:t>Execution context is a whole lot of information about the currently running function.</a:t>
+            </a:r>
+            <a:r>
+              <a:rPr lang="en-US" baseline="0" dirty="0" smtClean="0"/>
+              <a:t> </a:t>
+            </a:r>
+          </a:p>
+          <a:p>
+            <a:endParaRPr lang="en-US" dirty="0" smtClean="0"/>
+          </a:p>
+          <a:p>
+            <a:r>
+              <a:rPr lang="en-US" dirty="0" smtClean="0"/>
+              <a:t>Activation object – contains current function's parameters</a:t>
+            </a:r>
+            <a:r>
+              <a:rPr lang="en-US" baseline="0" dirty="0" smtClean="0"/>
+              <a:t> and</a:t>
+            </a:r>
+            <a:r>
+              <a:rPr lang="en-US" dirty="0" smtClean="0"/>
+              <a:t> variables (including</a:t>
+            </a:r>
+            <a:r>
+              <a:rPr lang="en-US" baseline="0" dirty="0" smtClean="0"/>
+              <a:t> </a:t>
+            </a:r>
+            <a:r>
+              <a:rPr lang="en-US" dirty="0" smtClean="0"/>
+              <a:t>functions).</a:t>
+            </a:r>
+            <a:r>
+              <a:rPr lang="en-US" baseline="0" dirty="0" smtClean="0"/>
+              <a:t> A new activation object is created each time the function is run.</a:t>
+            </a:r>
+            <a:endParaRPr lang="en-US" dirty="0" smtClean="0"/>
+          </a:p>
+          <a:p>
+            <a:r>
+              <a:rPr lang="en-US" dirty="0" smtClean="0"/>
+              <a:t>When inner function is created, it is assigned a scope chain</a:t>
+            </a:r>
+            <a:r>
+              <a:rPr lang="en-US" baseline="0" dirty="0" smtClean="0"/>
+              <a:t> is: global object + parent function's activation object (</a:t>
+            </a:r>
+            <a:r>
+              <a:rPr lang="en-US" baseline="0" dirty="0" err="1" smtClean="0"/>
+              <a:t>calculateTime</a:t>
+            </a:r>
+            <a:r>
+              <a:rPr lang="en-US" baseline="0" dirty="0" smtClean="0"/>
+              <a:t>.[[scope]]) </a:t>
+            </a:r>
+          </a:p>
+          <a:p>
+            <a:r>
+              <a:rPr lang="en-US" baseline="0" dirty="0" smtClean="0"/>
+              <a:t>When inner function is actually run, the current activation object is added to the scope chain.</a:t>
+            </a:r>
+          </a:p>
+          <a:p>
+            <a:r>
+              <a:rPr lang="en-US" baseline="0" dirty="0" smtClean="0"/>
+              <a:t>When a variable is access in the inner function, the scope chain is traversed until a matching variable is found. </a:t>
+            </a:r>
+          </a:p>
+          <a:p>
+            <a:endParaRPr lang="en-US" dirty="0" smtClean="0"/>
+          </a:p>
+          <a:p>
+            <a:endParaRPr lang="en-US" dirty="0"/>
+          </a:p>
+        </p:txBody>
+      </p:sp>
+      <p:sp>
+        <p:nvSpPr>
+          <p:cNvPr id="4" name="Slide Number Placeholder 3"/>
+          <p:cNvSpPr>
+            <a:spLocks noGrp="1"/>
+          </p:cNvSpPr>
+          <p:nvPr>
+            <p:ph type="sldNum" sz="quarter" idx="10"/>
+          </p:nvPr>
+        </p:nvSpPr>
+        <p:spPr/>
+        <p:txBody>
+          <a:bodyPr/>
+          <a:lstStyle/>
+          <a:p>
+            <a:fld id="{042B0272-D6CE-D246-814F-524707BF3A24}" type="slidenum">
+              <a:rPr lang="en-US" smtClean="0"/>
+              <a:t>8</a:t>
+            </a:fld>
+            <a:endParaRPr lang="en-US"/>
+          </a:p>
+        </p:txBody>
+      </p:sp>
+    </p:spTree>
+    <p:extLst>
+      <p:ext uri="{BB962C8B-B14F-4D97-AF65-F5344CB8AC3E}">
+        <p14:creationId xmlns:p14="http://schemas.microsoft.com/office/powerpoint/2010/main" val="2674129656"/>
+      </p:ext>
+    </p:extLst>
+  </p:cSld>
+  <p:clrMapOvr>
+    <a:masterClrMapping/>
+  </p:clrMapOvr>
+</p:notes>
+</file>
+
+<file path=ppt/notesSlides/notesSlide9.xml><?xml version="1.0" encoding="utf-8"?>
+<p:notes xmlns:a="http://schemas.openxmlformats.org/drawingml/2006/main" xmlns:r="http://schemas.openxmlformats.org/officeDocument/2006/relationships" xmlns:p="http://schemas.openxmlformats.org/presentationml/2006/main">
+  <p:cSld>
+    <p:spTree>
+      <p:nvGrpSpPr>
+        <p:cNvPr id="1" name=""/>
+        <p:cNvGrpSpPr/>
+        <p:nvPr/>
+      </p:nvGrpSpPr>
+      <p:grpSpPr>
+        <a:xfrm>
+          <a:off x="0" y="0"/>
+          <a:ext cx="0" cy="0"/>
+          <a:chOff x="0" y="0"/>
+          <a:chExt cx="0" cy="0"/>
+        </a:xfrm>
+      </p:grpSpPr>
+      <p:sp>
+        <p:nvSpPr>
+          <p:cNvPr id="2" name="Slide Image Placeholder 1"/>
+          <p:cNvSpPr>
+            <a:spLocks noGrp="1" noRot="1" noChangeAspect="1"/>
+          </p:cNvSpPr>
+          <p:nvPr>
+            <p:ph type="sldImg"/>
+          </p:nvPr>
+        </p:nvSpPr>
+        <p:spPr/>
+      </p:sp>
+      <p:sp>
+        <p:nvSpPr>
+          <p:cNvPr id="3" name="Notes Placeholder 2"/>
+          <p:cNvSpPr>
+            <a:spLocks noGrp="1"/>
+          </p:cNvSpPr>
+          <p:nvPr>
+            <p:ph type="body" idx="1"/>
+          </p:nvPr>
+        </p:nvSpPr>
+        <p:spPr/>
+        <p:txBody>
+          <a:bodyPr/>
+          <a:lstStyle/>
+          <a:p>
+            <a:r>
+              <a:rPr lang="en-US" dirty="0" smtClean="0"/>
+              <a:t>Execution contexts create a stack of running javascript code</a:t>
+            </a:r>
+            <a:endParaRPr lang="en-US" dirty="0"/>
+          </a:p>
+        </p:txBody>
+      </p:sp>
+      <p:sp>
+        <p:nvSpPr>
+          <p:cNvPr id="4" name="Slide Number Placeholder 3"/>
+          <p:cNvSpPr>
+            <a:spLocks noGrp="1"/>
+          </p:cNvSpPr>
+          <p:nvPr>
+            <p:ph type="sldNum" sz="quarter" idx="10"/>
+          </p:nvPr>
+        </p:nvSpPr>
+        <p:spPr/>
+        <p:txBody>
+          <a:bodyPr/>
+          <a:lstStyle/>
+          <a:p>
+            <a:fld id="{042B0272-D6CE-D246-814F-524707BF3A24}" type="slidenum">
+              <a:rPr lang="en-US" smtClean="0"/>
+              <a:t>9</a:t>
+            </a:fld>
+            <a:endParaRPr lang="en-US"/>
+          </a:p>
+        </p:txBody>
+      </p:sp>
+    </p:spTree>
+    <p:extLst>
+      <p:ext uri="{BB962C8B-B14F-4D97-AF65-F5344CB8AC3E}">
+        <p14:creationId xmlns:p14="http://schemas.microsoft.com/office/powerpoint/2010/main" val="2794308689"/>
       </p:ext>
     </p:extLst>
   </p:cSld>
@@ -4994,6 +5480,569 @@
 </p:sld>
 </file>
 
+<file path=ppt/slides/slide10.xml><?xml version="1.0" encoding="utf-8"?>
+<p:sld xmlns:a="http://schemas.openxmlformats.org/drawingml/2006/main" xmlns:r="http://schemas.openxmlformats.org/officeDocument/2006/relationships" xmlns:p="http://schemas.openxmlformats.org/presentationml/2006/main">
+  <p:cSld>
+    <p:spTree>
+      <p:nvGrpSpPr>
+        <p:cNvPr id="1" name=""/>
+        <p:cNvGrpSpPr/>
+        <p:nvPr/>
+      </p:nvGrpSpPr>
+      <p:grpSpPr>
+        <a:xfrm>
+          <a:off x="0" y="0"/>
+          <a:ext cx="0" cy="0"/>
+          <a:chOff x="0" y="0"/>
+          <a:chExt cx="0" cy="0"/>
+        </a:xfrm>
+      </p:grpSpPr>
+      <p:sp>
+        <p:nvSpPr>
+          <p:cNvPr id="2" name="Title 1"/>
+          <p:cNvSpPr>
+            <a:spLocks noGrp="1"/>
+          </p:cNvSpPr>
+          <p:nvPr>
+            <p:ph type="title"/>
+          </p:nvPr>
+        </p:nvSpPr>
+        <p:spPr/>
+        <p:txBody>
+          <a:bodyPr/>
+          <a:lstStyle/>
+          <a:p>
+            <a:r>
+              <a:rPr lang="en-US" dirty="0" smtClean="0"/>
+              <a:t>Execution contexts</a:t>
+            </a:r>
+            <a:endParaRPr lang="en-US" dirty="0"/>
+          </a:p>
+        </p:txBody>
+      </p:sp>
+      <p:sp>
+        <p:nvSpPr>
+          <p:cNvPr id="3" name="Content Placeholder 2"/>
+          <p:cNvSpPr>
+            <a:spLocks noGrp="1"/>
+          </p:cNvSpPr>
+          <p:nvPr>
+            <p:ph idx="1"/>
+          </p:nvPr>
+        </p:nvSpPr>
+        <p:spPr>
+          <a:xfrm>
+            <a:off x="457200" y="1600200"/>
+            <a:ext cx="5551178" cy="4525963"/>
+          </a:xfrm>
+        </p:spPr>
+        <p:txBody>
+          <a:bodyPr/>
+          <a:lstStyle/>
+          <a:p>
+            <a:pPr marL="0" indent="0">
+              <a:buNone/>
+            </a:pPr>
+            <a:r>
+              <a:rPr lang="en-US" dirty="0"/>
+              <a:t>function run(miles) {</a:t>
+            </a:r>
+          </a:p>
+          <a:p>
+            <a:pPr marL="0" indent="0">
+              <a:buNone/>
+            </a:pPr>
+            <a:r>
+              <a:rPr lang="en-US" dirty="0"/>
+              <a:t>  </a:t>
+            </a:r>
+            <a:r>
+              <a:rPr lang="en-US" dirty="0" err="1"/>
+              <a:t>console.log</a:t>
+            </a:r>
+            <a:r>
+              <a:rPr lang="en-US" dirty="0" smtClean="0"/>
+              <a:t>(..)</a:t>
+            </a:r>
+            <a:r>
+              <a:rPr lang="en-US" dirty="0"/>
+              <a:t>;</a:t>
+            </a:r>
+          </a:p>
+          <a:p>
+            <a:pPr marL="0" indent="0">
+              <a:buNone/>
+            </a:pPr>
+            <a:r>
+              <a:rPr lang="en-US" dirty="0"/>
+              <a:t>  function </a:t>
+            </a:r>
+            <a:r>
+              <a:rPr lang="en-US" dirty="0" err="1"/>
+              <a:t>calculateTime</a:t>
+            </a:r>
+            <a:r>
+              <a:rPr lang="en-US" dirty="0"/>
+              <a:t>(miles) {</a:t>
+            </a:r>
+          </a:p>
+          <a:p>
+            <a:pPr marL="0" indent="0">
+              <a:buNone/>
+            </a:pPr>
+            <a:r>
+              <a:rPr lang="en-US" dirty="0"/>
+              <a:t>    ..</a:t>
+            </a:r>
+          </a:p>
+          <a:p>
+            <a:pPr marL="0" indent="0">
+              <a:buNone/>
+            </a:pPr>
+            <a:r>
+              <a:rPr lang="en-US" dirty="0"/>
+              <a:t>  }</a:t>
+            </a:r>
+          </a:p>
+          <a:p>
+            <a:pPr marL="0" indent="0">
+              <a:buNone/>
+            </a:pPr>
+            <a:r>
+              <a:rPr lang="en-US" dirty="0"/>
+              <a:t>}</a:t>
+            </a:r>
+          </a:p>
+        </p:txBody>
+      </p:sp>
+      <p:sp>
+        <p:nvSpPr>
+          <p:cNvPr id="4" name="Rectangle 3"/>
+          <p:cNvSpPr/>
+          <p:nvPr/>
+        </p:nvSpPr>
+        <p:spPr>
+          <a:xfrm>
+            <a:off x="1654441" y="3482778"/>
+            <a:ext cx="6689012" cy="2811972"/>
+          </a:xfrm>
+          <a:prstGeom prst="rect">
+            <a:avLst/>
+          </a:prstGeom>
+          <a:noFill/>
+          <a:ln w="76200" cmpd="sng">
+            <a:solidFill>
+              <a:srgbClr val="008000"/>
+            </a:solidFill>
+          </a:ln>
+        </p:spPr>
+        <p:style>
+          <a:lnRef idx="2">
+            <a:schemeClr val="accent1"/>
+          </a:lnRef>
+          <a:fillRef idx="1">
+            <a:schemeClr val="lt1"/>
+          </a:fillRef>
+          <a:effectRef idx="0">
+            <a:schemeClr val="accent1"/>
+          </a:effectRef>
+          <a:fontRef idx="minor">
+            <a:schemeClr val="dk1"/>
+          </a:fontRef>
+        </p:style>
+        <p:txBody>
+          <a:bodyPr rtlCol="0" anchor="ctr"/>
+          <a:lstStyle/>
+          <a:p>
+            <a:pPr algn="ctr"/>
+            <a:endParaRPr lang="en-US"/>
+          </a:p>
+        </p:txBody>
+      </p:sp>
+      <p:sp>
+        <p:nvSpPr>
+          <p:cNvPr id="6" name="TextBox 5"/>
+          <p:cNvSpPr txBox="1"/>
+          <p:nvPr/>
+        </p:nvSpPr>
+        <p:spPr>
+          <a:xfrm>
+            <a:off x="1843652" y="3626186"/>
+            <a:ext cx="6002411" cy="2585323"/>
+          </a:xfrm>
+          <a:prstGeom prst="rect">
+            <a:avLst/>
+          </a:prstGeom>
+          <a:noFill/>
+        </p:spPr>
+        <p:txBody>
+          <a:bodyPr wrap="square" rtlCol="0">
+            <a:spAutoFit/>
+          </a:bodyPr>
+          <a:lstStyle/>
+          <a:p>
+            <a:r>
+              <a:rPr lang="en-US" dirty="0" err="1" smtClean="0"/>
+              <a:t>activationObject</a:t>
+            </a:r>
+            <a:r>
+              <a:rPr lang="en-US" dirty="0" smtClean="0"/>
+              <a:t> = {</a:t>
+            </a:r>
+          </a:p>
+          <a:p>
+            <a:r>
+              <a:rPr lang="en-US" dirty="0"/>
+              <a:t> </a:t>
+            </a:r>
+            <a:r>
+              <a:rPr lang="en-US" dirty="0" smtClean="0"/>
+              <a:t> arguments: [],</a:t>
+            </a:r>
+          </a:p>
+          <a:p>
+            <a:r>
+              <a:rPr lang="en-US" dirty="0"/>
+              <a:t> </a:t>
+            </a:r>
+            <a:r>
+              <a:rPr lang="en-US" dirty="0" smtClean="0"/>
+              <a:t> </a:t>
+            </a:r>
+            <a:r>
+              <a:rPr lang="en-US" dirty="0" err="1" smtClean="0"/>
+              <a:t>calculateTime</a:t>
+            </a:r>
+            <a:r>
+              <a:rPr lang="en-US" dirty="0" smtClean="0"/>
+              <a:t>: function() { .. }</a:t>
+            </a:r>
+          </a:p>
+          <a:p>
+            <a:r>
+              <a:rPr lang="en-US" dirty="0" smtClean="0"/>
+              <a:t>};</a:t>
+            </a:r>
+          </a:p>
+          <a:p>
+            <a:r>
+              <a:rPr lang="en-US" dirty="0" smtClean="0"/>
+              <a:t>scope = [</a:t>
+            </a:r>
+          </a:p>
+          <a:p>
+            <a:r>
+              <a:rPr lang="en-US" dirty="0"/>
+              <a:t> </a:t>
+            </a:r>
+            <a:r>
+              <a:rPr lang="en-US" dirty="0" smtClean="0"/>
+              <a:t> </a:t>
+            </a:r>
+            <a:r>
+              <a:rPr lang="en-US" dirty="0" err="1" smtClean="0"/>
+              <a:t>activationObject</a:t>
+            </a:r>
+            <a:r>
+              <a:rPr lang="en-US" dirty="0" smtClean="0"/>
+              <a:t>,</a:t>
+            </a:r>
+          </a:p>
+          <a:p>
+            <a:r>
+              <a:rPr lang="en-US" dirty="0"/>
+              <a:t> </a:t>
+            </a:r>
+            <a:r>
+              <a:rPr lang="en-US" dirty="0" smtClean="0"/>
+              <a:t> </a:t>
+            </a:r>
+            <a:r>
+              <a:rPr lang="en-US" dirty="0" err="1" smtClean="0"/>
+              <a:t>parent.scope</a:t>
+            </a:r>
+            <a:endParaRPr lang="en-US" dirty="0" smtClean="0"/>
+          </a:p>
+          <a:p>
+            <a:r>
+              <a:rPr lang="en-US" dirty="0" smtClean="0"/>
+              <a:t>];</a:t>
+            </a:r>
+          </a:p>
+          <a:p>
+            <a:r>
+              <a:rPr lang="en-US" dirty="0"/>
+              <a:t>t</a:t>
+            </a:r>
+            <a:r>
+              <a:rPr lang="en-US" dirty="0" smtClean="0"/>
+              <a:t>his = window;</a:t>
+            </a:r>
+            <a:endParaRPr lang="en-US" dirty="0"/>
+          </a:p>
+        </p:txBody>
+      </p:sp>
+    </p:spTree>
+    <p:extLst>
+      <p:ext uri="{BB962C8B-B14F-4D97-AF65-F5344CB8AC3E}">
+        <p14:creationId xmlns:p14="http://schemas.microsoft.com/office/powerpoint/2010/main" val="1824560478"/>
+      </p:ext>
+    </p:extLst>
+  </p:cSld>
+  <p:clrMapOvr>
+    <a:masterClrMapping/>
+  </p:clrMapOvr>
+</p:sld>
+</file>
+
+<file path=ppt/slides/slide11.xml><?xml version="1.0" encoding="utf-8"?>
+<p:sld xmlns:a="http://schemas.openxmlformats.org/drawingml/2006/main" xmlns:r="http://schemas.openxmlformats.org/officeDocument/2006/relationships" xmlns:p="http://schemas.openxmlformats.org/presentationml/2006/main">
+  <p:cSld>
+    <p:spTree>
+      <p:nvGrpSpPr>
+        <p:cNvPr id="1" name=""/>
+        <p:cNvGrpSpPr/>
+        <p:nvPr/>
+      </p:nvGrpSpPr>
+      <p:grpSpPr>
+        <a:xfrm>
+          <a:off x="0" y="0"/>
+          <a:ext cx="0" cy="0"/>
+          <a:chOff x="0" y="0"/>
+          <a:chExt cx="0" cy="0"/>
+        </a:xfrm>
+      </p:grpSpPr>
+      <p:sp>
+        <p:nvSpPr>
+          <p:cNvPr id="2" name="Title 1"/>
+          <p:cNvSpPr>
+            <a:spLocks noGrp="1"/>
+          </p:cNvSpPr>
+          <p:nvPr>
+            <p:ph type="title"/>
+          </p:nvPr>
+        </p:nvSpPr>
+        <p:spPr/>
+        <p:txBody>
+          <a:bodyPr/>
+          <a:lstStyle/>
+          <a:p>
+            <a:r>
+              <a:rPr lang="en-US" dirty="0" smtClean="0"/>
+              <a:t>Method context</a:t>
+            </a:r>
+            <a:r>
+              <a:rPr lang="en-US" dirty="0"/>
+              <a:t> </a:t>
+            </a:r>
+            <a:r>
+              <a:rPr lang="en-US" dirty="0" smtClean="0"/>
+              <a:t>and </a:t>
+            </a:r>
+            <a:r>
+              <a:rPr lang="en-US" dirty="0" smtClean="0">
+                <a:latin typeface="Andale Mono"/>
+                <a:cs typeface="Andale Mono"/>
+              </a:rPr>
+              <a:t>this</a:t>
+            </a:r>
+            <a:endParaRPr lang="en-US" dirty="0"/>
+          </a:p>
+        </p:txBody>
+      </p:sp>
+      <p:sp>
+        <p:nvSpPr>
+          <p:cNvPr id="3" name="Content Placeholder 2"/>
+          <p:cNvSpPr>
+            <a:spLocks noGrp="1"/>
+          </p:cNvSpPr>
+          <p:nvPr>
+            <p:ph idx="1"/>
+          </p:nvPr>
+        </p:nvSpPr>
+        <p:spPr/>
+        <p:txBody>
+          <a:bodyPr/>
+          <a:lstStyle/>
+          <a:p>
+            <a:endParaRPr lang="en-US" dirty="0"/>
+          </a:p>
+        </p:txBody>
+      </p:sp>
+    </p:spTree>
+    <p:extLst>
+      <p:ext uri="{BB962C8B-B14F-4D97-AF65-F5344CB8AC3E}">
+        <p14:creationId xmlns:p14="http://schemas.microsoft.com/office/powerpoint/2010/main" val="699690911"/>
+      </p:ext>
+    </p:extLst>
+  </p:cSld>
+  <p:clrMapOvr>
+    <a:masterClrMapping/>
+  </p:clrMapOvr>
+</p:sld>
+</file>
+
+<file path=ppt/slides/slide12.xml><?xml version="1.0" encoding="utf-8"?>
+<p:sld xmlns:a="http://schemas.openxmlformats.org/drawingml/2006/main" xmlns:r="http://schemas.openxmlformats.org/officeDocument/2006/relationships" xmlns:p="http://schemas.openxmlformats.org/presentationml/2006/main">
+  <p:cSld>
+    <p:spTree>
+      <p:nvGrpSpPr>
+        <p:cNvPr id="1" name=""/>
+        <p:cNvGrpSpPr/>
+        <p:nvPr/>
+      </p:nvGrpSpPr>
+      <p:grpSpPr>
+        <a:xfrm>
+          <a:off x="0" y="0"/>
+          <a:ext cx="0" cy="0"/>
+          <a:chOff x="0" y="0"/>
+          <a:chExt cx="0" cy="0"/>
+        </a:xfrm>
+      </p:grpSpPr>
+      <p:sp>
+        <p:nvSpPr>
+          <p:cNvPr id="2" name="Title 1"/>
+          <p:cNvSpPr>
+            <a:spLocks noGrp="1"/>
+          </p:cNvSpPr>
+          <p:nvPr>
+            <p:ph type="title"/>
+          </p:nvPr>
+        </p:nvSpPr>
+        <p:spPr/>
+        <p:txBody>
+          <a:bodyPr/>
+          <a:lstStyle/>
+          <a:p>
+            <a:r>
+              <a:rPr lang="en-US" dirty="0" smtClean="0"/>
+              <a:t>Object prototype</a:t>
+            </a:r>
+            <a:endParaRPr lang="en-US" dirty="0"/>
+          </a:p>
+        </p:txBody>
+      </p:sp>
+      <p:sp>
+        <p:nvSpPr>
+          <p:cNvPr id="3" name="Content Placeholder 2"/>
+          <p:cNvSpPr>
+            <a:spLocks noGrp="1"/>
+          </p:cNvSpPr>
+          <p:nvPr>
+            <p:ph idx="1"/>
+          </p:nvPr>
+        </p:nvSpPr>
+        <p:spPr/>
+        <p:txBody>
+          <a:bodyPr/>
+          <a:lstStyle/>
+          <a:p>
+            <a:r>
+              <a:rPr lang="en-US" dirty="0" smtClean="0"/>
+              <a:t>Object prototype</a:t>
+            </a:r>
+          </a:p>
+          <a:p>
+            <a:r>
+              <a:rPr lang="en-US" dirty="0" smtClean="0"/>
+              <a:t>Prototype chaining</a:t>
+            </a:r>
+            <a:endParaRPr lang="en-US" dirty="0"/>
+          </a:p>
+        </p:txBody>
+      </p:sp>
+    </p:spTree>
+    <p:extLst>
+      <p:ext uri="{BB962C8B-B14F-4D97-AF65-F5344CB8AC3E}">
+        <p14:creationId xmlns:p14="http://schemas.microsoft.com/office/powerpoint/2010/main" val="4108905525"/>
+      </p:ext>
+    </p:extLst>
+  </p:cSld>
+  <p:clrMapOvr>
+    <a:masterClrMapping/>
+  </p:clrMapOvr>
+  <p:timing>
+    <p:tnLst>
+      <p:par>
+        <p:cTn xmlns:p14="http://schemas.microsoft.com/office/powerpoint/2010/main" id="1" dur="indefinite" restart="never" nodeType="tmRoot"/>
+      </p:par>
+    </p:tnLst>
+  </p:timing>
+</p:sld>
+</file>
+
+<file path=ppt/slides/slide13.xml><?xml version="1.0" encoding="utf-8"?>
+<p:sld xmlns:a="http://schemas.openxmlformats.org/drawingml/2006/main" xmlns:r="http://schemas.openxmlformats.org/officeDocument/2006/relationships" xmlns:p="http://schemas.openxmlformats.org/presentationml/2006/main">
+  <p:cSld>
+    <p:spTree>
+      <p:nvGrpSpPr>
+        <p:cNvPr id="1" name=""/>
+        <p:cNvGrpSpPr/>
+        <p:nvPr/>
+      </p:nvGrpSpPr>
+      <p:grpSpPr>
+        <a:xfrm>
+          <a:off x="0" y="0"/>
+          <a:ext cx="0" cy="0"/>
+          <a:chOff x="0" y="0"/>
+          <a:chExt cx="0" cy="0"/>
+        </a:xfrm>
+      </p:grpSpPr>
+      <p:sp>
+        <p:nvSpPr>
+          <p:cNvPr id="2" name="Title 1"/>
+          <p:cNvSpPr>
+            <a:spLocks noGrp="1"/>
+          </p:cNvSpPr>
+          <p:nvPr>
+            <p:ph type="title"/>
+          </p:nvPr>
+        </p:nvSpPr>
+        <p:spPr/>
+        <p:txBody>
+          <a:bodyPr/>
+          <a:lstStyle/>
+          <a:p>
+            <a:r>
+              <a:rPr lang="en-US" dirty="0" smtClean="0"/>
+              <a:t>Future versions</a:t>
+            </a:r>
+            <a:endParaRPr lang="en-US" dirty="0"/>
+          </a:p>
+        </p:txBody>
+      </p:sp>
+      <p:sp>
+        <p:nvSpPr>
+          <p:cNvPr id="3" name="Content Placeholder 2"/>
+          <p:cNvSpPr>
+            <a:spLocks noGrp="1"/>
+          </p:cNvSpPr>
+          <p:nvPr>
+            <p:ph idx="1"/>
+          </p:nvPr>
+        </p:nvSpPr>
+        <p:spPr/>
+        <p:txBody>
+          <a:bodyPr/>
+          <a:lstStyle/>
+          <a:p>
+            <a:endParaRPr lang="en-US"/>
+          </a:p>
+        </p:txBody>
+      </p:sp>
+    </p:spTree>
+    <p:extLst>
+      <p:ext uri="{BB962C8B-B14F-4D97-AF65-F5344CB8AC3E}">
+        <p14:creationId xmlns:p14="http://schemas.microsoft.com/office/powerpoint/2010/main" val="4032478991"/>
+      </p:ext>
+    </p:extLst>
+  </p:cSld>
+  <p:clrMapOvr>
+    <a:masterClrMapping/>
+  </p:clrMapOvr>
+</p:sld>
+</file>
+
 <file path=ppt/slides/slide2.xml><?xml version="1.0" encoding="utf-8"?>
 <p:sld xmlns:a="http://schemas.openxmlformats.org/drawingml/2006/main" xmlns:r="http://schemas.openxmlformats.org/officeDocument/2006/relationships" xmlns:p="http://schemas.openxmlformats.org/presentationml/2006/main">
   <p:cSld>
@@ -5953,6 +7002,50 @@
       </p:grpSpPr>
       <p:sp>
         <p:nvSpPr>
+          <p:cNvPr id="4" name="Rectangle 3"/>
+          <p:cNvSpPr/>
+          <p:nvPr/>
+        </p:nvSpPr>
+        <p:spPr>
+          <a:xfrm>
+            <a:off x="249433" y="1417637"/>
+            <a:ext cx="8437367" cy="4669733"/>
+          </a:xfrm>
+          <a:prstGeom prst="rect">
+            <a:avLst/>
+          </a:prstGeom>
+          <a:noFill/>
+          <a:ln w="76200" cmpd="sng">
+            <a:solidFill>
+              <a:srgbClr val="FF0000"/>
+            </a:solidFill>
+          </a:ln>
+        </p:spPr>
+        <p:style>
+          <a:lnRef idx="2">
+            <a:schemeClr val="accent1"/>
+          </a:lnRef>
+          <a:fillRef idx="1">
+            <a:schemeClr val="lt1"/>
+          </a:fillRef>
+          <a:effectRef idx="0">
+            <a:schemeClr val="accent1"/>
+          </a:effectRef>
+          <a:fontRef idx="minor">
+            <a:schemeClr val="dk1"/>
+          </a:fontRef>
+        </p:style>
+        <p:txBody>
+          <a:bodyPr rtlCol="0" anchor="ctr"/>
+          <a:lstStyle/>
+          <a:p>
+            <a:pPr algn="ctr"/>
+            <a:endParaRPr lang="en-US"/>
+          </a:p>
+        </p:txBody>
+      </p:sp>
+      <p:sp>
+        <p:nvSpPr>
           <p:cNvPr id="2" name="Title 1"/>
           <p:cNvSpPr>
             <a:spLocks noGrp="1"/>
@@ -5968,7 +7061,7 @@
           <a:p>
             <a:r>
               <a:rPr lang="en-US" dirty="0" smtClean="0"/>
-              <a:t>Inheritance javascript style</a:t>
+              <a:t>Execution contexts</a:t>
             </a:r>
             <a:endParaRPr lang="en-US" dirty="0"/>
           </a:p>
@@ -5986,40 +7079,417 @@
         </p:nvSpPr>
         <p:spPr/>
         <p:txBody>
-          <a:bodyPr/>
-          <a:lstStyle/>
-          <a:p>
-            <a:r>
-              <a:rPr lang="en-US" dirty="0" smtClean="0"/>
-              <a:t>Object prototype</a:t>
-            </a:r>
-          </a:p>
-          <a:p>
-            <a:r>
-              <a:rPr lang="en-US" dirty="0" smtClean="0"/>
-              <a:t>Prototype chaining</a:t>
+          <a:bodyPr>
+            <a:normAutofit fontScale="92500"/>
+          </a:bodyPr>
+          <a:lstStyle/>
+          <a:p>
+            <a:pPr marL="0" indent="0">
+              <a:buNone/>
+            </a:pPr>
+            <a:r>
+              <a:rPr lang="en-US" dirty="0" err="1" smtClean="0"/>
+              <a:t>var</a:t>
+            </a:r>
+            <a:r>
+              <a:rPr lang="en-US" dirty="0" smtClean="0"/>
+              <a:t> </a:t>
+            </a:r>
+            <a:r>
+              <a:rPr lang="en-US" dirty="0" err="1" smtClean="0"/>
+              <a:t>icecreamMarathonLength</a:t>
+            </a:r>
+            <a:r>
+              <a:rPr lang="en-US" dirty="0" smtClean="0"/>
+              <a:t> = 26;</a:t>
+            </a:r>
+          </a:p>
+          <a:p>
+            <a:pPr marL="0" indent="0">
+              <a:buNone/>
+            </a:pPr>
+            <a:r>
+              <a:rPr lang="en-US" dirty="0"/>
+              <a:t>f</a:t>
+            </a:r>
+            <a:r>
+              <a:rPr lang="en-US" dirty="0" smtClean="0"/>
+              <a:t>unction run(miles) {</a:t>
+            </a:r>
+          </a:p>
+          <a:p>
+            <a:pPr marL="0" indent="0">
+              <a:buNone/>
+            </a:pPr>
+            <a:r>
+              <a:rPr lang="en-US" dirty="0"/>
+              <a:t> </a:t>
+            </a:r>
+            <a:r>
+              <a:rPr lang="en-US" dirty="0" smtClean="0"/>
+              <a:t> </a:t>
+            </a:r>
+            <a:r>
+              <a:rPr lang="en-US" dirty="0" err="1" smtClean="0"/>
+              <a:t>console.log</a:t>
+            </a:r>
+            <a:r>
+              <a:rPr lang="en-US" dirty="0" smtClean="0"/>
+              <a:t>("running for", </a:t>
+            </a:r>
+            <a:r>
+              <a:rPr lang="en-US" dirty="0" err="1" smtClean="0"/>
+              <a:t>calculateTime</a:t>
+            </a:r>
+            <a:r>
+              <a:rPr lang="en-US" dirty="0" smtClean="0"/>
+              <a:t>(miles));</a:t>
+            </a:r>
+          </a:p>
+          <a:p>
+            <a:pPr marL="0" indent="0">
+              <a:buNone/>
+            </a:pPr>
+            <a:r>
+              <a:rPr lang="en-US" dirty="0"/>
+              <a:t> </a:t>
+            </a:r>
+            <a:r>
+              <a:rPr lang="en-US" dirty="0" smtClean="0"/>
+              <a:t> function </a:t>
+            </a:r>
+            <a:r>
+              <a:rPr lang="en-US" dirty="0" err="1" smtClean="0"/>
+              <a:t>calculateTime</a:t>
+            </a:r>
+            <a:r>
+              <a:rPr lang="en-US" dirty="0" smtClean="0"/>
+              <a:t>(miles) {</a:t>
+            </a:r>
+          </a:p>
+          <a:p>
+            <a:pPr marL="0" indent="0">
+              <a:buNone/>
+            </a:pPr>
+            <a:r>
+              <a:rPr lang="en-US" dirty="0"/>
+              <a:t> </a:t>
+            </a:r>
+            <a:r>
+              <a:rPr lang="en-US" dirty="0" smtClean="0"/>
+              <a:t>   ..</a:t>
+            </a:r>
+          </a:p>
+          <a:p>
+            <a:pPr marL="0" indent="0">
+              <a:buNone/>
+            </a:pPr>
+            <a:r>
+              <a:rPr lang="en-US" dirty="0" smtClean="0"/>
+              <a:t>  }</a:t>
+            </a:r>
+          </a:p>
+          <a:p>
+            <a:pPr marL="0" indent="0">
+              <a:buNone/>
+            </a:pPr>
+            <a:r>
+              <a:rPr lang="en-US" dirty="0" smtClean="0"/>
+              <a:t>}</a:t>
+            </a:r>
+          </a:p>
+          <a:p>
+            <a:pPr marL="0" indent="0">
+              <a:buNone/>
+            </a:pPr>
+            <a:r>
+              <a:rPr lang="en-US" dirty="0"/>
+              <a:t>r</a:t>
+            </a:r>
+            <a:r>
+              <a:rPr lang="en-US" dirty="0" smtClean="0"/>
+              <a:t>un(</a:t>
+            </a:r>
+            <a:r>
+              <a:rPr lang="en-US" dirty="0" err="1" smtClean="0"/>
+              <a:t>icecreamMarathonLength</a:t>
+            </a:r>
+            <a:r>
+              <a:rPr lang="en-US" dirty="0" smtClean="0"/>
+              <a:t>);</a:t>
             </a:r>
             <a:endParaRPr lang="en-US" dirty="0"/>
           </a:p>
         </p:txBody>
       </p:sp>
+      <p:sp>
+        <p:nvSpPr>
+          <p:cNvPr id="5" name="Rectangle 4"/>
+          <p:cNvSpPr/>
+          <p:nvPr/>
+        </p:nvSpPr>
+        <p:spPr>
+          <a:xfrm>
+            <a:off x="657596" y="2717953"/>
+            <a:ext cx="7823137" cy="2181023"/>
+          </a:xfrm>
+          <a:prstGeom prst="rect">
+            <a:avLst/>
+          </a:prstGeom>
+          <a:noFill/>
+          <a:ln w="76200" cmpd="sng">
+            <a:solidFill>
+              <a:srgbClr val="008000"/>
+            </a:solidFill>
+          </a:ln>
+        </p:spPr>
+        <p:style>
+          <a:lnRef idx="2">
+            <a:schemeClr val="accent1"/>
+          </a:lnRef>
+          <a:fillRef idx="1">
+            <a:schemeClr val="lt1"/>
+          </a:fillRef>
+          <a:effectRef idx="0">
+            <a:schemeClr val="accent1"/>
+          </a:effectRef>
+          <a:fontRef idx="minor">
+            <a:schemeClr val="dk1"/>
+          </a:fontRef>
+        </p:style>
+        <p:txBody>
+          <a:bodyPr rtlCol="0" anchor="ctr"/>
+          <a:lstStyle/>
+          <a:p>
+            <a:pPr algn="ctr"/>
+            <a:endParaRPr lang="en-US"/>
+          </a:p>
+        </p:txBody>
+      </p:sp>
+      <p:sp>
+        <p:nvSpPr>
+          <p:cNvPr id="6" name="TextBox 5"/>
+          <p:cNvSpPr txBox="1"/>
+          <p:nvPr/>
+        </p:nvSpPr>
+        <p:spPr>
+          <a:xfrm>
+            <a:off x="657596" y="6060061"/>
+            <a:ext cx="3618682" cy="707886"/>
+          </a:xfrm>
+          <a:prstGeom prst="rect">
+            <a:avLst/>
+          </a:prstGeom>
+          <a:noFill/>
+        </p:spPr>
+        <p:txBody>
+          <a:bodyPr wrap="square" rtlCol="0">
+            <a:spAutoFit/>
+          </a:bodyPr>
+          <a:lstStyle/>
+          <a:p>
+            <a:r>
+              <a:rPr lang="en-US" sz="4000" dirty="0" smtClean="0"/>
+              <a:t>Global context</a:t>
+            </a:r>
+            <a:endParaRPr lang="en-US" sz="4000" dirty="0"/>
+          </a:p>
+        </p:txBody>
+      </p:sp>
+      <p:sp>
+        <p:nvSpPr>
+          <p:cNvPr id="7" name="TextBox 6"/>
+          <p:cNvSpPr txBox="1"/>
+          <p:nvPr/>
+        </p:nvSpPr>
+        <p:spPr>
+          <a:xfrm>
+            <a:off x="4647164" y="6087371"/>
+            <a:ext cx="4039635" cy="707886"/>
+          </a:xfrm>
+          <a:prstGeom prst="rect">
+            <a:avLst/>
+          </a:prstGeom>
+          <a:noFill/>
+        </p:spPr>
+        <p:txBody>
+          <a:bodyPr wrap="square" rtlCol="0">
+            <a:spAutoFit/>
+          </a:bodyPr>
+          <a:lstStyle/>
+          <a:p>
+            <a:r>
+              <a:rPr lang="en-US" sz="4000" dirty="0" smtClean="0"/>
+              <a:t>Function context</a:t>
+            </a:r>
+            <a:endParaRPr lang="en-US" sz="4000" dirty="0"/>
+          </a:p>
+        </p:txBody>
+      </p:sp>
+      <p:cxnSp>
+        <p:nvCxnSpPr>
+          <p:cNvPr id="9" name="Straight Arrow Connector 8"/>
+          <p:cNvCxnSpPr/>
+          <p:nvPr/>
+        </p:nvCxnSpPr>
+        <p:spPr>
+          <a:xfrm flipH="1" flipV="1">
+            <a:off x="1356577" y="5895316"/>
+            <a:ext cx="555180" cy="461694"/>
+          </a:xfrm>
+          <a:prstGeom prst="straightConnector1">
+            <a:avLst/>
+          </a:prstGeom>
+          <a:ln w="76200" cmpd="sng">
+            <a:solidFill>
+              <a:srgbClr val="FF0000"/>
+            </a:solidFill>
+            <a:tailEnd type="arrow"/>
+          </a:ln>
+        </p:spPr>
+        <p:style>
+          <a:lnRef idx="2">
+            <a:schemeClr val="accent1"/>
+          </a:lnRef>
+          <a:fillRef idx="0">
+            <a:schemeClr val="accent1"/>
+          </a:fillRef>
+          <a:effectRef idx="1">
+            <a:schemeClr val="accent1"/>
+          </a:effectRef>
+          <a:fontRef idx="minor">
+            <a:schemeClr val="tx1"/>
+          </a:fontRef>
+        </p:style>
+      </p:cxnSp>
+      <p:cxnSp>
+        <p:nvCxnSpPr>
+          <p:cNvPr id="11" name="Straight Arrow Connector 10"/>
+          <p:cNvCxnSpPr>
+            <a:stCxn id="7" idx="0"/>
+          </p:cNvCxnSpPr>
+          <p:nvPr/>
+        </p:nvCxnSpPr>
+        <p:spPr>
+          <a:xfrm flipH="1" flipV="1">
+            <a:off x="5298298" y="3918879"/>
+            <a:ext cx="1368684" cy="2321252"/>
+          </a:xfrm>
+          <a:prstGeom prst="straightConnector1">
+            <a:avLst/>
+          </a:prstGeom>
+          <a:ln w="76200" cmpd="sng">
+            <a:solidFill>
+              <a:srgbClr val="008000"/>
+            </a:solidFill>
+            <a:tailEnd type="arrow"/>
+          </a:ln>
+        </p:spPr>
+        <p:style>
+          <a:lnRef idx="2">
+            <a:schemeClr val="accent1"/>
+          </a:lnRef>
+          <a:fillRef idx="0">
+            <a:schemeClr val="accent1"/>
+          </a:fillRef>
+          <a:effectRef idx="1">
+            <a:schemeClr val="accent1"/>
+          </a:effectRef>
+          <a:fontRef idx="minor">
+            <a:schemeClr val="tx1"/>
+          </a:fontRef>
+        </p:style>
+      </p:cxnSp>
+      <p:sp>
+        <p:nvSpPr>
+          <p:cNvPr id="15" name="Rectangle 14"/>
+          <p:cNvSpPr/>
+          <p:nvPr/>
+        </p:nvSpPr>
+        <p:spPr>
+          <a:xfrm>
+            <a:off x="850008" y="3745055"/>
+            <a:ext cx="7288614" cy="624404"/>
+          </a:xfrm>
+          <a:prstGeom prst="rect">
+            <a:avLst/>
+          </a:prstGeom>
+          <a:noFill/>
+          <a:ln w="76200" cmpd="sng">
+            <a:solidFill>
+              <a:srgbClr val="008000"/>
+            </a:solidFill>
+          </a:ln>
+        </p:spPr>
+        <p:style>
+          <a:lnRef idx="2">
+            <a:schemeClr val="accent1"/>
+          </a:lnRef>
+          <a:fillRef idx="1">
+            <a:schemeClr val="lt1"/>
+          </a:fillRef>
+          <a:effectRef idx="0">
+            <a:schemeClr val="accent1"/>
+          </a:effectRef>
+          <a:fontRef idx="minor">
+            <a:schemeClr val="dk1"/>
+          </a:fontRef>
+        </p:style>
+        <p:txBody>
+          <a:bodyPr rtlCol="0" anchor="ctr"/>
+          <a:lstStyle/>
+          <a:p>
+            <a:pPr algn="ctr"/>
+            <a:endParaRPr lang="en-US"/>
+          </a:p>
+        </p:txBody>
+      </p:sp>
+      <p:cxnSp>
+        <p:nvCxnSpPr>
+          <p:cNvPr id="19" name="Straight Arrow Connector 18"/>
+          <p:cNvCxnSpPr/>
+          <p:nvPr/>
+        </p:nvCxnSpPr>
+        <p:spPr>
+          <a:xfrm flipH="1" flipV="1">
+            <a:off x="4779392" y="4628894"/>
+            <a:ext cx="1624993" cy="1611237"/>
+          </a:xfrm>
+          <a:prstGeom prst="straightConnector1">
+            <a:avLst/>
+          </a:prstGeom>
+          <a:ln w="76200" cmpd="sng">
+            <a:solidFill>
+              <a:srgbClr val="008000"/>
+            </a:solidFill>
+            <a:tailEnd type="arrow"/>
+          </a:ln>
+        </p:spPr>
+        <p:style>
+          <a:lnRef idx="2">
+            <a:schemeClr val="accent1"/>
+          </a:lnRef>
+          <a:fillRef idx="0">
+            <a:schemeClr val="accent1"/>
+          </a:fillRef>
+          <a:effectRef idx="1">
+            <a:schemeClr val="accent1"/>
+          </a:effectRef>
+          <a:fontRef idx="minor">
+            <a:schemeClr val="tx1"/>
+          </a:fontRef>
+        </p:style>
+      </p:cxnSp>
     </p:spTree>
     <p:extLst>
       <p:ext uri="{BB962C8B-B14F-4D97-AF65-F5344CB8AC3E}">
-        <p14:creationId xmlns:p14="http://schemas.microsoft.com/office/powerpoint/2010/main" val="4108905525"/>
+        <p14:creationId xmlns:p14="http://schemas.microsoft.com/office/powerpoint/2010/main" val="113075380"/>
       </p:ext>
     </p:extLst>
   </p:cSld>
   <p:clrMapOvr>
     <a:masterClrMapping/>
   </p:clrMapOvr>
-  <p:timing>
-    <p:tnLst>
-      <p:par>
-        <p:cTn xmlns:p14="http://schemas.microsoft.com/office/powerpoint/2010/main" id="1" dur="indefinite" restart="never" nodeType="tmRoot"/>
-      </p:par>
-    </p:tnLst>
-  </p:timing>
 </p:sld>
 </file>
 
@@ -6057,7 +7527,7 @@
           <a:p>
             <a:r>
               <a:rPr lang="en-US" dirty="0" smtClean="0"/>
-              <a:t>Future versions</a:t>
+              <a:t>Execution contexts</a:t>
             </a:r>
             <a:endParaRPr lang="en-US" dirty="0"/>
           </a:p>
@@ -6065,27 +7535,302 @@
       </p:sp>
       <p:sp>
         <p:nvSpPr>
-          <p:cNvPr id="3" name="Content Placeholder 2"/>
-          <p:cNvSpPr>
-            <a:spLocks noGrp="1"/>
-          </p:cNvSpPr>
-          <p:nvPr>
-            <p:ph idx="1"/>
-          </p:nvPr>
-        </p:nvSpPr>
-        <p:spPr/>
-        <p:txBody>
-          <a:bodyPr/>
-          <a:lstStyle/>
-          <a:p>
-            <a:endParaRPr lang="en-US"/>
+          <p:cNvPr id="4" name="Rectangle 3"/>
+          <p:cNvSpPr/>
+          <p:nvPr/>
+        </p:nvSpPr>
+        <p:spPr>
+          <a:xfrm>
+            <a:off x="955879" y="5065840"/>
+            <a:ext cx="5161743" cy="1133328"/>
+          </a:xfrm>
+          <a:prstGeom prst="rect">
+            <a:avLst/>
+          </a:prstGeom>
+          <a:solidFill>
+            <a:srgbClr val="FF0000"/>
+          </a:solidFill>
+          <a:ln>
+            <a:solidFill>
+              <a:schemeClr val="tx1"/>
+            </a:solidFill>
+          </a:ln>
+        </p:spPr>
+        <p:style>
+          <a:lnRef idx="1">
+            <a:schemeClr val="accent1"/>
+          </a:lnRef>
+          <a:fillRef idx="3">
+            <a:schemeClr val="accent1"/>
+          </a:fillRef>
+          <a:effectRef idx="2">
+            <a:schemeClr val="accent1"/>
+          </a:effectRef>
+          <a:fontRef idx="minor">
+            <a:schemeClr val="lt1"/>
+          </a:fontRef>
+        </p:style>
+        <p:txBody>
+          <a:bodyPr rtlCol="0" anchor="ctr"/>
+          <a:lstStyle/>
+          <a:p>
+            <a:pPr algn="ctr"/>
+            <a:r>
+              <a:rPr lang="en-US" sz="3600" dirty="0" smtClean="0"/>
+              <a:t>Global context</a:t>
+            </a:r>
+            <a:endParaRPr lang="en-US" sz="3600" dirty="0"/>
+          </a:p>
+        </p:txBody>
+      </p:sp>
+      <p:sp>
+        <p:nvSpPr>
+          <p:cNvPr id="5" name="Rectangle 4"/>
+          <p:cNvSpPr/>
+          <p:nvPr/>
+        </p:nvSpPr>
+        <p:spPr>
+          <a:xfrm>
+            <a:off x="955879" y="3716238"/>
+            <a:ext cx="5161743" cy="1133328"/>
+          </a:xfrm>
+          <a:prstGeom prst="rect">
+            <a:avLst/>
+          </a:prstGeom>
+          <a:solidFill>
+            <a:srgbClr val="008000"/>
+          </a:solidFill>
+          <a:ln>
+            <a:solidFill>
+              <a:schemeClr val="tx1"/>
+            </a:solidFill>
+          </a:ln>
+        </p:spPr>
+        <p:style>
+          <a:lnRef idx="1">
+            <a:schemeClr val="accent1"/>
+          </a:lnRef>
+          <a:fillRef idx="3">
+            <a:schemeClr val="accent1"/>
+          </a:fillRef>
+          <a:effectRef idx="2">
+            <a:schemeClr val="accent1"/>
+          </a:effectRef>
+          <a:fontRef idx="minor">
+            <a:schemeClr val="lt1"/>
+          </a:fontRef>
+        </p:style>
+        <p:txBody>
+          <a:bodyPr rtlCol="0" anchor="ctr"/>
+          <a:lstStyle/>
+          <a:p>
+            <a:pPr algn="ctr"/>
+            <a:r>
+              <a:rPr lang="en-US" sz="3600" dirty="0"/>
+              <a:t>r</a:t>
+            </a:r>
+            <a:r>
+              <a:rPr lang="en-US" sz="3600" dirty="0" smtClean="0"/>
+              <a:t>un function context</a:t>
+            </a:r>
+            <a:endParaRPr lang="en-US" sz="3600" dirty="0"/>
+          </a:p>
+        </p:txBody>
+      </p:sp>
+      <p:sp>
+        <p:nvSpPr>
+          <p:cNvPr id="6" name="Rectangle 5"/>
+          <p:cNvSpPr/>
+          <p:nvPr/>
+        </p:nvSpPr>
+        <p:spPr>
+          <a:xfrm>
+            <a:off x="955879" y="2337129"/>
+            <a:ext cx="5161743" cy="1133328"/>
+          </a:xfrm>
+          <a:prstGeom prst="rect">
+            <a:avLst/>
+          </a:prstGeom>
+          <a:solidFill>
+            <a:srgbClr val="008000"/>
+          </a:solidFill>
+          <a:ln>
+            <a:solidFill>
+              <a:schemeClr val="tx1"/>
+            </a:solidFill>
+          </a:ln>
+        </p:spPr>
+        <p:style>
+          <a:lnRef idx="1">
+            <a:schemeClr val="accent1"/>
+          </a:lnRef>
+          <a:fillRef idx="3">
+            <a:schemeClr val="accent1"/>
+          </a:fillRef>
+          <a:effectRef idx="2">
+            <a:schemeClr val="accent1"/>
+          </a:effectRef>
+          <a:fontRef idx="minor">
+            <a:schemeClr val="lt1"/>
+          </a:fontRef>
+        </p:style>
+        <p:txBody>
+          <a:bodyPr rtlCol="0" anchor="ctr"/>
+          <a:lstStyle/>
+          <a:p>
+            <a:pPr algn="ctr"/>
+            <a:r>
+              <a:rPr lang="en-US" sz="3600" dirty="0" err="1" smtClean="0"/>
+              <a:t>calculateTime</a:t>
+            </a:r>
+            <a:r>
+              <a:rPr lang="en-US" sz="3600" dirty="0" smtClean="0"/>
+              <a:t>() function context</a:t>
+            </a:r>
+            <a:endParaRPr lang="en-US" sz="3600" dirty="0"/>
+          </a:p>
+        </p:txBody>
+      </p:sp>
+      <p:cxnSp>
+        <p:nvCxnSpPr>
+          <p:cNvPr id="8" name="Curved Connector 7"/>
+          <p:cNvCxnSpPr/>
+          <p:nvPr/>
+        </p:nvCxnSpPr>
+        <p:spPr>
+          <a:xfrm>
+            <a:off x="6116667" y="4501376"/>
+            <a:ext cx="12700" cy="1379109"/>
+          </a:xfrm>
+          <a:prstGeom prst="curvedConnector3">
+            <a:avLst>
+              <a:gd name="adj1" fmla="val 6315953"/>
+            </a:avLst>
+          </a:prstGeom>
+          <a:ln w="76200" cmpd="sng">
+            <a:solidFill>
+              <a:srgbClr val="000000"/>
+            </a:solidFill>
+            <a:tailEnd type="arrow"/>
+          </a:ln>
+        </p:spPr>
+        <p:style>
+          <a:lnRef idx="2">
+            <a:schemeClr val="accent1"/>
+          </a:lnRef>
+          <a:fillRef idx="0">
+            <a:schemeClr val="accent1"/>
+          </a:fillRef>
+          <a:effectRef idx="1">
+            <a:schemeClr val="accent1"/>
+          </a:effectRef>
+          <a:fontRef idx="minor">
+            <a:schemeClr val="tx1"/>
+          </a:fontRef>
+        </p:style>
+      </p:cxnSp>
+      <p:cxnSp>
+        <p:nvCxnSpPr>
+          <p:cNvPr id="10" name="Curved Connector 9"/>
+          <p:cNvCxnSpPr/>
+          <p:nvPr/>
+        </p:nvCxnSpPr>
+        <p:spPr>
+          <a:xfrm>
+            <a:off x="6115712" y="2726282"/>
+            <a:ext cx="12700" cy="1379109"/>
+          </a:xfrm>
+          <a:prstGeom prst="curvedConnector3">
+            <a:avLst>
+              <a:gd name="adj1" fmla="val 6315953"/>
+            </a:avLst>
+          </a:prstGeom>
+          <a:ln w="76200" cmpd="sng">
+            <a:solidFill>
+              <a:srgbClr val="000000"/>
+            </a:solidFill>
+            <a:tailEnd type="arrow"/>
+          </a:ln>
+        </p:spPr>
+        <p:style>
+          <a:lnRef idx="2">
+            <a:schemeClr val="accent1"/>
+          </a:lnRef>
+          <a:fillRef idx="0">
+            <a:schemeClr val="accent1"/>
+          </a:fillRef>
+          <a:effectRef idx="1">
+            <a:schemeClr val="accent1"/>
+          </a:effectRef>
+          <a:fontRef idx="minor">
+            <a:schemeClr val="tx1"/>
+          </a:fontRef>
+        </p:style>
+      </p:cxnSp>
+      <p:sp>
+        <p:nvSpPr>
+          <p:cNvPr id="11" name="TextBox 10"/>
+          <p:cNvSpPr txBox="1"/>
+          <p:nvPr/>
+        </p:nvSpPr>
+        <p:spPr>
+          <a:xfrm>
+            <a:off x="6613543" y="2325611"/>
+            <a:ext cx="2685787" cy="707886"/>
+          </a:xfrm>
+          <a:prstGeom prst="rect">
+            <a:avLst/>
+          </a:prstGeom>
+          <a:noFill/>
+        </p:spPr>
+        <p:txBody>
+          <a:bodyPr wrap="square" rtlCol="0">
+            <a:spAutoFit/>
+          </a:bodyPr>
+          <a:lstStyle/>
+          <a:p>
+            <a:r>
+              <a:rPr lang="en-US" sz="4000" dirty="0" smtClean="0"/>
+              <a:t>Returns to</a:t>
+            </a:r>
+            <a:endParaRPr lang="en-US" sz="4000" dirty="0"/>
+          </a:p>
+        </p:txBody>
+      </p:sp>
+      <p:sp>
+        <p:nvSpPr>
+          <p:cNvPr id="12" name="TextBox 11"/>
+          <p:cNvSpPr txBox="1"/>
+          <p:nvPr/>
+        </p:nvSpPr>
+        <p:spPr>
+          <a:xfrm>
+            <a:off x="6738633" y="4196300"/>
+            <a:ext cx="2685787" cy="707886"/>
+          </a:xfrm>
+          <a:prstGeom prst="rect">
+            <a:avLst/>
+          </a:prstGeom>
+          <a:noFill/>
+        </p:spPr>
+        <p:txBody>
+          <a:bodyPr wrap="square" rtlCol="0">
+            <a:spAutoFit/>
+          </a:bodyPr>
+          <a:lstStyle/>
+          <a:p>
+            <a:r>
+              <a:rPr lang="en-US" sz="4000" dirty="0" smtClean="0"/>
+              <a:t>Returns to</a:t>
+            </a:r>
+            <a:endParaRPr lang="en-US" sz="4000" dirty="0"/>
           </a:p>
         </p:txBody>
       </p:sp>
     </p:spTree>
     <p:extLst>
       <p:ext uri="{BB962C8B-B14F-4D97-AF65-F5344CB8AC3E}">
-        <p14:creationId xmlns:p14="http://schemas.microsoft.com/office/powerpoint/2010/main" val="4032478991"/>
+        <p14:creationId xmlns:p14="http://schemas.microsoft.com/office/powerpoint/2010/main" val="1282411430"/>
       </p:ext>
     </p:extLst>
   </p:cSld>

</xml_diff>

<commit_message>
reordering properties to the end, added method context notes and started object prototype
</commit_message>
<xml_diff>
--- a/javascript-objects.pptx
+++ b/javascript-objects.pptx
@@ -5,7 +5,7 @@
     <p:sldMasterId id="2147483648" r:id="rId1"/>
   </p:sldMasterIdLst>
   <p:notesMasterIdLst>
-    <p:notesMasterId r:id="rId15"/>
+    <p:notesMasterId r:id="rId16"/>
   </p:notesMasterIdLst>
   <p:sldIdLst>
     <p:sldId id="256" r:id="rId2"/>
@@ -20,7 +20,8 @@
     <p:sldId id="274" r:id="rId11"/>
     <p:sldId id="275" r:id="rId12"/>
     <p:sldId id="267" r:id="rId13"/>
-    <p:sldId id="265" r:id="rId14"/>
+    <p:sldId id="276" r:id="rId14"/>
+    <p:sldId id="265" r:id="rId15"/>
   </p:sldIdLst>
   <p:sldSz cx="9144000" cy="6858000" type="screen4x3"/>
   <p:notesSz cx="6858000" cy="9144000"/>
@@ -755,18 +756,117 @@
           <a:bodyPr/>
           <a:lstStyle/>
           <a:p>
-            <a:r>
-              <a:rPr lang="en-US" dirty="0" smtClean="0"/>
-              <a:t>In C# you never need to give any </a:t>
-            </a:r>
-            <a:r>
-              <a:rPr lang="en-US" smtClean="0"/>
-              <a:t>thought</a:t>
-            </a:r>
-            <a:r>
-              <a:rPr lang="en-US" baseline="0" smtClean="0"/>
-              <a:t> about </a:t>
-            </a:r>
+            <a:pPr marL="171450" indent="-171450">
+              <a:buFont typeface="Arial"/>
+              <a:buChar char="•"/>
+            </a:pPr>
+            <a:r>
+              <a:rPr lang="en-US" dirty="0" smtClean="0"/>
+              <a:t>In C# you never need to give any thought</a:t>
+            </a:r>
+            <a:r>
+              <a:rPr lang="en-US" baseline="0" dirty="0" smtClean="0"/>
+              <a:t> about what the this keyword will refer to. It always refers to the object which your currently executing method belongs to.</a:t>
+            </a:r>
+          </a:p>
+          <a:p>
+            <a:pPr marL="171450" indent="-171450">
+              <a:buFont typeface="Arial"/>
+              <a:buChar char="•"/>
+            </a:pPr>
+            <a:r>
+              <a:rPr lang="en-US" baseline="0" dirty="0" smtClean="0"/>
+              <a:t>Javascript is more complicated because </a:t>
+            </a:r>
+          </a:p>
+          <a:p>
+            <a:pPr marL="628650" lvl="1" indent="-171450">
+              <a:buFont typeface="Arial"/>
+              <a:buChar char="•"/>
+            </a:pPr>
+            <a:r>
+              <a:rPr lang="en-US" baseline="0" dirty="0" smtClean="0"/>
+              <a:t>the link between objects and methods is more of an incidental one </a:t>
+            </a:r>
+          </a:p>
+          <a:p>
+            <a:pPr marL="628650" lvl="1" indent="-171450">
+              <a:buFont typeface="Arial"/>
+              <a:buChar char="•"/>
+            </a:pPr>
+            <a:r>
+              <a:rPr lang="en-US" baseline="0" dirty="0" smtClean="0"/>
+              <a:t>functions are objects and may be invoked outside of the object they belong to - callbacks are the best example of this</a:t>
+            </a:r>
+          </a:p>
+          <a:p>
+            <a:pPr marL="171450" lvl="0" indent="-171450">
+              <a:buFont typeface="Arial"/>
+              <a:buChar char="•"/>
+            </a:pPr>
+            <a:r>
+              <a:rPr lang="en-US" baseline="0" dirty="0" smtClean="0"/>
+              <a:t>Every time you call a function, it will have a value assigned to this.</a:t>
+            </a:r>
+          </a:p>
+          <a:p>
+            <a:pPr marL="628650" lvl="1" indent="-171450">
+              <a:buFont typeface="Arial"/>
+              <a:buChar char="•"/>
+            </a:pPr>
+            <a:r>
+              <a:rPr lang="en-US" baseline="0" dirty="0" smtClean="0"/>
+              <a:t>Default context is the global object – window in the browser</a:t>
+            </a:r>
+          </a:p>
+          <a:p>
+            <a:pPr marL="628650" lvl="1" indent="-171450">
+              <a:buFont typeface="Arial"/>
+              <a:buChar char="•"/>
+            </a:pPr>
+            <a:r>
+              <a:rPr lang="en-US" baseline="0" dirty="0" smtClean="0"/>
+              <a:t>When you call a method from an object, it will be the object</a:t>
+            </a:r>
+          </a:p>
+          <a:p>
+            <a:pPr marL="628650" lvl="1" indent="-171450">
+              <a:buFont typeface="Arial"/>
+              <a:buChar char="•"/>
+            </a:pPr>
+            <a:r>
+              <a:rPr lang="en-US" baseline="0" dirty="0" smtClean="0"/>
+              <a:t>If you want to, you can set it to anything you like using </a:t>
+            </a:r>
+            <a:r>
+              <a:rPr lang="en-US" baseline="0" dirty="0" err="1" smtClean="0"/>
+              <a:t>function.call</a:t>
+            </a:r>
+            <a:r>
+              <a:rPr lang="en-US" baseline="0" dirty="0" smtClean="0"/>
+              <a:t> or </a:t>
+            </a:r>
+            <a:r>
+              <a:rPr lang="en-US" baseline="0" dirty="0" err="1" smtClean="0"/>
+              <a:t>function.apply</a:t>
+            </a:r>
+            <a:endParaRPr lang="en-US" baseline="0" dirty="0" smtClean="0"/>
+          </a:p>
+          <a:p>
+            <a:pPr marL="628650" lvl="1" indent="-171450">
+              <a:buFont typeface="Arial"/>
+              <a:buChar char="•"/>
+            </a:pPr>
+            <a:r>
+              <a:rPr lang="en-US" baseline="0" dirty="0" smtClean="0"/>
+              <a:t>This is why "this" is set to the global context whenever you call a constructor without the new operator</a:t>
+            </a:r>
+          </a:p>
+          <a:p>
+            <a:pPr marL="171450" indent="-171450">
+              <a:buFont typeface="Arial"/>
+              <a:buChar char="•"/>
+            </a:pPr>
             <a:endParaRPr lang="en-US" dirty="0"/>
           </a:p>
         </p:txBody>
@@ -798,6 +898,286 @@
     <p:extLst>
       <p:ext uri="{BB962C8B-B14F-4D97-AF65-F5344CB8AC3E}">
         <p14:creationId xmlns:p14="http://schemas.microsoft.com/office/powerpoint/2010/main" val="1797582236"/>
+      </p:ext>
+    </p:extLst>
+  </p:cSld>
+  <p:clrMapOvr>
+    <a:masterClrMapping/>
+  </p:clrMapOvr>
+</p:notes>
+</file>
+
+<file path=ppt/notesSlides/notesSlide12.xml><?xml version="1.0" encoding="utf-8"?>
+<p:notes xmlns:a="http://schemas.openxmlformats.org/drawingml/2006/main" xmlns:r="http://schemas.openxmlformats.org/officeDocument/2006/relationships" xmlns:p="http://schemas.openxmlformats.org/presentationml/2006/main">
+  <p:cSld>
+    <p:spTree>
+      <p:nvGrpSpPr>
+        <p:cNvPr id="1" name=""/>
+        <p:cNvGrpSpPr/>
+        <p:nvPr/>
+      </p:nvGrpSpPr>
+      <p:grpSpPr>
+        <a:xfrm>
+          <a:off x="0" y="0"/>
+          <a:ext cx="0" cy="0"/>
+          <a:chOff x="0" y="0"/>
+          <a:chExt cx="0" cy="0"/>
+        </a:xfrm>
+      </p:grpSpPr>
+      <p:sp>
+        <p:nvSpPr>
+          <p:cNvPr id="2" name="Slide Image Placeholder 1"/>
+          <p:cNvSpPr>
+            <a:spLocks noGrp="1" noRot="1" noChangeAspect="1"/>
+          </p:cNvSpPr>
+          <p:nvPr>
+            <p:ph type="sldImg"/>
+          </p:nvPr>
+        </p:nvSpPr>
+        <p:spPr/>
+      </p:sp>
+      <p:sp>
+        <p:nvSpPr>
+          <p:cNvPr id="3" name="Notes Placeholder 2"/>
+          <p:cNvSpPr>
+            <a:spLocks noGrp="1"/>
+          </p:cNvSpPr>
+          <p:nvPr>
+            <p:ph type="body" idx="1"/>
+          </p:nvPr>
+        </p:nvSpPr>
+        <p:spPr/>
+        <p:txBody>
+          <a:bodyPr/>
+          <a:lstStyle/>
+          <a:p>
+            <a:pPr marL="171450" indent="-171450">
+              <a:buFont typeface="Arial"/>
+              <a:buChar char="•"/>
+            </a:pPr>
+            <a:r>
+              <a:rPr lang="en-US" dirty="0" smtClean="0"/>
+              <a:t>Object</a:t>
+            </a:r>
+            <a:r>
+              <a:rPr lang="en-US" baseline="0" dirty="0" smtClean="0"/>
+              <a:t> prototypes are </a:t>
+            </a:r>
+            <a:r>
+              <a:rPr lang="en-US" baseline="0" dirty="0" err="1" smtClean="0"/>
+              <a:t>javascript's</a:t>
+            </a:r>
+            <a:r>
+              <a:rPr lang="en-US" baseline="0" dirty="0" smtClean="0"/>
+              <a:t> way of sharing implementation across similar objects, much like classes in C#.</a:t>
+            </a:r>
+          </a:p>
+          <a:p>
+            <a:pPr marL="171450" indent="-171450">
+              <a:buFont typeface="Arial"/>
+              <a:buChar char="•"/>
+            </a:pPr>
+            <a:r>
+              <a:rPr lang="en-US" baseline="0" dirty="0" smtClean="0"/>
+              <a:t>Although they look a bit like classes, constructor functions are not classes. Javascript has only objects and no classes.</a:t>
+            </a:r>
+          </a:p>
+          <a:p>
+            <a:pPr marL="171450" indent="-171450">
+              <a:buFont typeface="Arial"/>
+              <a:buChar char="•"/>
+            </a:pPr>
+            <a:r>
+              <a:rPr lang="en-US" baseline="0" dirty="0" smtClean="0"/>
+              <a:t>In a class based languages there is a clear distinction between the idea of a class and an object. </a:t>
+            </a:r>
+          </a:p>
+          <a:p>
+            <a:pPr marL="628650" lvl="1" indent="-171450">
+              <a:buFont typeface="Arial"/>
+              <a:buChar char="•"/>
+            </a:pPr>
+            <a:r>
+              <a:rPr lang="en-US" baseline="0" dirty="0" smtClean="0"/>
+              <a:t>Classes are templates for making objects. </a:t>
+            </a:r>
+          </a:p>
+          <a:p>
+            <a:pPr marL="628650" lvl="1" indent="-171450">
+              <a:buFont typeface="Arial"/>
+              <a:buChar char="•"/>
+            </a:pPr>
+            <a:r>
+              <a:rPr lang="en-US" baseline="0" dirty="0" smtClean="0"/>
+              <a:t>An object is created from a class. </a:t>
+            </a:r>
+          </a:p>
+          <a:p>
+            <a:pPr marL="628650" lvl="1" indent="-171450">
+              <a:buFont typeface="Arial"/>
+              <a:buChar char="•"/>
+            </a:pPr>
+            <a:r>
+              <a:rPr lang="en-US" baseline="0" dirty="0" smtClean="0"/>
+              <a:t>You can not have an object without a class. All objects are created from a class. </a:t>
+            </a:r>
+          </a:p>
+          <a:p>
+            <a:pPr marL="628650" lvl="1" indent="-171450">
+              <a:buFont typeface="Arial"/>
+              <a:buChar char="•"/>
+            </a:pPr>
+            <a:r>
+              <a:rPr lang="en-US" baseline="0" dirty="0" smtClean="0"/>
+              <a:t>You can not change an object after it has been instantiated. </a:t>
+            </a:r>
+          </a:p>
+          <a:p>
+            <a:pPr marL="171450" lvl="0" indent="-171450">
+              <a:buFont typeface="Arial"/>
+              <a:buChar char="•"/>
+            </a:pPr>
+            <a:r>
+              <a:rPr lang="en-US" baseline="0" dirty="0" smtClean="0"/>
+              <a:t>In prototype-based languages (there are others, but javascript is the most widely used) there are no classes. </a:t>
+            </a:r>
+          </a:p>
+          <a:p>
+            <a:pPr marL="628650" lvl="1" indent="-171450">
+              <a:buFont typeface="Arial"/>
+              <a:buChar char="•"/>
+            </a:pPr>
+            <a:r>
+              <a:rPr lang="en-US" baseline="0" dirty="0" smtClean="0"/>
+              <a:t>Objects are created by creating an empty object or by cloning an existing one. </a:t>
+            </a:r>
+          </a:p>
+          <a:p>
+            <a:pPr marL="628650" lvl="1" indent="-171450">
+              <a:buFont typeface="Arial"/>
+              <a:buChar char="•"/>
+            </a:pPr>
+            <a:r>
+              <a:rPr lang="en-US" dirty="0" smtClean="0"/>
+              <a:t>It is called prototypical inheritance, because an existing object can be</a:t>
+            </a:r>
+            <a:r>
+              <a:rPr lang="en-US" baseline="0" dirty="0" smtClean="0"/>
+              <a:t> used as the starting point to build a new one. </a:t>
+            </a:r>
+          </a:p>
+          <a:p>
+            <a:pPr marL="171450" lvl="0" indent="-171450">
+              <a:buFont typeface="Arial"/>
+              <a:buChar char="•"/>
+            </a:pPr>
+            <a:r>
+              <a:rPr lang="en-US" dirty="0" smtClean="0"/>
+              <a:t>Prototypical inheritance is implemented in javascript by adding properties</a:t>
+            </a:r>
+            <a:r>
+              <a:rPr lang="en-US" baseline="0" dirty="0" smtClean="0"/>
+              <a:t> or methods to a constructor's prototype method. </a:t>
+            </a:r>
+          </a:p>
+          <a:p>
+            <a:pPr marL="628650" lvl="1" indent="-171450">
+              <a:buFont typeface="Arial"/>
+              <a:buChar char="•"/>
+            </a:pPr>
+            <a:r>
+              <a:rPr lang="en-US" baseline="0" dirty="0" smtClean="0"/>
+              <a:t>Any object that is created by the constructor will automatically inherit the properties or methods added to the prototype.</a:t>
+            </a:r>
+          </a:p>
+          <a:p>
+            <a:pPr marL="628650" lvl="1" indent="-171450">
+              <a:buFont typeface="Arial"/>
+              <a:buChar char="•"/>
+            </a:pPr>
+            <a:r>
+              <a:rPr lang="en-US" baseline="0" dirty="0" smtClean="0"/>
+              <a:t>In that way, the prototype is the starting point for any object created by the constructor and the object is customized by adding properties and methods directly to the object itself. </a:t>
+            </a:r>
+          </a:p>
+          <a:p>
+            <a:pPr marL="628650" lvl="1" indent="-171450">
+              <a:buFont typeface="Arial"/>
+              <a:buChar char="•"/>
+            </a:pPr>
+            <a:r>
+              <a:rPr lang="en-US" baseline="0" dirty="0" smtClean="0"/>
+              <a:t>The prototype is not a type system. All objects created by a constructor can be customized so there is no guarantee they will conform to the structure in the prototype. </a:t>
+            </a:r>
+          </a:p>
+          <a:p>
+            <a:pPr marL="628650" lvl="1" indent="-171450">
+              <a:buFont typeface="Arial"/>
+              <a:buChar char="•"/>
+            </a:pPr>
+            <a:r>
+              <a:rPr lang="en-US" baseline="0" dirty="0" smtClean="0"/>
+              <a:t>Prototypes start off as an empty Object – which is how every object ends up with a </a:t>
+            </a:r>
+            <a:r>
+              <a:rPr lang="en-US" baseline="0" dirty="0" err="1" smtClean="0"/>
+              <a:t>toString</a:t>
+            </a:r>
+            <a:r>
+              <a:rPr lang="en-US" baseline="0" dirty="0" smtClean="0"/>
+              <a:t>() method</a:t>
+            </a:r>
+          </a:p>
+          <a:p>
+            <a:pPr marL="628650" lvl="1" indent="-171450">
+              <a:buFont typeface="Arial"/>
+              <a:buChar char="•"/>
+            </a:pPr>
+            <a:endParaRPr lang="en-US" baseline="0" dirty="0" smtClean="0"/>
+          </a:p>
+          <a:p>
+            <a:pPr marL="628650" lvl="1" indent="-171450">
+              <a:buFont typeface="Arial"/>
+              <a:buChar char="•"/>
+            </a:pPr>
+            <a:endParaRPr lang="en-US" baseline="0" dirty="0" smtClean="0"/>
+          </a:p>
+          <a:p>
+            <a:pPr marL="628650" lvl="1" indent="-171450">
+              <a:buFont typeface="Arial"/>
+              <a:buChar char="•"/>
+            </a:pPr>
+            <a:endParaRPr lang="en-US" dirty="0"/>
+          </a:p>
+        </p:txBody>
+      </p:sp>
+      <p:sp>
+        <p:nvSpPr>
+          <p:cNvPr id="4" name="Slide Number Placeholder 3"/>
+          <p:cNvSpPr>
+            <a:spLocks noGrp="1"/>
+          </p:cNvSpPr>
+          <p:nvPr>
+            <p:ph type="sldNum" sz="quarter" idx="10"/>
+          </p:nvPr>
+        </p:nvSpPr>
+        <p:spPr/>
+        <p:txBody>
+          <a:bodyPr/>
+          <a:lstStyle/>
+          <a:p>
+            <a:fld id="{042B0272-D6CE-D246-814F-524707BF3A24}" type="slidenum">
+              <a:rPr lang="en-US" smtClean="0"/>
+              <a:t>12</a:t>
+            </a:fld>
+            <a:endParaRPr lang="en-US"/>
+          </a:p>
+        </p:txBody>
+      </p:sp>
+    </p:spTree>
+    <p:extLst>
+      <p:ext uri="{BB962C8B-B14F-4D97-AF65-F5344CB8AC3E}">
+        <p14:creationId xmlns:p14="http://schemas.microsoft.com/office/powerpoint/2010/main" val="3804307720"/>
       </p:ext>
     </p:extLst>
   </p:cSld>
@@ -5850,25 +6230,6 @@
           </a:p>
         </p:txBody>
       </p:sp>
-      <p:sp>
-        <p:nvSpPr>
-          <p:cNvPr id="3" name="Content Placeholder 2"/>
-          <p:cNvSpPr>
-            <a:spLocks noGrp="1"/>
-          </p:cNvSpPr>
-          <p:nvPr>
-            <p:ph idx="1"/>
-          </p:nvPr>
-        </p:nvSpPr>
-        <p:spPr/>
-        <p:txBody>
-          <a:bodyPr/>
-          <a:lstStyle/>
-          <a:p>
-            <a:endParaRPr lang="en-US" dirty="0"/>
-          </a:p>
-        </p:txBody>
-      </p:sp>
     </p:spTree>
     <p:extLst>
       <p:ext uri="{BB962C8B-B14F-4D97-AF65-F5344CB8AC3E}">
@@ -5972,6 +6333,78 @@
 </file>
 
 <file path=ppt/slides/slide13.xml><?xml version="1.0" encoding="utf-8"?>
+<p:sld xmlns:a="http://schemas.openxmlformats.org/drawingml/2006/main" xmlns:r="http://schemas.openxmlformats.org/officeDocument/2006/relationships" xmlns:p="http://schemas.openxmlformats.org/presentationml/2006/main">
+  <p:cSld>
+    <p:spTree>
+      <p:nvGrpSpPr>
+        <p:cNvPr id="1" name=""/>
+        <p:cNvGrpSpPr/>
+        <p:nvPr/>
+      </p:nvGrpSpPr>
+      <p:grpSpPr>
+        <a:xfrm>
+          <a:off x="0" y="0"/>
+          <a:ext cx="0" cy="0"/>
+          <a:chOff x="0" y="0"/>
+          <a:chExt cx="0" cy="0"/>
+        </a:xfrm>
+      </p:grpSpPr>
+      <p:sp>
+        <p:nvSpPr>
+          <p:cNvPr id="2" name="Title 1"/>
+          <p:cNvSpPr>
+            <a:spLocks noGrp="1"/>
+          </p:cNvSpPr>
+          <p:nvPr>
+            <p:ph type="title"/>
+          </p:nvPr>
+        </p:nvSpPr>
+        <p:spPr/>
+        <p:txBody>
+          <a:bodyPr/>
+          <a:lstStyle/>
+          <a:p>
+            <a:r>
+              <a:rPr lang="en-US" smtClean="0"/>
+              <a:t>Properties</a:t>
+            </a:r>
+            <a:endParaRPr lang="en-US"/>
+          </a:p>
+        </p:txBody>
+      </p:sp>
+      <p:sp>
+        <p:nvSpPr>
+          <p:cNvPr id="3" name="Content Placeholder 2"/>
+          <p:cNvSpPr>
+            <a:spLocks noGrp="1"/>
+          </p:cNvSpPr>
+          <p:nvPr>
+            <p:ph idx="1"/>
+          </p:nvPr>
+        </p:nvSpPr>
+        <p:spPr/>
+        <p:txBody>
+          <a:bodyPr/>
+          <a:lstStyle/>
+          <a:p>
+            <a:endParaRPr lang="en-US"/>
+          </a:p>
+        </p:txBody>
+      </p:sp>
+    </p:spTree>
+    <p:extLst>
+      <p:ext uri="{BB962C8B-B14F-4D97-AF65-F5344CB8AC3E}">
+        <p14:creationId xmlns:p14="http://schemas.microsoft.com/office/powerpoint/2010/main" val="2928501476"/>
+      </p:ext>
+    </p:extLst>
+  </p:cSld>
+  <p:clrMapOvr>
+    <a:masterClrMapping/>
+  </p:clrMapOvr>
+</p:sld>
+</file>
+
+<file path=ppt/slides/slide14.xml><?xml version="1.0" encoding="utf-8"?>
 <p:sld xmlns:a="http://schemas.openxmlformats.org/drawingml/2006/main" xmlns:r="http://schemas.openxmlformats.org/officeDocument/2006/relationships" xmlns:p="http://schemas.openxmlformats.org/presentationml/2006/main">
   <p:cSld>
     <p:spTree>

</xml_diff>

<commit_message>
extra technical detail about closures
</commit_message>
<xml_diff>
--- a/javascript-objects.pptx
+++ b/javascript-objects.pptx
@@ -6365,10 +6365,10 @@
           <a:lstStyle/>
           <a:p>
             <a:r>
-              <a:rPr lang="en-US" smtClean="0"/>
+              <a:rPr lang="en-US" dirty="0" smtClean="0"/>
               <a:t>Properties</a:t>
             </a:r>
-            <a:endParaRPr lang="en-US"/>
+            <a:endParaRPr lang="en-US" dirty="0"/>
           </a:p>
         </p:txBody>
       </p:sp>

</xml_diff>

<commit_message>
adding more detail to prototype notes
</commit_message>
<xml_diff>
--- a/javascript-objects.pptx
+++ b/javascript-objects.pptx
@@ -2415,8 +2415,47 @@
             </a:r>
             <a:r>
               <a:rPr lang="en-US" baseline="0" dirty="0" smtClean="0"/>
-              <a:t>() method</a:t>
-            </a:r>
+              <a:t>() </a:t>
+            </a:r>
+            <a:r>
+              <a:rPr lang="en-US" baseline="0" dirty="0" smtClean="0"/>
+              <a:t>method</a:t>
+            </a:r>
+          </a:p>
+          <a:p>
+            <a:pPr marL="628650" lvl="1" indent="-171450">
+              <a:buFont typeface="Arial"/>
+              <a:buChar char="•"/>
+            </a:pPr>
+            <a:r>
+              <a:rPr lang="en-US" baseline="0" dirty="0" smtClean="0"/>
+              <a:t>Prototypical inheritance works because the object maintains a link back to the constructor function that created it. We've seen that before when we've looked at the constructor property of objects.</a:t>
+            </a:r>
+          </a:p>
+          <a:p>
+            <a:pPr marL="171450" lvl="0" indent="-171450">
+              <a:buFont typeface="Arial"/>
+              <a:buChar char="•"/>
+            </a:pPr>
+            <a:r>
+              <a:rPr lang="en-US" baseline="0" dirty="0" smtClean="0"/>
+              <a:t>How javascript reads properties from objects</a:t>
+            </a:r>
+          </a:p>
+          <a:p>
+            <a:pPr marL="628650" lvl="1" indent="-171450">
+              <a:buFont typeface="Arial"/>
+              <a:buChar char="•"/>
+            </a:pPr>
+            <a:r>
+              <a:rPr lang="en-US" baseline="0" dirty="0" smtClean="0"/>
+              <a:t>Check the object itself, check the </a:t>
+            </a:r>
+            <a:r>
+              <a:rPr lang="en-US" baseline="0" smtClean="0"/>
+              <a:t>constructor's prototype</a:t>
+            </a:r>
+            <a:endParaRPr lang="en-US" baseline="0" dirty="0" smtClean="0"/>
           </a:p>
           <a:p>
             <a:pPr marL="628650" lvl="1" indent="-171450">

</xml_diff>